<commit_message>
moved Lesson 1.1 to master
</commit_message>
<xml_diff>
--- a/Slides/Lesson 1.2 General Program Design Principles.pptx
+++ b/Slides/Lesson 1.2 General Program Design Principles.pptx
@@ -224,7 +224,7 @@
           <a:p>
             <a:fld id="{7C7E5181-6CF5-45F7-A87A-E0E0B1FD7549}" type="datetimeFigureOut">
               <a:rPr lang="en-US" smtClean="0"/>
-              <a:t>1/10/2021</a:t>
+              <a:t>1/11/2021</a:t>
             </a:fld>
             <a:endParaRPr lang="en-US"/>
           </a:p>
@@ -792,7 +792,7 @@
           <a:p>
             <a:fld id="{5D2A64DE-480B-420F-9649-4F8E696E08E0}" type="datetime1">
               <a:rPr lang="en-US" smtClean="0"/>
-              <a:t>1/10/2021</a:t>
+              <a:t>1/11/2021</a:t>
             </a:fld>
             <a:endParaRPr lang="en-US"/>
           </a:p>
@@ -1026,7 +1026,7 @@
           <a:p>
             <a:fld id="{0D3616D0-8311-4107-9726-6B805E7D05BA}" type="datetime1">
               <a:rPr lang="en-US" smtClean="0"/>
-              <a:t>1/10/2021</a:t>
+              <a:t>1/11/2021</a:t>
             </a:fld>
             <a:endParaRPr lang="en-US"/>
           </a:p>
@@ -1234,7 +1234,7 @@
           <a:p>
             <a:fld id="{3BC2557A-5C88-417A-A763-5AC779462A5F}" type="datetime1">
               <a:rPr lang="en-US" smtClean="0"/>
-              <a:t>1/10/2021</a:t>
+              <a:t>1/11/2021</a:t>
             </a:fld>
             <a:endParaRPr lang="en-US"/>
           </a:p>
@@ -1758,7 +1758,7 @@
           <a:p>
             <a:fld id="{07C7BFD4-467E-4EDE-93EA-052F5B39A4E5}" type="datetime1">
               <a:rPr lang="en-US" smtClean="0"/>
-              <a:t>1/10/2021</a:t>
+              <a:t>1/11/2021</a:t>
             </a:fld>
             <a:endParaRPr lang="en-US"/>
           </a:p>
@@ -2071,7 +2071,7 @@
           <a:p>
             <a:fld id="{A533CBE2-D5BE-47AC-ADC2-9CDFC1D0CF90}" type="datetime1">
               <a:rPr lang="en-US" smtClean="0"/>
-              <a:t>1/10/2021</a:t>
+              <a:t>1/11/2021</a:t>
             </a:fld>
             <a:endParaRPr lang="en-US"/>
           </a:p>
@@ -2372,7 +2372,7 @@
           <a:p>
             <a:fld id="{39B7EDB1-CE74-4951-85A2-0B01C2128E28}" type="datetime1">
               <a:rPr lang="en-US" smtClean="0"/>
-              <a:t>1/10/2021</a:t>
+              <a:t>1/11/2021</a:t>
             </a:fld>
             <a:endParaRPr lang="en-US"/>
           </a:p>
@@ -2820,7 +2820,7 @@
           <a:p>
             <a:fld id="{2BC7EB92-A5C2-4807-A9DC-9EDE6CBFB241}" type="datetime1">
               <a:rPr lang="en-US" smtClean="0"/>
-              <a:t>1/10/2021</a:t>
+              <a:t>1/11/2021</a:t>
             </a:fld>
             <a:endParaRPr lang="en-US"/>
           </a:p>
@@ -2966,7 +2966,7 @@
           <a:p>
             <a:fld id="{109E55A0-C911-4F03-82FC-7E5926047D46}" type="datetime1">
               <a:rPr lang="en-US" smtClean="0"/>
-              <a:t>1/10/2021</a:t>
+              <a:t>1/11/2021</a:t>
             </a:fld>
             <a:endParaRPr lang="en-US"/>
           </a:p>
@@ -3115,7 +3115,7 @@
           <a:p>
             <a:fld id="{2B7B7EE0-7771-4CD5-9B2B-3550753A54A1}" type="datetime1">
               <a:rPr lang="en-US" smtClean="0"/>
-              <a:t>1/10/2021</a:t>
+              <a:t>1/11/2021</a:t>
             </a:fld>
             <a:endParaRPr lang="en-US"/>
           </a:p>
@@ -3426,7 +3426,7 @@
           <a:p>
             <a:fld id="{F8B318B3-0E87-4416-A9B8-D891968C2727}" type="datetime1">
               <a:rPr lang="en-US" smtClean="0"/>
-              <a:t>1/10/2021</a:t>
+              <a:t>1/11/2021</a:t>
             </a:fld>
             <a:endParaRPr lang="en-US"/>
           </a:p>
@@ -3714,7 +3714,7 @@
           <a:p>
             <a:fld id="{EA476A42-A091-4468-A075-64A31BE59948}" type="datetime1">
               <a:rPr lang="en-US" smtClean="0"/>
-              <a:t>1/10/2021</a:t>
+              <a:t>1/11/2021</a:t>
             </a:fld>
             <a:endParaRPr lang="en-US"/>
           </a:p>
@@ -3955,7 +3955,7 @@
           <a:p>
             <a:fld id="{54D997E8-DDEE-43F1-8D9B-F8A1E11DE488}" type="datetime1">
               <a:rPr lang="en-US" smtClean="0"/>
-              <a:t>1/10/2021</a:t>
+              <a:t>1/11/2021</a:t>
             </a:fld>
             <a:endParaRPr lang="en-US"/>
           </a:p>
@@ -18476,7 +18476,7 @@
         <p:spPr>
           <a:xfrm>
             <a:off x="9176288" y="4081221"/>
-            <a:ext cx="2177511" cy="1704814"/>
+            <a:ext cx="2177511" cy="1018317"/>
           </a:xfrm>
           <a:prstGeom prst="rect">
             <a:avLst/>
@@ -18510,7 +18510,7 @@
           </a:fontRef>
         </p:style>
         <p:txBody>
-          <a:bodyPr rtlCol="0" anchor="ctr"/>
+          <a:bodyPr rtlCol="0" anchor="t"/>
           <a:lstStyle/>
           <a:p>
             <a:r>

</xml_diff>

<commit_message>
oops, didn't save L1.2 before committing
</commit_message>
<xml_diff>
--- a/Slides/Lesson 1.2 General Program Design Principles.pptx
+++ b/Slides/Lesson 1.2 General Program Design Principles.pptx
@@ -5,7 +5,7 @@
     <p:sldMasterId id="2147483648" r:id="rId1"/>
   </p:sldMasterIdLst>
   <p:notesMasterIdLst>
-    <p:notesMasterId r:id="rId30"/>
+    <p:notesMasterId r:id="rId29"/>
   </p:notesMasterIdLst>
   <p:sldIdLst>
     <p:sldId id="256" r:id="rId2"/>
@@ -14,28 +14,27 @@
     <p:sldId id="351" r:id="rId5"/>
     <p:sldId id="352" r:id="rId6"/>
     <p:sldId id="353" r:id="rId7"/>
-    <p:sldId id="354" r:id="rId8"/>
-    <p:sldId id="357" r:id="rId9"/>
-    <p:sldId id="360" r:id="rId10"/>
-    <p:sldId id="369" r:id="rId11"/>
-    <p:sldId id="274" r:id="rId12"/>
-    <p:sldId id="361" r:id="rId13"/>
-    <p:sldId id="362" r:id="rId14"/>
-    <p:sldId id="363" r:id="rId15"/>
-    <p:sldId id="358" r:id="rId16"/>
-    <p:sldId id="364" r:id="rId17"/>
-    <p:sldId id="365" r:id="rId18"/>
-    <p:sldId id="366" r:id="rId19"/>
-    <p:sldId id="367" r:id="rId20"/>
-    <p:sldId id="368" r:id="rId21"/>
-    <p:sldId id="370" r:id="rId22"/>
-    <p:sldId id="371" r:id="rId23"/>
-    <p:sldId id="372" r:id="rId24"/>
-    <p:sldId id="373" r:id="rId25"/>
-    <p:sldId id="374" r:id="rId26"/>
-    <p:sldId id="375" r:id="rId27"/>
-    <p:sldId id="376" r:id="rId28"/>
-    <p:sldId id="298" r:id="rId29"/>
+    <p:sldId id="357" r:id="rId8"/>
+    <p:sldId id="360" r:id="rId9"/>
+    <p:sldId id="369" r:id="rId10"/>
+    <p:sldId id="274" r:id="rId11"/>
+    <p:sldId id="361" r:id="rId12"/>
+    <p:sldId id="362" r:id="rId13"/>
+    <p:sldId id="363" r:id="rId14"/>
+    <p:sldId id="358" r:id="rId15"/>
+    <p:sldId id="364" r:id="rId16"/>
+    <p:sldId id="365" r:id="rId17"/>
+    <p:sldId id="366" r:id="rId18"/>
+    <p:sldId id="367" r:id="rId19"/>
+    <p:sldId id="368" r:id="rId20"/>
+    <p:sldId id="370" r:id="rId21"/>
+    <p:sldId id="371" r:id="rId22"/>
+    <p:sldId id="372" r:id="rId23"/>
+    <p:sldId id="373" r:id="rId24"/>
+    <p:sldId id="374" r:id="rId25"/>
+    <p:sldId id="375" r:id="rId26"/>
+    <p:sldId id="376" r:id="rId27"/>
+    <p:sldId id="298" r:id="rId28"/>
   </p:sldIdLst>
   <p:sldSz cx="12192000" cy="6858000"/>
   <p:notesSz cx="6858000" cy="9144000"/>
@@ -4552,990 +4551,6 @@
       </p:grpSpPr>
       <p:sp>
         <p:nvSpPr>
-          <p:cNvPr id="3" name="Content Placeholder 2">
-            <a:extLst>
-              <a:ext uri="{FF2B5EF4-FFF2-40B4-BE49-F238E27FC236}">
-                <a16:creationId xmlns:a16="http://schemas.microsoft.com/office/drawing/2014/main" id="{AF7FF626-6C20-46F7-99BB-CDAB1FDC4E55}"/>
-              </a:ext>
-            </a:extLst>
-          </p:cNvPr>
-          <p:cNvSpPr>
-            <a:spLocks noGrp="1"/>
-          </p:cNvSpPr>
-          <p:nvPr>
-            <p:ph idx="1"/>
-          </p:nvPr>
-        </p:nvSpPr>
-        <p:spPr/>
-        <p:txBody>
-          <a:bodyPr/>
-          <a:lstStyle/>
-          <a:p>
-            <a:r>
-              <a:rPr lang="en-US" dirty="0"/>
-              <a:t>Replace magic numbers with good names</a:t>
-            </a:r>
-          </a:p>
-        </p:txBody>
-      </p:sp>
-      <p:sp>
-        <p:nvSpPr>
-          <p:cNvPr id="2" name="Title 1">
-            <a:extLst>
-              <a:ext uri="{FF2B5EF4-FFF2-40B4-BE49-F238E27FC236}">
-                <a16:creationId xmlns:a16="http://schemas.microsoft.com/office/drawing/2014/main" id="{24B2B58F-79E6-4966-8892-01C19AEE2D55}"/>
-              </a:ext>
-            </a:extLst>
-          </p:cNvPr>
-          <p:cNvSpPr>
-            <a:spLocks noGrp="1"/>
-          </p:cNvSpPr>
-          <p:nvPr>
-            <p:ph type="title"/>
-          </p:nvPr>
-        </p:nvSpPr>
-        <p:spPr/>
-        <p:txBody>
-          <a:bodyPr/>
-          <a:lstStyle/>
-          <a:p>
-            <a:r>
-              <a:rPr lang="en-US" dirty="0"/>
-              <a:t>Good Names for Constants</a:t>
-            </a:r>
-          </a:p>
-        </p:txBody>
-      </p:sp>
-      <p:sp>
-        <p:nvSpPr>
-          <p:cNvPr id="4" name="Slide Number Placeholder 3">
-            <a:extLst>
-              <a:ext uri="{FF2B5EF4-FFF2-40B4-BE49-F238E27FC236}">
-                <a16:creationId xmlns:a16="http://schemas.microsoft.com/office/drawing/2014/main" id="{C148B8F1-7E78-4C30-93AF-017843AEEBF0}"/>
-              </a:ext>
-            </a:extLst>
-          </p:cNvPr>
-          <p:cNvSpPr>
-            <a:spLocks noGrp="1"/>
-          </p:cNvSpPr>
-          <p:nvPr>
-            <p:ph type="sldNum" sz="quarter" idx="12"/>
-          </p:nvPr>
-        </p:nvSpPr>
-        <p:spPr/>
-        <p:txBody>
-          <a:bodyPr/>
-          <a:lstStyle/>
-          <a:p>
-            <a:fld id="{20F37917-FD3A-4669-9018-DA04BCDD3D75}" type="slidenum">
-              <a:rPr lang="en-US" smtClean="0"/>
-              <a:t>10</a:t>
-            </a:fld>
-            <a:endParaRPr lang="en-US"/>
-          </a:p>
-        </p:txBody>
-      </p:sp>
-      <p:sp>
-        <p:nvSpPr>
-          <p:cNvPr id="6" name="Rectangle 5">
-            <a:extLst>
-              <a:ext uri="{FF2B5EF4-FFF2-40B4-BE49-F238E27FC236}">
-                <a16:creationId xmlns:a16="http://schemas.microsoft.com/office/drawing/2014/main" id="{BD40DC19-940C-4417-B7DE-E77FCDC9039E}"/>
-              </a:ext>
-            </a:extLst>
-          </p:cNvPr>
-          <p:cNvSpPr/>
-          <p:nvPr/>
-        </p:nvSpPr>
-        <p:spPr>
-          <a:xfrm>
-            <a:off x="1106659" y="4303431"/>
-            <a:ext cx="6989298" cy="830997"/>
-          </a:xfrm>
-          <a:prstGeom prst="rect">
-            <a:avLst/>
-          </a:prstGeom>
-        </p:spPr>
-        <p:txBody>
-          <a:bodyPr wrap="square">
-            <a:spAutoFit/>
-          </a:bodyPr>
-          <a:lstStyle/>
-          <a:p>
-            <a:r>
-              <a:rPr lang="en-US" sz="2400" dirty="0">
-                <a:solidFill>
-                  <a:srgbClr val="0000FF"/>
-                </a:solidFill>
-                <a:latin typeface="Consolas" panose="020B0609020204030204" pitchFamily="49" charset="0"/>
-              </a:rPr>
-              <a:t>const</a:t>
-            </a:r>
-            <a:r>
-              <a:rPr lang="en-US" sz="2400" dirty="0">
-                <a:solidFill>
-                  <a:srgbClr val="000000"/>
-                </a:solidFill>
-                <a:latin typeface="Consolas" panose="020B0609020204030204" pitchFamily="49" charset="0"/>
-              </a:rPr>
-              <a:t> </a:t>
-            </a:r>
-            <a:r>
-              <a:rPr lang="en-US" sz="2400" dirty="0" err="1">
-                <a:solidFill>
-                  <a:srgbClr val="000000"/>
-                </a:solidFill>
-                <a:latin typeface="Consolas" panose="020B0609020204030204" pitchFamily="49" charset="0"/>
-              </a:rPr>
-              <a:t>salesTaxRate</a:t>
-            </a:r>
-            <a:r>
-              <a:rPr lang="en-US" sz="2400" dirty="0">
-                <a:solidFill>
-                  <a:srgbClr val="000000"/>
-                </a:solidFill>
-                <a:latin typeface="Consolas" panose="020B0609020204030204" pitchFamily="49" charset="0"/>
-              </a:rPr>
-              <a:t> = </a:t>
-            </a:r>
-            <a:r>
-              <a:rPr lang="en-US" sz="2400" dirty="0">
-                <a:solidFill>
-                  <a:srgbClr val="098658"/>
-                </a:solidFill>
-                <a:latin typeface="Consolas" panose="020B0609020204030204" pitchFamily="49" charset="0"/>
-              </a:rPr>
-              <a:t>1.06</a:t>
-            </a:r>
-            <a:endParaRPr lang="en-US" sz="2400" dirty="0">
-              <a:solidFill>
-                <a:srgbClr val="000000"/>
-              </a:solidFill>
-              <a:latin typeface="Consolas" panose="020B0609020204030204" pitchFamily="49" charset="0"/>
-            </a:endParaRPr>
-          </a:p>
-          <a:p>
-            <a:r>
-              <a:rPr lang="en-US" sz="2400" dirty="0">
-                <a:solidFill>
-                  <a:srgbClr val="0000FF"/>
-                </a:solidFill>
-                <a:latin typeface="Consolas" panose="020B0609020204030204" pitchFamily="49" charset="0"/>
-              </a:rPr>
-              <a:t>let</a:t>
-            </a:r>
-            <a:r>
-              <a:rPr lang="en-US" sz="2400" dirty="0">
-                <a:solidFill>
-                  <a:srgbClr val="000000"/>
-                </a:solidFill>
-                <a:latin typeface="Consolas" panose="020B0609020204030204" pitchFamily="49" charset="0"/>
-              </a:rPr>
-              <a:t> </a:t>
-            </a:r>
-            <a:r>
-              <a:rPr lang="en-US" sz="2400" dirty="0" err="1">
-                <a:solidFill>
-                  <a:srgbClr val="000000"/>
-                </a:solidFill>
-                <a:latin typeface="Consolas" panose="020B0609020204030204" pitchFamily="49" charset="0"/>
-              </a:rPr>
-              <a:t>salesPrice</a:t>
-            </a:r>
-            <a:r>
-              <a:rPr lang="en-US" sz="2400" dirty="0">
-                <a:solidFill>
-                  <a:srgbClr val="000000"/>
-                </a:solidFill>
-                <a:latin typeface="Consolas" panose="020B0609020204030204" pitchFamily="49" charset="0"/>
-              </a:rPr>
-              <a:t> = </a:t>
-            </a:r>
-            <a:r>
-              <a:rPr lang="en-US" sz="2400" dirty="0" err="1">
-                <a:solidFill>
-                  <a:srgbClr val="000000"/>
-                </a:solidFill>
-                <a:latin typeface="Consolas" panose="020B0609020204030204" pitchFamily="49" charset="0"/>
-              </a:rPr>
-              <a:t>netPrice</a:t>
-            </a:r>
-            <a:r>
-              <a:rPr lang="en-US" sz="2400" dirty="0">
-                <a:solidFill>
-                  <a:srgbClr val="000000"/>
-                </a:solidFill>
-                <a:latin typeface="Consolas" panose="020B0609020204030204" pitchFamily="49" charset="0"/>
-              </a:rPr>
-              <a:t> * </a:t>
-            </a:r>
-            <a:r>
-              <a:rPr lang="en-US" sz="2400" dirty="0" err="1">
-                <a:solidFill>
-                  <a:srgbClr val="000000"/>
-                </a:solidFill>
-                <a:latin typeface="Consolas" panose="020B0609020204030204" pitchFamily="49" charset="0"/>
-              </a:rPr>
-              <a:t>salesTaxRate</a:t>
-            </a:r>
-            <a:endParaRPr lang="en-US" sz="2400" b="0" dirty="0">
-              <a:solidFill>
-                <a:srgbClr val="000000"/>
-              </a:solidFill>
-              <a:effectLst/>
-              <a:latin typeface="Consolas" panose="020B0609020204030204" pitchFamily="49" charset="0"/>
-            </a:endParaRPr>
-          </a:p>
-        </p:txBody>
-      </p:sp>
-      <p:sp>
-        <p:nvSpPr>
-          <p:cNvPr id="7" name="AutoShape 4">
-            <a:extLst>
-              <a:ext uri="{FF2B5EF4-FFF2-40B4-BE49-F238E27FC236}">
-                <a16:creationId xmlns:a16="http://schemas.microsoft.com/office/drawing/2014/main" id="{FD331EB5-169C-42E5-B9CC-13F6AE91D8EF}"/>
-              </a:ext>
-            </a:extLst>
-          </p:cNvPr>
-          <p:cNvSpPr>
-            <a:spLocks/>
-          </p:cNvSpPr>
-          <p:nvPr/>
-        </p:nvSpPr>
-        <p:spPr bwMode="auto">
-          <a:xfrm rot="10800000" flipH="1">
-            <a:off x="3511721" y="3190466"/>
-            <a:ext cx="642938" cy="649572"/>
-          </a:xfrm>
-          <a:custGeom>
-            <a:avLst/>
-            <a:gdLst>
-              <a:gd name="T0" fmla="*/ 10800 w 21600"/>
-              <a:gd name="T1" fmla="*/ 10800 h 21600"/>
-              <a:gd name="T2" fmla="*/ 10800 w 21600"/>
-              <a:gd name="T3" fmla="*/ 10800 h 21600"/>
-              <a:gd name="T4" fmla="*/ 10800 w 21600"/>
-              <a:gd name="T5" fmla="*/ 10800 h 21600"/>
-              <a:gd name="T6" fmla="*/ 10800 w 21600"/>
-              <a:gd name="T7" fmla="*/ 10800 h 21600"/>
-            </a:gdLst>
-            <a:ahLst/>
-            <a:cxnLst>
-              <a:cxn ang="0">
-                <a:pos x="T0" y="T1"/>
-              </a:cxn>
-              <a:cxn ang="0">
-                <a:pos x="T2" y="T3"/>
-              </a:cxn>
-              <a:cxn ang="0">
-                <a:pos x="T4" y="T5"/>
-              </a:cxn>
-              <a:cxn ang="0">
-                <a:pos x="T6" y="T7"/>
-              </a:cxn>
-            </a:cxnLst>
-            <a:rect l="0" t="0" r="r" b="b"/>
-            <a:pathLst>
-              <a:path w="21600" h="21600">
-                <a:moveTo>
-                  <a:pt x="0" y="21600"/>
-                </a:moveTo>
-                <a:lnTo>
-                  <a:pt x="21600" y="21600"/>
-                </a:lnTo>
-                <a:lnTo>
-                  <a:pt x="10800" y="0"/>
-                </a:lnTo>
-                <a:close/>
-              </a:path>
-            </a:pathLst>
-          </a:custGeom>
-          <a:blipFill dpi="0" rotWithShape="0">
-            <a:blip r:embed="rId2"/>
-            <a:srcRect/>
-            <a:tile tx="0" ty="0" sx="100000" sy="100000" flip="none" algn="tl"/>
-          </a:blipFill>
-          <a:ln w="25400" cap="flat" cmpd="sng">
-            <a:solidFill>
-              <a:srgbClr val="000000"/>
-            </a:solidFill>
-            <a:prstDash val="solid"/>
-            <a:miter lim="400000"/>
-            <a:headEnd type="none" w="med" len="med"/>
-            <a:tailEnd type="none" w="med" len="med"/>
-          </a:ln>
-          <a:effectLst/>
-          <a:extLst>
-            <a:ext uri="{AF507438-7753-43E0-B8FC-AC1667EBCBE1}">
-              <a14:hiddenEffects xmlns:a14="http://schemas.microsoft.com/office/drawing/2010/main">
-                <a:effectLst>
-                  <a:outerShdw dist="35921" dir="2700000" algn="ctr" rotWithShape="0">
-                    <a:srgbClr val="808080"/>
-                  </a:outerShdw>
-                </a:effectLst>
-              </a14:hiddenEffects>
-            </a:ext>
-          </a:extLst>
-        </p:spPr>
-        <p:txBody>
-          <a:bodyPr lIns="35719" tIns="35719" rIns="35719" bIns="35719" anchor="ctr"/>
-          <a:lstStyle/>
-          <a:p>
-            <a:endParaRPr lang="en-US" altLang="en-US" sz="2812">
-              <a:solidFill>
-                <a:srgbClr val="FFFFFF"/>
-              </a:solidFill>
-              <a:effectLst>
-                <a:outerShdw blurRad="38100" dist="38100" dir="2700000" algn="tl">
-                  <a:srgbClr val="C0C0C0"/>
-                </a:outerShdw>
-              </a:effectLst>
-              <a:latin typeface="Gill Sans" charset="0"/>
-              <a:ea typeface="Gill Sans" charset="0"/>
-              <a:cs typeface="Gill Sans" charset="0"/>
-              <a:sym typeface="Gill Sans" charset="0"/>
-            </a:endParaRPr>
-          </a:p>
-        </p:txBody>
-      </p:sp>
-      <p:sp>
-        <p:nvSpPr>
-          <p:cNvPr id="8" name="TextBox 7">
-            <a:extLst>
-              <a:ext uri="{FF2B5EF4-FFF2-40B4-BE49-F238E27FC236}">
-                <a16:creationId xmlns:a16="http://schemas.microsoft.com/office/drawing/2014/main" id="{A5566C5A-2723-4BE1-800E-C3B7684AFE6C}"/>
-              </a:ext>
-            </a:extLst>
-          </p:cNvPr>
-          <p:cNvSpPr txBox="1"/>
-          <p:nvPr/>
-        </p:nvSpPr>
-        <p:spPr>
-          <a:xfrm>
-            <a:off x="7556804" y="1689867"/>
-            <a:ext cx="4106486" cy="1325563"/>
-          </a:xfrm>
-          <a:prstGeom prst="rect">
-            <a:avLst/>
-          </a:prstGeom>
-          <a:solidFill>
-            <a:schemeClr val="accent2">
-              <a:lumMod val="20000"/>
-              <a:lumOff val="80000"/>
-            </a:schemeClr>
-          </a:solidFill>
-          <a:ln>
-            <a:solidFill>
-              <a:srgbClr val="0070C0"/>
-            </a:solidFill>
-          </a:ln>
-        </p:spPr>
-        <p:style>
-          <a:lnRef idx="2">
-            <a:schemeClr val="accent1">
-              <a:shade val="50000"/>
-            </a:schemeClr>
-          </a:lnRef>
-          <a:fillRef idx="1">
-            <a:schemeClr val="accent1"/>
-          </a:fillRef>
-          <a:effectRef idx="0">
-            <a:schemeClr val="accent1"/>
-          </a:effectRef>
-          <a:fontRef idx="minor">
-            <a:schemeClr val="lt1"/>
-          </a:fontRef>
-        </p:style>
-        <p:txBody>
-          <a:bodyPr rot="0" spcFirstLastPara="0" vertOverflow="overflow" horzOverflow="overflow" vert="horz" wrap="square" lIns="91440" tIns="45720" rIns="91440" bIns="45720" numCol="1" spcCol="0" rtlCol="0" fromWordArt="0" anchor="ctr" anchorCtr="0" forceAA="0" compatLnSpc="1">
-            <a:prstTxWarp prst="textNoShape">
-              <a:avLst/>
-            </a:prstTxWarp>
-            <a:noAutofit/>
-          </a:bodyPr>
-          <a:lstStyle>
-            <a:defPPr>
-              <a:defRPr lang="en-US"/>
-            </a:defPPr>
-            <a:lvl1pPr>
-              <a:defRPr sz="2400" b="1">
-                <a:latin typeface="Ink Free" panose="03080402000500000000" pitchFamily="66" charset="0"/>
-              </a:defRPr>
-            </a:lvl1pPr>
-            <a:lvl2pPr>
-              <a:defRPr>
-                <a:solidFill>
-                  <a:schemeClr val="lt1"/>
-                </a:solidFill>
-              </a:defRPr>
-            </a:lvl2pPr>
-            <a:lvl3pPr>
-              <a:defRPr>
-                <a:solidFill>
-                  <a:schemeClr val="lt1"/>
-                </a:solidFill>
-              </a:defRPr>
-            </a:lvl3pPr>
-            <a:lvl4pPr>
-              <a:defRPr>
-                <a:solidFill>
-                  <a:schemeClr val="lt1"/>
-                </a:solidFill>
-              </a:defRPr>
-            </a:lvl4pPr>
-            <a:lvl5pPr>
-              <a:defRPr>
-                <a:solidFill>
-                  <a:schemeClr val="lt1"/>
-                </a:solidFill>
-              </a:defRPr>
-            </a:lvl5pPr>
-            <a:lvl6pPr>
-              <a:defRPr>
-                <a:solidFill>
-                  <a:schemeClr val="lt1"/>
-                </a:solidFill>
-              </a:defRPr>
-            </a:lvl6pPr>
-            <a:lvl7pPr>
-              <a:defRPr>
-                <a:solidFill>
-                  <a:schemeClr val="lt1"/>
-                </a:solidFill>
-              </a:defRPr>
-            </a:lvl7pPr>
-            <a:lvl8pPr>
-              <a:defRPr>
-                <a:solidFill>
-                  <a:schemeClr val="lt1"/>
-                </a:solidFill>
-              </a:defRPr>
-            </a:lvl8pPr>
-            <a:lvl9pPr>
-              <a:defRPr>
-                <a:solidFill>
-                  <a:schemeClr val="lt1"/>
-                </a:solidFill>
-              </a:defRPr>
-            </a:lvl9pPr>
-          </a:lstStyle>
-          <a:p>
-            <a:r>
-              <a:rPr lang="en-US" dirty="0">
-                <a:solidFill>
-                  <a:schemeClr val="tx1"/>
-                </a:solidFill>
-              </a:rPr>
-              <a:t>Where did that 1.06 come from?</a:t>
-            </a:r>
-          </a:p>
-        </p:txBody>
-      </p:sp>
-      <p:sp>
-        <p:nvSpPr>
-          <p:cNvPr id="9" name="TextBox 8">
-            <a:extLst>
-              <a:ext uri="{FF2B5EF4-FFF2-40B4-BE49-F238E27FC236}">
-                <a16:creationId xmlns:a16="http://schemas.microsoft.com/office/drawing/2014/main" id="{3B942932-185F-4F3B-B0CC-A71E9E5DF034}"/>
-              </a:ext>
-            </a:extLst>
-          </p:cNvPr>
-          <p:cNvSpPr txBox="1"/>
-          <p:nvPr/>
-        </p:nvSpPr>
-        <p:spPr>
-          <a:xfrm>
-            <a:off x="8053755" y="3305885"/>
-            <a:ext cx="4106486" cy="2735320"/>
-          </a:xfrm>
-          <a:prstGeom prst="rect">
-            <a:avLst/>
-          </a:prstGeom>
-          <a:solidFill>
-            <a:schemeClr val="accent2">
-              <a:lumMod val="20000"/>
-              <a:lumOff val="80000"/>
-            </a:schemeClr>
-          </a:solidFill>
-          <a:ln>
-            <a:solidFill>
-              <a:srgbClr val="0070C0"/>
-            </a:solidFill>
-          </a:ln>
-        </p:spPr>
-        <p:style>
-          <a:lnRef idx="2">
-            <a:schemeClr val="accent1">
-              <a:shade val="50000"/>
-            </a:schemeClr>
-          </a:lnRef>
-          <a:fillRef idx="1">
-            <a:schemeClr val="accent1"/>
-          </a:fillRef>
-          <a:effectRef idx="0">
-            <a:schemeClr val="accent1"/>
-          </a:effectRef>
-          <a:fontRef idx="minor">
-            <a:schemeClr val="lt1"/>
-          </a:fontRef>
-        </p:style>
-        <p:txBody>
-          <a:bodyPr rot="0" spcFirstLastPara="0" vertOverflow="overflow" horzOverflow="overflow" vert="horz" wrap="square" lIns="91440" tIns="45720" rIns="91440" bIns="45720" numCol="1" spcCol="0" rtlCol="0" fromWordArt="0" anchor="ctr" anchorCtr="0" forceAA="0" compatLnSpc="1">
-            <a:prstTxWarp prst="textNoShape">
-              <a:avLst/>
-            </a:prstTxWarp>
-            <a:noAutofit/>
-          </a:bodyPr>
-          <a:lstStyle>
-            <a:defPPr>
-              <a:defRPr lang="en-US"/>
-            </a:defPPr>
-            <a:lvl1pPr>
-              <a:defRPr sz="2400" b="1">
-                <a:latin typeface="Ink Free" panose="03080402000500000000" pitchFamily="66" charset="0"/>
-              </a:defRPr>
-            </a:lvl1pPr>
-            <a:lvl2pPr>
-              <a:defRPr>
-                <a:solidFill>
-                  <a:schemeClr val="lt1"/>
-                </a:solidFill>
-              </a:defRPr>
-            </a:lvl2pPr>
-            <a:lvl3pPr>
-              <a:defRPr>
-                <a:solidFill>
-                  <a:schemeClr val="lt1"/>
-                </a:solidFill>
-              </a:defRPr>
-            </a:lvl3pPr>
-            <a:lvl4pPr>
-              <a:defRPr>
-                <a:solidFill>
-                  <a:schemeClr val="lt1"/>
-                </a:solidFill>
-              </a:defRPr>
-            </a:lvl4pPr>
-            <a:lvl5pPr>
-              <a:defRPr>
-                <a:solidFill>
-                  <a:schemeClr val="lt1"/>
-                </a:solidFill>
-              </a:defRPr>
-            </a:lvl5pPr>
-            <a:lvl6pPr>
-              <a:defRPr>
-                <a:solidFill>
-                  <a:schemeClr val="lt1"/>
-                </a:solidFill>
-              </a:defRPr>
-            </a:lvl6pPr>
-            <a:lvl7pPr>
-              <a:defRPr>
-                <a:solidFill>
-                  <a:schemeClr val="lt1"/>
-                </a:solidFill>
-              </a:defRPr>
-            </a:lvl7pPr>
-            <a:lvl8pPr>
-              <a:defRPr>
-                <a:solidFill>
-                  <a:schemeClr val="lt1"/>
-                </a:solidFill>
-              </a:defRPr>
-            </a:lvl8pPr>
-            <a:lvl9pPr>
-              <a:defRPr>
-                <a:solidFill>
-                  <a:schemeClr val="lt1"/>
-                </a:solidFill>
-              </a:defRPr>
-            </a:lvl9pPr>
-          </a:lstStyle>
-          <a:p>
-            <a:r>
-              <a:rPr lang="en-US" dirty="0">
-                <a:solidFill>
-                  <a:schemeClr val="tx1"/>
-                </a:solidFill>
-              </a:rPr>
-              <a:t>Oh, it's the sales tax?  Are there many occurrences of that 1.06 in your code? (Probably!) Will the sales tax rate ever change? (Probably!)</a:t>
-            </a:r>
-          </a:p>
-          <a:p>
-            <a:endParaRPr lang="en-US" dirty="0">
-              <a:solidFill>
-                <a:schemeClr val="tx1"/>
-              </a:solidFill>
-            </a:endParaRPr>
-          </a:p>
-          <a:p>
-            <a:r>
-              <a:rPr lang="en-US" dirty="0">
-                <a:solidFill>
-                  <a:schemeClr val="tx1"/>
-                </a:solidFill>
-              </a:rPr>
-              <a:t>Let's fix it!</a:t>
-            </a:r>
-          </a:p>
-        </p:txBody>
-      </p:sp>
-      <p:sp>
-        <p:nvSpPr>
-          <p:cNvPr id="10" name="Rectangle 9">
-            <a:extLst>
-              <a:ext uri="{FF2B5EF4-FFF2-40B4-BE49-F238E27FC236}">
-                <a16:creationId xmlns:a16="http://schemas.microsoft.com/office/drawing/2014/main" id="{6050C85E-D369-42A5-BF5F-D710CEBA79BF}"/>
-              </a:ext>
-            </a:extLst>
-          </p:cNvPr>
-          <p:cNvSpPr/>
-          <p:nvPr/>
-        </p:nvSpPr>
-        <p:spPr>
-          <a:xfrm>
-            <a:off x="1106659" y="2192248"/>
-            <a:ext cx="4237057" cy="369332"/>
-          </a:xfrm>
-          <a:prstGeom prst="rect">
-            <a:avLst/>
-          </a:prstGeom>
-        </p:spPr>
-        <p:txBody>
-          <a:bodyPr wrap="none">
-            <a:spAutoFit/>
-          </a:bodyPr>
-          <a:lstStyle/>
-          <a:p>
-            <a:r>
-              <a:rPr lang="en-US" dirty="0">
-                <a:solidFill>
-                  <a:srgbClr val="0000FF"/>
-                </a:solidFill>
-                <a:latin typeface="Consolas" panose="020B0609020204030204" pitchFamily="49" charset="0"/>
-              </a:rPr>
-              <a:t>let</a:t>
-            </a:r>
-            <a:r>
-              <a:rPr lang="en-US" dirty="0">
-                <a:solidFill>
-                  <a:srgbClr val="000000"/>
-                </a:solidFill>
-                <a:latin typeface="Consolas" panose="020B0609020204030204" pitchFamily="49" charset="0"/>
-              </a:rPr>
-              <a:t> </a:t>
-            </a:r>
-            <a:r>
-              <a:rPr lang="en-US" dirty="0" err="1">
-                <a:solidFill>
-                  <a:srgbClr val="000000"/>
-                </a:solidFill>
-                <a:latin typeface="Consolas" panose="020B0609020204030204" pitchFamily="49" charset="0"/>
-              </a:rPr>
-              <a:t>salesprice</a:t>
-            </a:r>
-            <a:r>
-              <a:rPr lang="en-US" dirty="0">
-                <a:solidFill>
-                  <a:srgbClr val="000000"/>
-                </a:solidFill>
-                <a:latin typeface="Consolas" panose="020B0609020204030204" pitchFamily="49" charset="0"/>
-              </a:rPr>
-              <a:t> = </a:t>
-            </a:r>
-            <a:r>
-              <a:rPr lang="en-US" dirty="0" err="1">
-                <a:solidFill>
-                  <a:srgbClr val="000000"/>
-                </a:solidFill>
-                <a:latin typeface="Consolas" panose="020B0609020204030204" pitchFamily="49" charset="0"/>
-              </a:rPr>
-              <a:t>netPrice</a:t>
-            </a:r>
-            <a:r>
-              <a:rPr lang="en-US" dirty="0">
-                <a:solidFill>
-                  <a:srgbClr val="000000"/>
-                </a:solidFill>
-                <a:latin typeface="Consolas" panose="020B0609020204030204" pitchFamily="49" charset="0"/>
-              </a:rPr>
-              <a:t> * </a:t>
-            </a:r>
-            <a:r>
-              <a:rPr lang="en-US" dirty="0">
-                <a:solidFill>
-                  <a:srgbClr val="098658"/>
-                </a:solidFill>
-                <a:latin typeface="Consolas" panose="020B0609020204030204" pitchFamily="49" charset="0"/>
-              </a:rPr>
-              <a:t>1.06</a:t>
-            </a:r>
-            <a:endParaRPr lang="en-US" b="0" dirty="0">
-              <a:solidFill>
-                <a:srgbClr val="000000"/>
-              </a:solidFill>
-              <a:effectLst/>
-              <a:latin typeface="Consolas" panose="020B0609020204030204" pitchFamily="49" charset="0"/>
-            </a:endParaRPr>
-          </a:p>
-        </p:txBody>
-      </p:sp>
-    </p:spTree>
-    <p:extLst>
-      <p:ext uri="{BB962C8B-B14F-4D97-AF65-F5344CB8AC3E}">
-        <p14:creationId xmlns:p14="http://schemas.microsoft.com/office/powerpoint/2010/main" val="4128917540"/>
-      </p:ext>
-    </p:extLst>
-  </p:cSld>
-  <p:clrMapOvr>
-    <a:masterClrMapping/>
-  </p:clrMapOvr>
-  <p:timing>
-    <p:tnLst>
-      <p:par>
-        <p:cTn id="1" dur="indefinite" restart="never" nodeType="tmRoot">
-          <p:childTnLst>
-            <p:seq concurrent="1" nextAc="seek">
-              <p:cTn id="2" dur="indefinite" nodeType="mainSeq">
-                <p:childTnLst>
-                  <p:par>
-                    <p:cTn id="3" fill="hold">
-                      <p:stCondLst>
-                        <p:cond delay="indefinite"/>
-                      </p:stCondLst>
-                      <p:childTnLst>
-                        <p:par>
-                          <p:cTn id="4" fill="hold">
-                            <p:stCondLst>
-                              <p:cond delay="0"/>
-                            </p:stCondLst>
-                            <p:childTnLst>
-                              <p:par>
-                                <p:cTn id="5" presetID="1" presetClass="entr" presetSubtype="0" fill="hold" grpId="0" nodeType="clickEffect">
-                                  <p:stCondLst>
-                                    <p:cond delay="0"/>
-                                  </p:stCondLst>
-                                  <p:childTnLst>
-                                    <p:set>
-                                      <p:cBhvr>
-                                        <p:cTn id="6" dur="1" fill="hold">
-                                          <p:stCondLst>
-                                            <p:cond delay="0"/>
-                                          </p:stCondLst>
-                                        </p:cTn>
-                                        <p:tgtEl>
-                                          <p:spTgt spid="8"/>
-                                        </p:tgtEl>
-                                        <p:attrNameLst>
-                                          <p:attrName>style.visibility</p:attrName>
-                                        </p:attrNameLst>
-                                      </p:cBhvr>
-                                      <p:to>
-                                        <p:strVal val="visible"/>
-                                      </p:to>
-                                    </p:set>
-                                  </p:childTnLst>
-                                </p:cTn>
-                              </p:par>
-                            </p:childTnLst>
-                          </p:cTn>
-                        </p:par>
-                      </p:childTnLst>
-                    </p:cTn>
-                  </p:par>
-                  <p:par>
-                    <p:cTn id="7" fill="hold">
-                      <p:stCondLst>
-                        <p:cond delay="indefinite"/>
-                      </p:stCondLst>
-                      <p:childTnLst>
-                        <p:par>
-                          <p:cTn id="8" fill="hold">
-                            <p:stCondLst>
-                              <p:cond delay="0"/>
-                            </p:stCondLst>
-                            <p:childTnLst>
-                              <p:par>
-                                <p:cTn id="9" presetID="1" presetClass="entr" presetSubtype="0" fill="hold" grpId="0" nodeType="clickEffect">
-                                  <p:stCondLst>
-                                    <p:cond delay="0"/>
-                                  </p:stCondLst>
-                                  <p:childTnLst>
-                                    <p:set>
-                                      <p:cBhvr>
-                                        <p:cTn id="10" dur="1" fill="hold">
-                                          <p:stCondLst>
-                                            <p:cond delay="0"/>
-                                          </p:stCondLst>
-                                        </p:cTn>
-                                        <p:tgtEl>
-                                          <p:spTgt spid="9"/>
-                                        </p:tgtEl>
-                                        <p:attrNameLst>
-                                          <p:attrName>style.visibility</p:attrName>
-                                        </p:attrNameLst>
-                                      </p:cBhvr>
-                                      <p:to>
-                                        <p:strVal val="visible"/>
-                                      </p:to>
-                                    </p:set>
-                                  </p:childTnLst>
-                                </p:cTn>
-                              </p:par>
-                            </p:childTnLst>
-                          </p:cTn>
-                        </p:par>
-                      </p:childTnLst>
-                    </p:cTn>
-                  </p:par>
-                  <p:par>
-                    <p:cTn id="11" fill="hold">
-                      <p:stCondLst>
-                        <p:cond delay="indefinite"/>
-                      </p:stCondLst>
-                      <p:childTnLst>
-                        <p:par>
-                          <p:cTn id="12" fill="hold">
-                            <p:stCondLst>
-                              <p:cond delay="0"/>
-                            </p:stCondLst>
-                            <p:childTnLst>
-                              <p:par>
-                                <p:cTn id="13" presetID="22" presetClass="entr" presetSubtype="1" fill="hold" grpId="0" nodeType="clickEffect">
-                                  <p:stCondLst>
-                                    <p:cond delay="0"/>
-                                  </p:stCondLst>
-                                  <p:childTnLst>
-                                    <p:set>
-                                      <p:cBhvr>
-                                        <p:cTn id="14" dur="1" fill="hold">
-                                          <p:stCondLst>
-                                            <p:cond delay="0"/>
-                                          </p:stCondLst>
-                                        </p:cTn>
-                                        <p:tgtEl>
-                                          <p:spTgt spid="7"/>
-                                        </p:tgtEl>
-                                        <p:attrNameLst>
-                                          <p:attrName>style.visibility</p:attrName>
-                                        </p:attrNameLst>
-                                      </p:cBhvr>
-                                      <p:to>
-                                        <p:strVal val="visible"/>
-                                      </p:to>
-                                    </p:set>
-                                    <p:animEffect transition="in" filter="wipe(up)">
-                                      <p:cBhvr>
-                                        <p:cTn id="15" dur="500"/>
-                                        <p:tgtEl>
-                                          <p:spTgt spid="7"/>
-                                        </p:tgtEl>
-                                      </p:cBhvr>
-                                    </p:animEffect>
-                                  </p:childTnLst>
-                                </p:cTn>
-                              </p:par>
-                            </p:childTnLst>
-                          </p:cTn>
-                        </p:par>
-                        <p:par>
-                          <p:cTn id="16" fill="hold">
-                            <p:stCondLst>
-                              <p:cond delay="500"/>
-                            </p:stCondLst>
-                            <p:childTnLst>
-                              <p:par>
-                                <p:cTn id="17" presetID="10" presetClass="entr" presetSubtype="0" fill="hold" grpId="0" nodeType="afterEffect">
-                                  <p:stCondLst>
-                                    <p:cond delay="0"/>
-                                  </p:stCondLst>
-                                  <p:childTnLst>
-                                    <p:set>
-                                      <p:cBhvr>
-                                        <p:cTn id="18" dur="1" fill="hold">
-                                          <p:stCondLst>
-                                            <p:cond delay="0"/>
-                                          </p:stCondLst>
-                                        </p:cTn>
-                                        <p:tgtEl>
-                                          <p:spTgt spid="6"/>
-                                        </p:tgtEl>
-                                        <p:attrNameLst>
-                                          <p:attrName>style.visibility</p:attrName>
-                                        </p:attrNameLst>
-                                      </p:cBhvr>
-                                      <p:to>
-                                        <p:strVal val="visible"/>
-                                      </p:to>
-                                    </p:set>
-                                    <p:animEffect transition="in" filter="fade">
-                                      <p:cBhvr>
-                                        <p:cTn id="19" dur="500"/>
-                                        <p:tgtEl>
-                                          <p:spTgt spid="6"/>
-                                        </p:tgtEl>
-                                      </p:cBhvr>
-                                    </p:animEffect>
-                                  </p:childTnLst>
-                                </p:cTn>
-                              </p:par>
-                            </p:childTnLst>
-                          </p:cTn>
-                        </p:par>
-                      </p:childTnLst>
-                    </p:cTn>
-                  </p:par>
-                </p:childTnLst>
-              </p:cTn>
-              <p:prevCondLst>
-                <p:cond evt="onPrev" delay="0">
-                  <p:tgtEl>
-                    <p:sldTgt/>
-                  </p:tgtEl>
-                </p:cond>
-              </p:prevCondLst>
-              <p:nextCondLst>
-                <p:cond evt="onNext" delay="0">
-                  <p:tgtEl>
-                    <p:sldTgt/>
-                  </p:tgtEl>
-                </p:cond>
-              </p:nextCondLst>
-            </p:seq>
-          </p:childTnLst>
-        </p:cTn>
-      </p:par>
-    </p:tnLst>
-    <p:bldLst>
-      <p:bldP spid="6" grpId="0"/>
-      <p:bldP spid="7" grpId="0" animBg="1" autoUpdateAnimBg="0"/>
-      <p:bldP spid="8" grpId="0" animBg="1"/>
-      <p:bldP spid="9" grpId="0" animBg="1"/>
-    </p:bldLst>
-  </p:timing>
-</p:sld>
-</file>
-
-<file path=ppt/slides/slide11.xml><?xml version="1.0" encoding="utf-8"?>
-<p:sld xmlns:a="http://schemas.openxmlformats.org/drawingml/2006/main" xmlns:r="http://schemas.openxmlformats.org/officeDocument/2006/relationships" xmlns:p="http://schemas.openxmlformats.org/presentationml/2006/main">
-  <p:cSld>
-    <p:spTree>
-      <p:nvGrpSpPr>
-        <p:cNvPr id="1" name=""/>
-        <p:cNvGrpSpPr/>
-        <p:nvPr/>
-      </p:nvGrpSpPr>
-      <p:grpSpPr>
-        <a:xfrm>
-          <a:off x="0" y="0"/>
-          <a:ext cx="0" cy="0"/>
-          <a:chOff x="0" y="0"/>
-          <a:chExt cx="0" cy="0"/>
-        </a:xfrm>
-      </p:grpSpPr>
-      <p:sp>
-        <p:nvSpPr>
           <p:cNvPr id="26625" name="Rectangle 1">
             <a:extLst>
               <a:ext uri="{FF2B5EF4-FFF2-40B4-BE49-F238E27FC236}">
@@ -5654,7 +4669,7 @@
                 <a:sym typeface="Helvetica Neue" charset="0"/>
               </a:rPr>
               <a:pPr algn="r"/>
-              <a:t>11</a:t>
+              <a:t>10</a:t>
             </a:fld>
             <a:endParaRPr lang="en-US" altLang="en-US" sz="984">
               <a:latin typeface="Helvetica Neue" charset="0"/>
@@ -7408,7 +6423,7 @@
 </p:sld>
 </file>
 
-<file path=ppt/slides/slide12.xml><?xml version="1.0" encoding="utf-8"?>
+<file path=ppt/slides/slide11.xml><?xml version="1.0" encoding="utf-8"?>
 <p:sld xmlns:a="http://schemas.openxmlformats.org/drawingml/2006/main" xmlns:r="http://schemas.openxmlformats.org/officeDocument/2006/relationships" xmlns:p="http://schemas.openxmlformats.org/presentationml/2006/main">
   <p:cSld>
     <p:spTree>
@@ -7635,7 +6650,7 @@
             <a:fld id="{86CB4B4D-7CA3-9044-876B-883B54F8677D}" type="slidenum">
               <a:rPr lang="en-US" smtClean="0"/>
               <a:pPr/>
-              <a:t>12</a:t>
+              <a:t>11</a:t>
             </a:fld>
             <a:endParaRPr lang="en-US">
               <a:sym typeface="Helvetica Neue"/>
@@ -8996,7 +8011,7 @@
 </p:sld>
 </file>
 
-<file path=ppt/slides/slide13.xml><?xml version="1.0" encoding="utf-8"?>
+<file path=ppt/slides/slide12.xml><?xml version="1.0" encoding="utf-8"?>
 <p:sld xmlns:a="http://schemas.openxmlformats.org/drawingml/2006/main" xmlns:r="http://schemas.openxmlformats.org/officeDocument/2006/relationships" xmlns:p="http://schemas.openxmlformats.org/presentationml/2006/main">
   <p:cSld>
     <p:spTree>
@@ -9064,7 +8079,7 @@
           <a:p>
             <a:fld id="{20F37917-FD3A-4669-9018-DA04BCDD3D75}" type="slidenum">
               <a:rPr lang="en-US" smtClean="0"/>
-              <a:t>13</a:t>
+              <a:t>12</a:t>
             </a:fld>
             <a:endParaRPr lang="en-US"/>
           </a:p>
@@ -9799,7 +8814,7 @@
 </p:sld>
 </file>
 
-<file path=ppt/slides/slide14.xml><?xml version="1.0" encoding="utf-8"?>
+<file path=ppt/slides/slide13.xml><?xml version="1.0" encoding="utf-8"?>
 <p:sld xmlns:a="http://schemas.openxmlformats.org/drawingml/2006/main" xmlns:r="http://schemas.openxmlformats.org/officeDocument/2006/relationships" xmlns:p="http://schemas.openxmlformats.org/presentationml/2006/main">
   <p:cSld>
     <p:spTree>
@@ -9924,7 +8939,7 @@
           <a:p>
             <a:fld id="{20F37917-FD3A-4669-9018-DA04BCDD3D75}" type="slidenum">
               <a:rPr lang="en-US" smtClean="0"/>
-              <a:t>14</a:t>
+              <a:t>13</a:t>
             </a:fld>
             <a:endParaRPr lang="en-US"/>
           </a:p>
@@ -10315,6 +9330,187 @@
 </p:sld>
 </file>
 
+<file path=ppt/slides/slide14.xml><?xml version="1.0" encoding="utf-8"?>
+<p:sld xmlns:a="http://schemas.openxmlformats.org/drawingml/2006/main" xmlns:r="http://schemas.openxmlformats.org/officeDocument/2006/relationships" xmlns:p="http://schemas.openxmlformats.org/presentationml/2006/main">
+  <p:cSld>
+    <p:spTree>
+      <p:nvGrpSpPr>
+        <p:cNvPr id="1" name=""/>
+        <p:cNvGrpSpPr/>
+        <p:nvPr/>
+      </p:nvGrpSpPr>
+      <p:grpSpPr>
+        <a:xfrm>
+          <a:off x="0" y="0"/>
+          <a:ext cx="0" cy="0"/>
+          <a:chOff x="0" y="0"/>
+          <a:chExt cx="0" cy="0"/>
+        </a:xfrm>
+      </p:grpSpPr>
+      <p:sp>
+        <p:nvSpPr>
+          <p:cNvPr id="2" name="Title 1">
+            <a:extLst>
+              <a:ext uri="{FF2B5EF4-FFF2-40B4-BE49-F238E27FC236}">
+                <a16:creationId xmlns:a16="http://schemas.microsoft.com/office/drawing/2014/main" id="{80FA64D3-DB18-47AC-A7AB-3A25B3E688CC}"/>
+              </a:ext>
+            </a:extLst>
+          </p:cNvPr>
+          <p:cNvSpPr>
+            <a:spLocks noGrp="1"/>
+          </p:cNvSpPr>
+          <p:nvPr>
+            <p:ph type="title"/>
+          </p:nvPr>
+        </p:nvSpPr>
+        <p:spPr/>
+        <p:txBody>
+          <a:bodyPr/>
+          <a:lstStyle/>
+          <a:p>
+            <a:r>
+              <a:rPr lang="en-US" dirty="0"/>
+              <a:t>Principle 2. Design Your Data</a:t>
+            </a:r>
+          </a:p>
+        </p:txBody>
+      </p:sp>
+      <p:sp>
+        <p:nvSpPr>
+          <p:cNvPr id="3" name="Content Placeholder 2">
+            <a:extLst>
+              <a:ext uri="{FF2B5EF4-FFF2-40B4-BE49-F238E27FC236}">
+                <a16:creationId xmlns:a16="http://schemas.microsoft.com/office/drawing/2014/main" id="{CBA83E90-2199-4165-994B-CEA593C949D8}"/>
+              </a:ext>
+            </a:extLst>
+          </p:cNvPr>
+          <p:cNvSpPr>
+            <a:spLocks noGrp="1"/>
+          </p:cNvSpPr>
+          <p:nvPr>
+            <p:ph idx="1"/>
+          </p:nvPr>
+        </p:nvSpPr>
+        <p:spPr/>
+        <p:txBody>
+          <a:bodyPr/>
+          <a:lstStyle/>
+          <a:p>
+            <a:r>
+              <a:rPr lang="en-US" dirty="0"/>
+              <a:t>You need to do three things:</a:t>
+            </a:r>
+          </a:p>
+          <a:p>
+            <a:pPr marL="914400" lvl="1" indent="-457200">
+              <a:buFont typeface="+mj-lt"/>
+              <a:buAutoNum type="arabicPeriod"/>
+            </a:pPr>
+            <a:r>
+              <a:rPr lang="en-US" dirty="0"/>
+              <a:t>Decide </a:t>
+            </a:r>
+            <a:r>
+              <a:rPr lang="en-US" dirty="0">
+                <a:solidFill>
+                  <a:srgbClr val="FF0000"/>
+                </a:solidFill>
+              </a:rPr>
+              <a:t>what part </a:t>
+            </a:r>
+            <a:r>
+              <a:rPr lang="en-US" dirty="0"/>
+              <a:t>of the information in the "real world" needs to be represented as data</a:t>
+            </a:r>
+          </a:p>
+          <a:p>
+            <a:pPr marL="914400" lvl="1" indent="-457200">
+              <a:buFont typeface="+mj-lt"/>
+              <a:buAutoNum type="arabicPeriod"/>
+            </a:pPr>
+            <a:r>
+              <a:rPr lang="en-US" dirty="0"/>
+              <a:t>Decide </a:t>
+            </a:r>
+            <a:r>
+              <a:rPr lang="en-US" dirty="0">
+                <a:solidFill>
+                  <a:srgbClr val="FF0000"/>
+                </a:solidFill>
+              </a:rPr>
+              <a:t>how</a:t>
+            </a:r>
+            <a:r>
+              <a:rPr lang="en-US" dirty="0"/>
+              <a:t> that information needs to be represented as data</a:t>
+            </a:r>
+          </a:p>
+          <a:p>
+            <a:pPr marL="914400" lvl="1" indent="-457200">
+              <a:buFont typeface="+mj-lt"/>
+              <a:buAutoNum type="arabicPeriod"/>
+            </a:pPr>
+            <a:r>
+              <a:rPr lang="en-US" dirty="0"/>
+              <a:t>Document how to </a:t>
+            </a:r>
+            <a:r>
+              <a:rPr lang="en-US" dirty="0">
+                <a:solidFill>
+                  <a:srgbClr val="FF0000"/>
+                </a:solidFill>
+              </a:rPr>
+              <a:t>interpret</a:t>
+            </a:r>
+            <a:r>
+              <a:rPr lang="en-US" dirty="0"/>
+              <a:t> the data in your computer as information about the real world</a:t>
+            </a:r>
+          </a:p>
+        </p:txBody>
+      </p:sp>
+      <p:sp>
+        <p:nvSpPr>
+          <p:cNvPr id="4" name="Slide Number Placeholder 3">
+            <a:extLst>
+              <a:ext uri="{FF2B5EF4-FFF2-40B4-BE49-F238E27FC236}">
+                <a16:creationId xmlns:a16="http://schemas.microsoft.com/office/drawing/2014/main" id="{4B1E97EA-3784-4131-9864-3DF175ED543D}"/>
+              </a:ext>
+            </a:extLst>
+          </p:cNvPr>
+          <p:cNvSpPr>
+            <a:spLocks noGrp="1"/>
+          </p:cNvSpPr>
+          <p:nvPr>
+            <p:ph type="sldNum" sz="quarter" idx="12"/>
+          </p:nvPr>
+        </p:nvSpPr>
+        <p:spPr/>
+        <p:txBody>
+          <a:bodyPr/>
+          <a:lstStyle/>
+          <a:p>
+            <a:fld id="{20F37917-FD3A-4669-9018-DA04BCDD3D75}" type="slidenum">
+              <a:rPr lang="en-US" smtClean="0"/>
+              <a:t>14</a:t>
+            </a:fld>
+            <a:endParaRPr lang="en-US"/>
+          </a:p>
+        </p:txBody>
+      </p:sp>
+    </p:spTree>
+    <p:extLst>
+      <p:ext uri="{BB962C8B-B14F-4D97-AF65-F5344CB8AC3E}">
+        <p14:creationId xmlns:p14="http://schemas.microsoft.com/office/powerpoint/2010/main" val="1779626391"/>
+      </p:ext>
+    </p:extLst>
+  </p:cSld>
+  <p:clrMapOvr>
+    <a:masterClrMapping/>
+  </p:clrMapOvr>
+</p:sld>
+</file>
+
 <file path=ppt/slides/slide15.xml><?xml version="1.0" encoding="utf-8"?>
 <p:sld xmlns:a="http://schemas.openxmlformats.org/drawingml/2006/main" xmlns:r="http://schemas.openxmlformats.org/officeDocument/2006/relationships" xmlns:p="http://schemas.openxmlformats.org/presentationml/2006/main">
   <p:cSld>
@@ -10337,7 +9533,7 @@
           <p:cNvPr id="2" name="Title 1">
             <a:extLst>
               <a:ext uri="{FF2B5EF4-FFF2-40B4-BE49-F238E27FC236}">
-                <a16:creationId xmlns:a16="http://schemas.microsoft.com/office/drawing/2014/main" id="{80FA64D3-DB18-47AC-A7AB-3A25B3E688CC}"/>
+                <a16:creationId xmlns:a16="http://schemas.microsoft.com/office/drawing/2014/main" id="{05F72AF3-1C1C-4313-978C-8444DAC29385}"/>
               </a:ext>
             </a:extLst>
           </p:cNvPr>
@@ -10355,7 +9551,7 @@
           <a:p>
             <a:r>
               <a:rPr lang="en-US" dirty="0"/>
-              <a:t>Principle 2. Design Your Data</a:t>
+              <a:t>Example:</a:t>
             </a:r>
           </a:p>
         </p:txBody>
@@ -10365,7 +9561,7 @@
           <p:cNvPr id="3" name="Content Placeholder 2">
             <a:extLst>
               <a:ext uri="{FF2B5EF4-FFF2-40B4-BE49-F238E27FC236}">
-                <a16:creationId xmlns:a16="http://schemas.microsoft.com/office/drawing/2014/main" id="{CBA83E90-2199-4165-994B-CEA593C949D8}"/>
+                <a16:creationId xmlns:a16="http://schemas.microsoft.com/office/drawing/2014/main" id="{0E6A7692-0DF3-462C-9CF8-014C7068872C}"/>
               </a:ext>
             </a:extLst>
           </p:cNvPr>
@@ -10383,74 +9579,66 @@
           <a:p>
             <a:r>
               <a:rPr lang="en-US" dirty="0"/>
-              <a:t>You need to do three things:</a:t>
-            </a:r>
-          </a:p>
-          <a:p>
-            <a:pPr marL="914400" lvl="1" indent="-457200">
-              <a:buFont typeface="+mj-lt"/>
-              <a:buAutoNum type="arabicPeriod"/>
-            </a:pPr>
+              <a:t>Right now I am wearing a red shirt, and I've decided I need to represent that fact in my program.</a:t>
+            </a:r>
+          </a:p>
+          <a:p>
             <a:r>
               <a:rPr lang="en-US" dirty="0"/>
-              <a:t>Decide </a:t>
-            </a:r>
-            <a:r>
-              <a:rPr lang="en-US" dirty="0">
-                <a:solidFill>
-                  <a:srgbClr val="FF0000"/>
-                </a:solidFill>
-              </a:rPr>
-              <a:t>what part </a:t>
-            </a:r>
+              <a:t>How should I represent that in my program?</a:t>
+            </a:r>
+          </a:p>
+          <a:p>
             <a:r>
               <a:rPr lang="en-US" dirty="0"/>
-              <a:t>of the information in the "real world" needs to be represented as data</a:t>
-            </a:r>
-          </a:p>
-          <a:p>
-            <a:pPr marL="914400" lvl="1" indent="-457200">
-              <a:buFont typeface="+mj-lt"/>
-              <a:buAutoNum type="arabicPeriod"/>
-            </a:pPr>
+              <a:t>I need to represent the color red.  Possibilities:</a:t>
+            </a:r>
+          </a:p>
+          <a:p>
+            <a:pPr lvl="1"/>
             <a:r>
               <a:rPr lang="en-US" dirty="0"/>
-              <a:t>Decide </a:t>
-            </a:r>
-            <a:r>
-              <a:rPr lang="en-US" dirty="0">
-                <a:solidFill>
-                  <a:srgbClr val="FF0000"/>
-                </a:solidFill>
-              </a:rPr>
-              <a:t>how</a:t>
-            </a:r>
+              <a:t>"red"  (English text)</a:t>
+            </a:r>
+          </a:p>
+          <a:p>
+            <a:pPr lvl="1"/>
             <a:r>
               <a:rPr lang="en-US" dirty="0"/>
-              <a:t> that information needs to be represented as data</a:t>
-            </a:r>
-          </a:p>
-          <a:p>
-            <a:pPr marL="914400" lvl="1" indent="-457200">
-              <a:buFont typeface="+mj-lt"/>
-              <a:buAutoNum type="arabicPeriod"/>
-            </a:pPr>
+              <a:t>"RED" (English text)</a:t>
+            </a:r>
+          </a:p>
+          <a:p>
+            <a:pPr lvl="1"/>
             <a:r>
               <a:rPr lang="en-US" dirty="0"/>
-              <a:t>Document how to </a:t>
-            </a:r>
-            <a:r>
-              <a:rPr lang="en-US" dirty="0">
-                <a:solidFill>
-                  <a:srgbClr val="FF0000"/>
-                </a:solidFill>
-              </a:rPr>
-              <a:t>interpret</a:t>
+              <a:t>"</a:t>
+            </a:r>
+            <a:r>
+              <a:rPr lang="en-US" dirty="0" err="1"/>
+              <a:t>Lāla</a:t>
             </a:r>
             <a:r>
               <a:rPr lang="en-US" dirty="0"/>
-              <a:t> the data in your computer as information about the real world</a:t>
-            </a:r>
+              <a:t>" (Hindi, according to Google)</a:t>
+            </a:r>
+          </a:p>
+          <a:p>
+            <a:pPr lvl="1"/>
+            <a:r>
+              <a:rPr lang="en-US" dirty="0"/>
+              <a:t>#ff0000</a:t>
+            </a:r>
+          </a:p>
+          <a:p>
+            <a:r>
+              <a:rPr lang="en-US" dirty="0"/>
+              <a:t>I need to represent the fact that red is the color of my shirt.</a:t>
+            </a:r>
+          </a:p>
+          <a:p>
+            <a:pPr lvl="1"/>
+            <a:endParaRPr lang="en-US" dirty="0"/>
           </a:p>
         </p:txBody>
       </p:sp>
@@ -10459,7 +9647,7 @@
           <p:cNvPr id="4" name="Slide Number Placeholder 3">
             <a:extLst>
               <a:ext uri="{FF2B5EF4-FFF2-40B4-BE49-F238E27FC236}">
-                <a16:creationId xmlns:a16="http://schemas.microsoft.com/office/drawing/2014/main" id="{4B1E97EA-3784-4131-9864-3DF175ED543D}"/>
+                <a16:creationId xmlns:a16="http://schemas.microsoft.com/office/drawing/2014/main" id="{7C7AF284-2D91-4988-B282-BC762C4D71F9}"/>
               </a:ext>
             </a:extLst>
           </p:cNvPr>
@@ -10486,7 +9674,7 @@
     </p:spTree>
     <p:extLst>
       <p:ext uri="{BB962C8B-B14F-4D97-AF65-F5344CB8AC3E}">
-        <p14:creationId xmlns:p14="http://schemas.microsoft.com/office/powerpoint/2010/main" val="1779626391"/>
+        <p14:creationId xmlns:p14="http://schemas.microsoft.com/office/powerpoint/2010/main" val="3759591623"/>
       </p:ext>
     </p:extLst>
   </p:cSld>
@@ -10518,7 +9706,7 @@
           <p:cNvPr id="2" name="Title 1">
             <a:extLst>
               <a:ext uri="{FF2B5EF4-FFF2-40B4-BE49-F238E27FC236}">
-                <a16:creationId xmlns:a16="http://schemas.microsoft.com/office/drawing/2014/main" id="{05F72AF3-1C1C-4313-978C-8444DAC29385}"/>
+                <a16:creationId xmlns:a16="http://schemas.microsoft.com/office/drawing/2014/main" id="{2C9E944F-BA6C-40FA-83A7-E0128B217071}"/>
               </a:ext>
             </a:extLst>
           </p:cNvPr>
@@ -10536,7 +9724,7 @@
           <a:p>
             <a:r>
               <a:rPr lang="en-US" dirty="0"/>
-              <a:t>Example:</a:t>
+              <a:t>Example (2)</a:t>
             </a:r>
           </a:p>
         </p:txBody>
@@ -10546,7 +9734,7 @@
           <p:cNvPr id="3" name="Content Placeholder 2">
             <a:extLst>
               <a:ext uri="{FF2B5EF4-FFF2-40B4-BE49-F238E27FC236}">
-                <a16:creationId xmlns:a16="http://schemas.microsoft.com/office/drawing/2014/main" id="{0E6A7692-0DF3-462C-9CF8-014C7068872C}"/>
+                <a16:creationId xmlns:a16="http://schemas.microsoft.com/office/drawing/2014/main" id="{1603AC4A-0826-480B-B9D4-D6CFF76D0D59}"/>
               </a:ext>
             </a:extLst>
           </p:cNvPr>
@@ -10564,66 +9752,20 @@
           <a:p>
             <a:r>
               <a:rPr lang="en-US" dirty="0"/>
-              <a:t>Right now I am wearing a red shirt, and I've decided I need to represent that fact in my program.</a:t>
+              <a:t>Of course, we first need to represent my shirt</a:t>
             </a:r>
           </a:p>
           <a:p>
             <a:r>
               <a:rPr lang="en-US" dirty="0"/>
-              <a:t>How should I represent that in my program?</a:t>
+              <a:t>In that representation, we have to represent its color.</a:t>
             </a:r>
           </a:p>
           <a:p>
             <a:r>
               <a:rPr lang="en-US" dirty="0"/>
-              <a:t>I need to represent the color red.  Possibilities:</a:t>
-            </a:r>
-          </a:p>
-          <a:p>
-            <a:pPr lvl="1"/>
-            <a:r>
-              <a:rPr lang="en-US" dirty="0"/>
-              <a:t>"red"  (English text)</a:t>
-            </a:r>
-          </a:p>
-          <a:p>
-            <a:pPr lvl="1"/>
-            <a:r>
-              <a:rPr lang="en-US" dirty="0"/>
-              <a:t>"RED" (English text)</a:t>
-            </a:r>
-          </a:p>
-          <a:p>
-            <a:pPr lvl="1"/>
-            <a:r>
-              <a:rPr lang="en-US" dirty="0"/>
-              <a:t>"</a:t>
-            </a:r>
-            <a:r>
-              <a:rPr lang="en-US" dirty="0" err="1"/>
-              <a:t>Lāla</a:t>
-            </a:r>
-            <a:r>
-              <a:rPr lang="en-US" dirty="0"/>
-              <a:t>" (Hindi, according to Google)</a:t>
-            </a:r>
-          </a:p>
-          <a:p>
-            <a:pPr lvl="1"/>
-            <a:r>
-              <a:rPr lang="en-US" dirty="0"/>
-              <a:t>#ff0000</a:t>
-            </a:r>
-          </a:p>
-          <a:p>
-            <a:r>
-              <a:rPr lang="en-US" dirty="0"/>
-              <a:t>I need to represent the fact that red is the color of my shirt.</a:t>
-            </a:r>
-          </a:p>
-          <a:p>
-            <a:pPr lvl="1"/>
-            <a:endParaRPr lang="en-US" dirty="0"/>
+              <a:t> Here's one of many possibilities:  </a:t>
+            </a:r>
           </a:p>
         </p:txBody>
       </p:sp>
@@ -10632,7 +9774,7 @@
           <p:cNvPr id="4" name="Slide Number Placeholder 3">
             <a:extLst>
               <a:ext uri="{FF2B5EF4-FFF2-40B4-BE49-F238E27FC236}">
-                <a16:creationId xmlns:a16="http://schemas.microsoft.com/office/drawing/2014/main" id="{7C7AF284-2D91-4988-B282-BC762C4D71F9}"/>
+                <a16:creationId xmlns:a16="http://schemas.microsoft.com/office/drawing/2014/main" id="{D063FA44-B232-43A8-AF1A-A98277A509F2}"/>
               </a:ext>
             </a:extLst>
           </p:cNvPr>
@@ -10656,10 +9798,175 @@
           </a:p>
         </p:txBody>
       </p:sp>
+      <p:sp>
+        <p:nvSpPr>
+          <p:cNvPr id="5" name="Rectangle 4">
+            <a:extLst>
+              <a:ext uri="{FF2B5EF4-FFF2-40B4-BE49-F238E27FC236}">
+                <a16:creationId xmlns:a16="http://schemas.microsoft.com/office/drawing/2014/main" id="{A961705D-35A9-4B62-BCE5-B393D0EFD3FA}"/>
+              </a:ext>
+            </a:extLst>
+          </p:cNvPr>
+          <p:cNvSpPr/>
+          <p:nvPr/>
+        </p:nvSpPr>
+        <p:spPr>
+          <a:xfrm>
+            <a:off x="1943686" y="3675829"/>
+            <a:ext cx="6096000" cy="1477328"/>
+          </a:xfrm>
+          <a:prstGeom prst="rect">
+            <a:avLst/>
+          </a:prstGeom>
+        </p:spPr>
+        <p:txBody>
+          <a:bodyPr>
+            <a:spAutoFit/>
+          </a:bodyPr>
+          <a:lstStyle/>
+          <a:p>
+            <a:r>
+              <a:rPr lang="en-US" dirty="0">
+                <a:solidFill>
+                  <a:srgbClr val="0000FF"/>
+                </a:solidFill>
+                <a:latin typeface="Consolas" panose="020B0609020204030204" pitchFamily="49" charset="0"/>
+              </a:rPr>
+              <a:t>type</a:t>
+            </a:r>
+            <a:r>
+              <a:rPr lang="en-US" dirty="0">
+                <a:solidFill>
+                  <a:srgbClr val="000000"/>
+                </a:solidFill>
+                <a:latin typeface="Consolas" panose="020B0609020204030204" pitchFamily="49" charset="0"/>
+              </a:rPr>
+              <a:t> Shirt {</a:t>
+            </a:r>
+          </a:p>
+          <a:p>
+            <a:r>
+              <a:rPr lang="en-US" dirty="0">
+                <a:solidFill>
+                  <a:srgbClr val="000000"/>
+                </a:solidFill>
+                <a:latin typeface="Consolas" panose="020B0609020204030204" pitchFamily="49" charset="0"/>
+              </a:rPr>
+              <a:t>    color : Color   </a:t>
+            </a:r>
+            <a:r>
+              <a:rPr lang="en-US" dirty="0">
+                <a:solidFill>
+                  <a:srgbClr val="008000"/>
+                </a:solidFill>
+                <a:latin typeface="Consolas" panose="020B0609020204030204" pitchFamily="49" charset="0"/>
+              </a:rPr>
+              <a:t>// the color of the shirt</a:t>
+            </a:r>
+            <a:endParaRPr lang="en-US" dirty="0">
+              <a:solidFill>
+                <a:srgbClr val="000000"/>
+              </a:solidFill>
+              <a:latin typeface="Consolas" panose="020B0609020204030204" pitchFamily="49" charset="0"/>
+            </a:endParaRPr>
+          </a:p>
+          <a:p>
+            <a:r>
+              <a:rPr lang="en-US" dirty="0">
+                <a:solidFill>
+                  <a:srgbClr val="000000"/>
+                </a:solidFill>
+                <a:latin typeface="Consolas" panose="020B0609020204030204" pitchFamily="49" charset="0"/>
+              </a:rPr>
+              <a:t>}</a:t>
+            </a:r>
+          </a:p>
+          <a:p>
+            <a:br>
+              <a:rPr lang="en-US" dirty="0">
+                <a:solidFill>
+                  <a:srgbClr val="000000"/>
+                </a:solidFill>
+                <a:latin typeface="Consolas" panose="020B0609020204030204" pitchFamily="49" charset="0"/>
+              </a:rPr>
+            </a:br>
+            <a:r>
+              <a:rPr lang="en-US" dirty="0">
+                <a:solidFill>
+                  <a:srgbClr val="0000FF"/>
+                </a:solidFill>
+                <a:latin typeface="Consolas" panose="020B0609020204030204" pitchFamily="49" charset="0"/>
+              </a:rPr>
+              <a:t>let</a:t>
+            </a:r>
+            <a:r>
+              <a:rPr lang="en-US" dirty="0">
+                <a:solidFill>
+                  <a:srgbClr val="000000"/>
+                </a:solidFill>
+                <a:latin typeface="Consolas" panose="020B0609020204030204" pitchFamily="49" charset="0"/>
+              </a:rPr>
+              <a:t> </a:t>
+            </a:r>
+            <a:r>
+              <a:rPr lang="en-US" dirty="0" err="1">
+                <a:solidFill>
+                  <a:srgbClr val="000000"/>
+                </a:solidFill>
+                <a:latin typeface="Consolas" panose="020B0609020204030204" pitchFamily="49" charset="0"/>
+              </a:rPr>
+              <a:t>myShirt</a:t>
+            </a:r>
+            <a:r>
+              <a:rPr lang="en-US" dirty="0">
+                <a:solidFill>
+                  <a:srgbClr val="000000"/>
+                </a:solidFill>
+                <a:latin typeface="Consolas" panose="020B0609020204030204" pitchFamily="49" charset="0"/>
+              </a:rPr>
+              <a:t> = {color: </a:t>
+            </a:r>
+            <a:r>
+              <a:rPr lang="en-US" dirty="0">
+                <a:solidFill>
+                  <a:srgbClr val="098658"/>
+                </a:solidFill>
+                <a:latin typeface="Consolas" panose="020B0609020204030204" pitchFamily="49" charset="0"/>
+              </a:rPr>
+              <a:t>0xff000</a:t>
+            </a:r>
+            <a:r>
+              <a:rPr lang="en-US" dirty="0">
+                <a:solidFill>
+                  <a:srgbClr val="000000"/>
+                </a:solidFill>
+                <a:latin typeface="Consolas" panose="020B0609020204030204" pitchFamily="49" charset="0"/>
+              </a:rPr>
+              <a:t>} </a:t>
+            </a:r>
+            <a:r>
+              <a:rPr lang="en-US" dirty="0">
+                <a:solidFill>
+                  <a:srgbClr val="008000"/>
+                </a:solidFill>
+                <a:latin typeface="Consolas" panose="020B0609020204030204" pitchFamily="49" charset="0"/>
+              </a:rPr>
+              <a:t>// my shirt</a:t>
+            </a:r>
+            <a:endParaRPr lang="en-US" b="0" dirty="0">
+              <a:solidFill>
+                <a:srgbClr val="000000"/>
+              </a:solidFill>
+              <a:effectLst/>
+              <a:latin typeface="Consolas" panose="020B0609020204030204" pitchFamily="49" charset="0"/>
+            </a:endParaRPr>
+          </a:p>
+        </p:txBody>
+      </p:sp>
     </p:spTree>
     <p:extLst>
       <p:ext uri="{BB962C8B-B14F-4D97-AF65-F5344CB8AC3E}">
-        <p14:creationId xmlns:p14="http://schemas.microsoft.com/office/powerpoint/2010/main" val="3759591623"/>
+        <p14:creationId xmlns:p14="http://schemas.microsoft.com/office/powerpoint/2010/main" val="3947735393"/>
       </p:ext>
     </p:extLst>
   </p:cSld>
@@ -10688,298 +9995,6 @@
       </p:grpSpPr>
       <p:sp>
         <p:nvSpPr>
-          <p:cNvPr id="2" name="Title 1">
-            <a:extLst>
-              <a:ext uri="{FF2B5EF4-FFF2-40B4-BE49-F238E27FC236}">
-                <a16:creationId xmlns:a16="http://schemas.microsoft.com/office/drawing/2014/main" id="{2C9E944F-BA6C-40FA-83A7-E0128B217071}"/>
-              </a:ext>
-            </a:extLst>
-          </p:cNvPr>
-          <p:cNvSpPr>
-            <a:spLocks noGrp="1"/>
-          </p:cNvSpPr>
-          <p:nvPr>
-            <p:ph type="title"/>
-          </p:nvPr>
-        </p:nvSpPr>
-        <p:spPr/>
-        <p:txBody>
-          <a:bodyPr/>
-          <a:lstStyle/>
-          <a:p>
-            <a:r>
-              <a:rPr lang="en-US" dirty="0"/>
-              <a:t>Example (2)</a:t>
-            </a:r>
-          </a:p>
-        </p:txBody>
-      </p:sp>
-      <p:sp>
-        <p:nvSpPr>
-          <p:cNvPr id="3" name="Content Placeholder 2">
-            <a:extLst>
-              <a:ext uri="{FF2B5EF4-FFF2-40B4-BE49-F238E27FC236}">
-                <a16:creationId xmlns:a16="http://schemas.microsoft.com/office/drawing/2014/main" id="{1603AC4A-0826-480B-B9D4-D6CFF76D0D59}"/>
-              </a:ext>
-            </a:extLst>
-          </p:cNvPr>
-          <p:cNvSpPr>
-            <a:spLocks noGrp="1"/>
-          </p:cNvSpPr>
-          <p:nvPr>
-            <p:ph idx="1"/>
-          </p:nvPr>
-        </p:nvSpPr>
-        <p:spPr/>
-        <p:txBody>
-          <a:bodyPr/>
-          <a:lstStyle/>
-          <a:p>
-            <a:r>
-              <a:rPr lang="en-US" dirty="0"/>
-              <a:t>Of course, we first need to represent my shirt</a:t>
-            </a:r>
-          </a:p>
-          <a:p>
-            <a:r>
-              <a:rPr lang="en-US" dirty="0"/>
-              <a:t>In that representation, we have to represent its color.</a:t>
-            </a:r>
-          </a:p>
-          <a:p>
-            <a:r>
-              <a:rPr lang="en-US" dirty="0"/>
-              <a:t> Here's one of many possibilities:  </a:t>
-            </a:r>
-          </a:p>
-        </p:txBody>
-      </p:sp>
-      <p:sp>
-        <p:nvSpPr>
-          <p:cNvPr id="4" name="Slide Number Placeholder 3">
-            <a:extLst>
-              <a:ext uri="{FF2B5EF4-FFF2-40B4-BE49-F238E27FC236}">
-                <a16:creationId xmlns:a16="http://schemas.microsoft.com/office/drawing/2014/main" id="{D063FA44-B232-43A8-AF1A-A98277A509F2}"/>
-              </a:ext>
-            </a:extLst>
-          </p:cNvPr>
-          <p:cNvSpPr>
-            <a:spLocks noGrp="1"/>
-          </p:cNvSpPr>
-          <p:nvPr>
-            <p:ph type="sldNum" sz="quarter" idx="12"/>
-          </p:nvPr>
-        </p:nvSpPr>
-        <p:spPr/>
-        <p:txBody>
-          <a:bodyPr/>
-          <a:lstStyle/>
-          <a:p>
-            <a:fld id="{20F37917-FD3A-4669-9018-DA04BCDD3D75}" type="slidenum">
-              <a:rPr lang="en-US" smtClean="0"/>
-              <a:t>17</a:t>
-            </a:fld>
-            <a:endParaRPr lang="en-US"/>
-          </a:p>
-        </p:txBody>
-      </p:sp>
-      <p:sp>
-        <p:nvSpPr>
-          <p:cNvPr id="5" name="Rectangle 4">
-            <a:extLst>
-              <a:ext uri="{FF2B5EF4-FFF2-40B4-BE49-F238E27FC236}">
-                <a16:creationId xmlns:a16="http://schemas.microsoft.com/office/drawing/2014/main" id="{A961705D-35A9-4B62-BCE5-B393D0EFD3FA}"/>
-              </a:ext>
-            </a:extLst>
-          </p:cNvPr>
-          <p:cNvSpPr/>
-          <p:nvPr/>
-        </p:nvSpPr>
-        <p:spPr>
-          <a:xfrm>
-            <a:off x="1943686" y="3675829"/>
-            <a:ext cx="6096000" cy="1477328"/>
-          </a:xfrm>
-          <a:prstGeom prst="rect">
-            <a:avLst/>
-          </a:prstGeom>
-        </p:spPr>
-        <p:txBody>
-          <a:bodyPr>
-            <a:spAutoFit/>
-          </a:bodyPr>
-          <a:lstStyle/>
-          <a:p>
-            <a:r>
-              <a:rPr lang="en-US" dirty="0">
-                <a:solidFill>
-                  <a:srgbClr val="0000FF"/>
-                </a:solidFill>
-                <a:latin typeface="Consolas" panose="020B0609020204030204" pitchFamily="49" charset="0"/>
-              </a:rPr>
-              <a:t>type</a:t>
-            </a:r>
-            <a:r>
-              <a:rPr lang="en-US" dirty="0">
-                <a:solidFill>
-                  <a:srgbClr val="000000"/>
-                </a:solidFill>
-                <a:latin typeface="Consolas" panose="020B0609020204030204" pitchFamily="49" charset="0"/>
-              </a:rPr>
-              <a:t> Shirt {</a:t>
-            </a:r>
-          </a:p>
-          <a:p>
-            <a:r>
-              <a:rPr lang="en-US" dirty="0">
-                <a:solidFill>
-                  <a:srgbClr val="000000"/>
-                </a:solidFill>
-                <a:latin typeface="Consolas" panose="020B0609020204030204" pitchFamily="49" charset="0"/>
-              </a:rPr>
-              <a:t>    color : Color   </a:t>
-            </a:r>
-            <a:r>
-              <a:rPr lang="en-US" dirty="0">
-                <a:solidFill>
-                  <a:srgbClr val="008000"/>
-                </a:solidFill>
-                <a:latin typeface="Consolas" panose="020B0609020204030204" pitchFamily="49" charset="0"/>
-              </a:rPr>
-              <a:t>// the color of the shirt</a:t>
-            </a:r>
-            <a:endParaRPr lang="en-US" dirty="0">
-              <a:solidFill>
-                <a:srgbClr val="000000"/>
-              </a:solidFill>
-              <a:latin typeface="Consolas" panose="020B0609020204030204" pitchFamily="49" charset="0"/>
-            </a:endParaRPr>
-          </a:p>
-          <a:p>
-            <a:r>
-              <a:rPr lang="en-US" dirty="0">
-                <a:solidFill>
-                  <a:srgbClr val="000000"/>
-                </a:solidFill>
-                <a:latin typeface="Consolas" panose="020B0609020204030204" pitchFamily="49" charset="0"/>
-              </a:rPr>
-              <a:t>}</a:t>
-            </a:r>
-          </a:p>
-          <a:p>
-            <a:br>
-              <a:rPr lang="en-US" dirty="0">
-                <a:solidFill>
-                  <a:srgbClr val="000000"/>
-                </a:solidFill>
-                <a:latin typeface="Consolas" panose="020B0609020204030204" pitchFamily="49" charset="0"/>
-              </a:rPr>
-            </a:br>
-            <a:r>
-              <a:rPr lang="en-US" dirty="0">
-                <a:solidFill>
-                  <a:srgbClr val="0000FF"/>
-                </a:solidFill>
-                <a:latin typeface="Consolas" panose="020B0609020204030204" pitchFamily="49" charset="0"/>
-              </a:rPr>
-              <a:t>let</a:t>
-            </a:r>
-            <a:r>
-              <a:rPr lang="en-US" dirty="0">
-                <a:solidFill>
-                  <a:srgbClr val="000000"/>
-                </a:solidFill>
-                <a:latin typeface="Consolas" panose="020B0609020204030204" pitchFamily="49" charset="0"/>
-              </a:rPr>
-              <a:t> </a:t>
-            </a:r>
-            <a:r>
-              <a:rPr lang="en-US" dirty="0" err="1">
-                <a:solidFill>
-                  <a:srgbClr val="000000"/>
-                </a:solidFill>
-                <a:latin typeface="Consolas" panose="020B0609020204030204" pitchFamily="49" charset="0"/>
-              </a:rPr>
-              <a:t>myShirt</a:t>
-            </a:r>
-            <a:r>
-              <a:rPr lang="en-US" dirty="0">
-                <a:solidFill>
-                  <a:srgbClr val="000000"/>
-                </a:solidFill>
-                <a:latin typeface="Consolas" panose="020B0609020204030204" pitchFamily="49" charset="0"/>
-              </a:rPr>
-              <a:t> = {color: </a:t>
-            </a:r>
-            <a:r>
-              <a:rPr lang="en-US" dirty="0">
-                <a:solidFill>
-                  <a:srgbClr val="098658"/>
-                </a:solidFill>
-                <a:latin typeface="Consolas" panose="020B0609020204030204" pitchFamily="49" charset="0"/>
-              </a:rPr>
-              <a:t>0xff000</a:t>
-            </a:r>
-            <a:r>
-              <a:rPr lang="en-US" dirty="0">
-                <a:solidFill>
-                  <a:srgbClr val="000000"/>
-                </a:solidFill>
-                <a:latin typeface="Consolas" panose="020B0609020204030204" pitchFamily="49" charset="0"/>
-              </a:rPr>
-              <a:t>} </a:t>
-            </a:r>
-            <a:r>
-              <a:rPr lang="en-US" dirty="0">
-                <a:solidFill>
-                  <a:srgbClr val="008000"/>
-                </a:solidFill>
-                <a:latin typeface="Consolas" panose="020B0609020204030204" pitchFamily="49" charset="0"/>
-              </a:rPr>
-              <a:t>// my shirt</a:t>
-            </a:r>
-            <a:endParaRPr lang="en-US" b="0" dirty="0">
-              <a:solidFill>
-                <a:srgbClr val="000000"/>
-              </a:solidFill>
-              <a:effectLst/>
-              <a:latin typeface="Consolas" panose="020B0609020204030204" pitchFamily="49" charset="0"/>
-            </a:endParaRPr>
-          </a:p>
-        </p:txBody>
-      </p:sp>
-    </p:spTree>
-    <p:extLst>
-      <p:ext uri="{BB962C8B-B14F-4D97-AF65-F5344CB8AC3E}">
-        <p14:creationId xmlns:p14="http://schemas.microsoft.com/office/powerpoint/2010/main" val="3947735393"/>
-      </p:ext>
-    </p:extLst>
-  </p:cSld>
-  <p:clrMapOvr>
-    <a:masterClrMapping/>
-  </p:clrMapOvr>
-</p:sld>
-</file>
-
-<file path=ppt/slides/slide18.xml><?xml version="1.0" encoding="utf-8"?>
-<p:sld xmlns:a="http://schemas.openxmlformats.org/drawingml/2006/main" xmlns:r="http://schemas.openxmlformats.org/officeDocument/2006/relationships" xmlns:p="http://schemas.openxmlformats.org/presentationml/2006/main">
-  <p:cSld>
-    <p:spTree>
-      <p:nvGrpSpPr>
-        <p:cNvPr id="1" name=""/>
-        <p:cNvGrpSpPr/>
-        <p:nvPr/>
-      </p:nvGrpSpPr>
-      <p:grpSpPr>
-        <a:xfrm>
-          <a:off x="0" y="0"/>
-          <a:ext cx="0" cy="0"/>
-          <a:chOff x="0" y="0"/>
-          <a:chExt cx="0" cy="0"/>
-        </a:xfrm>
-      </p:grpSpPr>
-      <p:sp>
-        <p:nvSpPr>
           <p:cNvPr id="7" name="Rounded Rectangle 7">
             <a:extLst>
               <a:ext uri="{FF2B5EF4-FFF2-40B4-BE49-F238E27FC236}">
@@ -11336,7 +10351,7 @@
           <a:p>
             <a:fld id="{20F37917-FD3A-4669-9018-DA04BCDD3D75}" type="slidenum">
               <a:rPr lang="en-US" smtClean="0"/>
-              <a:t>18</a:t>
+              <a:t>17</a:t>
             </a:fld>
             <a:endParaRPr lang="en-US"/>
           </a:p>
@@ -11779,7 +10794,7 @@
 </p:sld>
 </file>
 
-<file path=ppt/slides/slide19.xml><?xml version="1.0" encoding="utf-8"?>
+<file path=ppt/slides/slide18.xml><?xml version="1.0" encoding="utf-8"?>
 <p:sld xmlns:a="http://schemas.openxmlformats.org/drawingml/2006/main" xmlns:r="http://schemas.openxmlformats.org/officeDocument/2006/relationships" xmlns:p="http://schemas.openxmlformats.org/presentationml/2006/main">
   <p:cSld>
     <p:spTree>
@@ -11914,7 +10929,7 @@
           <a:p>
             <a:fld id="{20F37917-FD3A-4669-9018-DA04BCDD3D75}" type="slidenum">
               <a:rPr lang="en-US" smtClean="0"/>
-              <a:t>19</a:t>
+              <a:t>18</a:t>
             </a:fld>
             <a:endParaRPr lang="en-US"/>
           </a:p>
@@ -12082,7 +11097,7 @@
 </p:sld>
 </file>
 
-<file path=ppt/slides/slide2.xml><?xml version="1.0" encoding="utf-8"?>
+<file path=ppt/slides/slide19.xml><?xml version="1.0" encoding="utf-8"?>
 <p:sld xmlns:a="http://schemas.openxmlformats.org/drawingml/2006/main" xmlns:r="http://schemas.openxmlformats.org/officeDocument/2006/relationships" xmlns:p="http://schemas.openxmlformats.org/presentationml/2006/main">
   <p:cSld>
     <p:spTree>
@@ -12104,7 +11119,7 @@
           <p:cNvPr id="2" name="Title 1">
             <a:extLst>
               <a:ext uri="{FF2B5EF4-FFF2-40B4-BE49-F238E27FC236}">
-                <a16:creationId xmlns:a16="http://schemas.microsoft.com/office/drawing/2014/main" id="{B6D33575-0593-49FD-831F-131BB6CC7E6C}"/>
+                <a16:creationId xmlns:a16="http://schemas.microsoft.com/office/drawing/2014/main" id="{37C61C2C-D605-4F46-9A0F-CEEB37527908}"/>
               </a:ext>
             </a:extLst>
           </p:cNvPr>
@@ -12122,17 +11137,17 @@
           <a:p>
             <a:r>
               <a:rPr lang="en-US" dirty="0"/>
-              <a:t>Learning Objectives for this Lesson</a:t>
-            </a:r>
-          </a:p>
-        </p:txBody>
-      </p:sp>
-      <p:sp>
-        <p:nvSpPr>
-          <p:cNvPr id="3" name="Text Placeholder 2">
-            <a:extLst>
-              <a:ext uri="{FF2B5EF4-FFF2-40B4-BE49-F238E27FC236}">
-                <a16:creationId xmlns:a16="http://schemas.microsoft.com/office/drawing/2014/main" id="{5B21ECCD-9823-405F-AA9A-D0CC235AD583}"/>
+              <a:t>Principle 4: Don't Repeat Yourself</a:t>
+            </a:r>
+          </a:p>
+        </p:txBody>
+      </p:sp>
+      <p:sp>
+        <p:nvSpPr>
+          <p:cNvPr id="3" name="Content Placeholder 2">
+            <a:extLst>
+              <a:ext uri="{FF2B5EF4-FFF2-40B4-BE49-F238E27FC236}">
+                <a16:creationId xmlns:a16="http://schemas.microsoft.com/office/drawing/2014/main" id="{3E6DDF18-19A4-4769-930A-E5C27B69F9EE}"/>
               </a:ext>
             </a:extLst>
           </p:cNvPr>
@@ -12150,41 +11165,47 @@
           <a:p>
             <a:r>
               <a:rPr lang="en-US" dirty="0"/>
-              <a:t>By the end of this lesson you should be able to:</a:t>
-            </a:r>
-          </a:p>
-          <a:p>
-            <a:pPr lvl="1" fontAlgn="base"/>
+              <a:t>If you have some quantity that you use more than once, give it a name and use the name.</a:t>
+            </a:r>
+          </a:p>
+          <a:p>
             <a:r>
               <a:rPr lang="en-US" dirty="0"/>
-              <a:t>Describe the purpose of our design principles </a:t>
-            </a:r>
-          </a:p>
-          <a:p>
-            <a:pPr lvl="1" fontAlgn="base"/>
+              <a:t>That way you only need to change it in one place!</a:t>
+            </a:r>
+          </a:p>
+          <a:p>
             <a:r>
               <a:rPr lang="en-US" dirty="0"/>
-              <a:t>List 5 general design principles and illustrate their expression in code</a:t>
-            </a:r>
-          </a:p>
-          <a:p>
-            <a:pPr lvl="1" fontAlgn="base"/>
+              <a:t>And of course you should use a good name</a:t>
+            </a:r>
+          </a:p>
+          <a:p>
             <a:r>
               <a:rPr lang="en-US" dirty="0"/>
-              <a:t>Identify some violations of the principles and suggest ways to mitigate them</a:t>
-            </a:r>
-          </a:p>
-          <a:p>
+              <a:t>If you have some task that you do in many places, make it into a procedure.</a:t>
+            </a:r>
+          </a:p>
+          <a:p>
+            <a:r>
+              <a:rPr lang="en-US" dirty="0"/>
+              <a:t>If the tasks are slightly different, turn the differences into parameters.</a:t>
+            </a:r>
+          </a:p>
+          <a:p>
+            <a:pPr marL="0" indent="0">
+              <a:buNone/>
+            </a:pPr>
             <a:endParaRPr lang="en-US" dirty="0"/>
           </a:p>
         </p:txBody>
       </p:sp>
       <p:sp>
         <p:nvSpPr>
-          <p:cNvPr id="5" name="Slide Number Placeholder 4">
-            <a:extLst>
-              <a:ext uri="{FF2B5EF4-FFF2-40B4-BE49-F238E27FC236}">
-                <a16:creationId xmlns:a16="http://schemas.microsoft.com/office/drawing/2014/main" id="{D3CB1048-3EB8-4281-8361-E7EB70F6FBBC}"/>
+          <p:cNvPr id="4" name="Slide Number Placeholder 3">
+            <a:extLst>
+              <a:ext uri="{FF2B5EF4-FFF2-40B4-BE49-F238E27FC236}">
+                <a16:creationId xmlns:a16="http://schemas.microsoft.com/office/drawing/2014/main" id="{19E320F0-0045-44DD-A90C-8B9DCF03F332}"/>
               </a:ext>
             </a:extLst>
           </p:cNvPr>
@@ -12200,155 +11221,9 @@
           <a:bodyPr/>
           <a:lstStyle/>
           <a:p>
-            <a:fld id="{86CB4B4D-7CA3-9044-876B-883B54F8677D}" type="slidenum">
-              <a:rPr lang="en-US" smtClean="0"/>
-              <a:pPr/>
-              <a:t>2</a:t>
-            </a:fld>
-            <a:endParaRPr lang="en-US"/>
-          </a:p>
-        </p:txBody>
-      </p:sp>
-    </p:spTree>
-    <p:extLst>
-      <p:ext uri="{BB962C8B-B14F-4D97-AF65-F5344CB8AC3E}">
-        <p14:creationId xmlns:p14="http://schemas.microsoft.com/office/powerpoint/2010/main" val="3915051007"/>
-      </p:ext>
-    </p:extLst>
-  </p:cSld>
-  <p:clrMapOvr>
-    <a:masterClrMapping/>
-  </p:clrMapOvr>
-</p:sld>
-</file>
-
-<file path=ppt/slides/slide20.xml><?xml version="1.0" encoding="utf-8"?>
-<p:sld xmlns:a="http://schemas.openxmlformats.org/drawingml/2006/main" xmlns:r="http://schemas.openxmlformats.org/officeDocument/2006/relationships" xmlns:p="http://schemas.openxmlformats.org/presentationml/2006/main">
-  <p:cSld>
-    <p:spTree>
-      <p:nvGrpSpPr>
-        <p:cNvPr id="1" name=""/>
-        <p:cNvGrpSpPr/>
-        <p:nvPr/>
-      </p:nvGrpSpPr>
-      <p:grpSpPr>
-        <a:xfrm>
-          <a:off x="0" y="0"/>
-          <a:ext cx="0" cy="0"/>
-          <a:chOff x="0" y="0"/>
-          <a:chExt cx="0" cy="0"/>
-        </a:xfrm>
-      </p:grpSpPr>
-      <p:sp>
-        <p:nvSpPr>
-          <p:cNvPr id="2" name="Title 1">
-            <a:extLst>
-              <a:ext uri="{FF2B5EF4-FFF2-40B4-BE49-F238E27FC236}">
-                <a16:creationId xmlns:a16="http://schemas.microsoft.com/office/drawing/2014/main" id="{37C61C2C-D605-4F46-9A0F-CEEB37527908}"/>
-              </a:ext>
-            </a:extLst>
-          </p:cNvPr>
-          <p:cNvSpPr>
-            <a:spLocks noGrp="1"/>
-          </p:cNvSpPr>
-          <p:nvPr>
-            <p:ph type="title"/>
-          </p:nvPr>
-        </p:nvSpPr>
-        <p:spPr/>
-        <p:txBody>
-          <a:bodyPr/>
-          <a:lstStyle/>
-          <a:p>
-            <a:r>
-              <a:rPr lang="en-US" dirty="0"/>
-              <a:t>Principle 4: Don't Repeat Yourself</a:t>
-            </a:r>
-          </a:p>
-        </p:txBody>
-      </p:sp>
-      <p:sp>
-        <p:nvSpPr>
-          <p:cNvPr id="3" name="Content Placeholder 2">
-            <a:extLst>
-              <a:ext uri="{FF2B5EF4-FFF2-40B4-BE49-F238E27FC236}">
-                <a16:creationId xmlns:a16="http://schemas.microsoft.com/office/drawing/2014/main" id="{3E6DDF18-19A4-4769-930A-E5C27B69F9EE}"/>
-              </a:ext>
-            </a:extLst>
-          </p:cNvPr>
-          <p:cNvSpPr>
-            <a:spLocks noGrp="1"/>
-          </p:cNvSpPr>
-          <p:nvPr>
-            <p:ph idx="1"/>
-          </p:nvPr>
-        </p:nvSpPr>
-        <p:spPr/>
-        <p:txBody>
-          <a:bodyPr/>
-          <a:lstStyle/>
-          <a:p>
-            <a:r>
-              <a:rPr lang="en-US" dirty="0"/>
-              <a:t>If you have some quantity that you use more than once, give it a name and use the name.</a:t>
-            </a:r>
-          </a:p>
-          <a:p>
-            <a:r>
-              <a:rPr lang="en-US" dirty="0"/>
-              <a:t>That way you only need to change it in one place!</a:t>
-            </a:r>
-          </a:p>
-          <a:p>
-            <a:r>
-              <a:rPr lang="en-US" dirty="0"/>
-              <a:t>And of course you should use a good name</a:t>
-            </a:r>
-          </a:p>
-          <a:p>
-            <a:r>
-              <a:rPr lang="en-US" dirty="0"/>
-              <a:t>If you have some task that you do in many places, make it into a procedure.</a:t>
-            </a:r>
-          </a:p>
-          <a:p>
-            <a:r>
-              <a:rPr lang="en-US" dirty="0"/>
-              <a:t>If the tasks are slightly different, turn the differences into parameters.</a:t>
-            </a:r>
-          </a:p>
-          <a:p>
-            <a:pPr marL="0" indent="0">
-              <a:buNone/>
-            </a:pPr>
-            <a:endParaRPr lang="en-US" dirty="0"/>
-          </a:p>
-        </p:txBody>
-      </p:sp>
-      <p:sp>
-        <p:nvSpPr>
-          <p:cNvPr id="4" name="Slide Number Placeholder 3">
-            <a:extLst>
-              <a:ext uri="{FF2B5EF4-FFF2-40B4-BE49-F238E27FC236}">
-                <a16:creationId xmlns:a16="http://schemas.microsoft.com/office/drawing/2014/main" id="{19E320F0-0045-44DD-A90C-8B9DCF03F332}"/>
-              </a:ext>
-            </a:extLst>
-          </p:cNvPr>
-          <p:cNvSpPr>
-            <a:spLocks noGrp="1"/>
-          </p:cNvSpPr>
-          <p:nvPr>
-            <p:ph type="sldNum" sz="quarter" idx="12"/>
-          </p:nvPr>
-        </p:nvSpPr>
-        <p:spPr/>
-        <p:txBody>
-          <a:bodyPr/>
-          <a:lstStyle/>
-          <a:p>
             <a:fld id="{20F37917-FD3A-4669-9018-DA04BCDD3D75}" type="slidenum">
               <a:rPr lang="en-US" smtClean="0"/>
-              <a:t>20</a:t>
+              <a:t>19</a:t>
             </a:fld>
             <a:endParaRPr lang="en-US"/>
           </a:p>
@@ -12633,7 +11508,7 @@
 </p:sld>
 </file>
 
-<file path=ppt/slides/slide21.xml><?xml version="1.0" encoding="utf-8"?>
+<file path=ppt/slides/slide2.xml><?xml version="1.0" encoding="utf-8"?>
 <p:sld xmlns:a="http://schemas.openxmlformats.org/drawingml/2006/main" xmlns:r="http://schemas.openxmlformats.org/officeDocument/2006/relationships" xmlns:p="http://schemas.openxmlformats.org/presentationml/2006/main">
   <p:cSld>
     <p:spTree>
@@ -12655,7 +11530,7 @@
           <p:cNvPr id="2" name="Title 1">
             <a:extLst>
               <a:ext uri="{FF2B5EF4-FFF2-40B4-BE49-F238E27FC236}">
-                <a16:creationId xmlns:a16="http://schemas.microsoft.com/office/drawing/2014/main" id="{B55618A6-4E56-48CD-A53E-9B714D4DFF13}"/>
+                <a16:creationId xmlns:a16="http://schemas.microsoft.com/office/drawing/2014/main" id="{B6D33575-0593-49FD-831F-131BB6CC7E6C}"/>
               </a:ext>
             </a:extLst>
           </p:cNvPr>
@@ -12673,17 +11548,17 @@
           <a:p>
             <a:r>
               <a:rPr lang="en-US" dirty="0"/>
-              <a:t>A real example</a:t>
-            </a:r>
-          </a:p>
-        </p:txBody>
-      </p:sp>
-      <p:sp>
-        <p:nvSpPr>
-          <p:cNvPr id="3" name="Content Placeholder 2">
-            <a:extLst>
-              <a:ext uri="{FF2B5EF4-FFF2-40B4-BE49-F238E27FC236}">
-                <a16:creationId xmlns:a16="http://schemas.microsoft.com/office/drawing/2014/main" id="{4484EE87-7949-4279-ABF0-79976D50CAC4}"/>
+              <a:t>Learning Objectives for this Lesson</a:t>
+            </a:r>
+          </a:p>
+        </p:txBody>
+      </p:sp>
+      <p:sp>
+        <p:nvSpPr>
+          <p:cNvPr id="3" name="Text Placeholder 2">
+            <a:extLst>
+              <a:ext uri="{FF2B5EF4-FFF2-40B4-BE49-F238E27FC236}">
+                <a16:creationId xmlns:a16="http://schemas.microsoft.com/office/drawing/2014/main" id="{5B21ECCD-9823-405F-AA9A-D0CC235AD583}"/>
               </a:ext>
             </a:extLst>
           </p:cNvPr>
@@ -12699,16 +11574,43 @@
           <a:bodyPr/>
           <a:lstStyle/>
           <a:p>
+            <a:r>
+              <a:rPr lang="en-US" dirty="0"/>
+              <a:t>By the end of this lesson you should be able to:</a:t>
+            </a:r>
+          </a:p>
+          <a:p>
+            <a:pPr lvl="1" fontAlgn="base"/>
+            <a:r>
+              <a:rPr lang="en-US" dirty="0"/>
+              <a:t>Describe the purpose of our design principles </a:t>
+            </a:r>
+          </a:p>
+          <a:p>
+            <a:pPr lvl="1" fontAlgn="base"/>
+            <a:r>
+              <a:rPr lang="en-US" dirty="0"/>
+              <a:t>List 5 general design principles and illustrate their expression in code</a:t>
+            </a:r>
+          </a:p>
+          <a:p>
+            <a:pPr lvl="1" fontAlgn="base"/>
+            <a:r>
+              <a:rPr lang="en-US" dirty="0"/>
+              <a:t>Identify some violations of the principles and suggest ways to mitigate them</a:t>
+            </a:r>
+          </a:p>
+          <a:p>
             <a:endParaRPr lang="en-US" dirty="0"/>
           </a:p>
         </p:txBody>
       </p:sp>
       <p:sp>
         <p:nvSpPr>
-          <p:cNvPr id="4" name="Slide Number Placeholder 3">
-            <a:extLst>
-              <a:ext uri="{FF2B5EF4-FFF2-40B4-BE49-F238E27FC236}">
-                <a16:creationId xmlns:a16="http://schemas.microsoft.com/office/drawing/2014/main" id="{63AFE69B-30F2-48E6-BD88-DFBBBEA57EB6}"/>
+          <p:cNvPr id="5" name="Slide Number Placeholder 4">
+            <a:extLst>
+              <a:ext uri="{FF2B5EF4-FFF2-40B4-BE49-F238E27FC236}">
+                <a16:creationId xmlns:a16="http://schemas.microsoft.com/office/drawing/2014/main" id="{D3CB1048-3EB8-4281-8361-E7EB70F6FBBC}"/>
               </a:ext>
             </a:extLst>
           </p:cNvPr>
@@ -12724,9 +11626,122 @@
           <a:bodyPr/>
           <a:lstStyle/>
           <a:p>
+            <a:fld id="{86CB4B4D-7CA3-9044-876B-883B54F8677D}" type="slidenum">
+              <a:rPr lang="en-US" smtClean="0"/>
+              <a:pPr/>
+              <a:t>2</a:t>
+            </a:fld>
+            <a:endParaRPr lang="en-US"/>
+          </a:p>
+        </p:txBody>
+      </p:sp>
+    </p:spTree>
+    <p:extLst>
+      <p:ext uri="{BB962C8B-B14F-4D97-AF65-F5344CB8AC3E}">
+        <p14:creationId xmlns:p14="http://schemas.microsoft.com/office/powerpoint/2010/main" val="3915051007"/>
+      </p:ext>
+    </p:extLst>
+  </p:cSld>
+  <p:clrMapOvr>
+    <a:masterClrMapping/>
+  </p:clrMapOvr>
+</p:sld>
+</file>
+
+<file path=ppt/slides/slide20.xml><?xml version="1.0" encoding="utf-8"?>
+<p:sld xmlns:a="http://schemas.openxmlformats.org/drawingml/2006/main" xmlns:r="http://schemas.openxmlformats.org/officeDocument/2006/relationships" xmlns:p="http://schemas.openxmlformats.org/presentationml/2006/main">
+  <p:cSld>
+    <p:spTree>
+      <p:nvGrpSpPr>
+        <p:cNvPr id="1" name=""/>
+        <p:cNvGrpSpPr/>
+        <p:nvPr/>
+      </p:nvGrpSpPr>
+      <p:grpSpPr>
+        <a:xfrm>
+          <a:off x="0" y="0"/>
+          <a:ext cx="0" cy="0"/>
+          <a:chOff x="0" y="0"/>
+          <a:chExt cx="0" cy="0"/>
+        </a:xfrm>
+      </p:grpSpPr>
+      <p:sp>
+        <p:nvSpPr>
+          <p:cNvPr id="2" name="Title 1">
+            <a:extLst>
+              <a:ext uri="{FF2B5EF4-FFF2-40B4-BE49-F238E27FC236}">
+                <a16:creationId xmlns:a16="http://schemas.microsoft.com/office/drawing/2014/main" id="{B55618A6-4E56-48CD-A53E-9B714D4DFF13}"/>
+              </a:ext>
+            </a:extLst>
+          </p:cNvPr>
+          <p:cNvSpPr>
+            <a:spLocks noGrp="1"/>
+          </p:cNvSpPr>
+          <p:nvPr>
+            <p:ph type="title"/>
+          </p:nvPr>
+        </p:nvSpPr>
+        <p:spPr/>
+        <p:txBody>
+          <a:bodyPr/>
+          <a:lstStyle/>
+          <a:p>
+            <a:r>
+              <a:rPr lang="en-US" dirty="0"/>
+              <a:t>A real example</a:t>
+            </a:r>
+          </a:p>
+        </p:txBody>
+      </p:sp>
+      <p:sp>
+        <p:nvSpPr>
+          <p:cNvPr id="3" name="Content Placeholder 2">
+            <a:extLst>
+              <a:ext uri="{FF2B5EF4-FFF2-40B4-BE49-F238E27FC236}">
+                <a16:creationId xmlns:a16="http://schemas.microsoft.com/office/drawing/2014/main" id="{4484EE87-7949-4279-ABF0-79976D50CAC4}"/>
+              </a:ext>
+            </a:extLst>
+          </p:cNvPr>
+          <p:cNvSpPr>
+            <a:spLocks noGrp="1"/>
+          </p:cNvSpPr>
+          <p:nvPr>
+            <p:ph idx="1"/>
+          </p:nvPr>
+        </p:nvSpPr>
+        <p:spPr/>
+        <p:txBody>
+          <a:bodyPr/>
+          <a:lstStyle/>
+          <a:p>
+            <a:endParaRPr lang="en-US" dirty="0"/>
+          </a:p>
+        </p:txBody>
+      </p:sp>
+      <p:sp>
+        <p:nvSpPr>
+          <p:cNvPr id="4" name="Slide Number Placeholder 3">
+            <a:extLst>
+              <a:ext uri="{FF2B5EF4-FFF2-40B4-BE49-F238E27FC236}">
+                <a16:creationId xmlns:a16="http://schemas.microsoft.com/office/drawing/2014/main" id="{63AFE69B-30F2-48E6-BD88-DFBBBEA57EB6}"/>
+              </a:ext>
+            </a:extLst>
+          </p:cNvPr>
+          <p:cNvSpPr>
+            <a:spLocks noGrp="1"/>
+          </p:cNvSpPr>
+          <p:nvPr>
+            <p:ph type="sldNum" sz="quarter" idx="12"/>
+          </p:nvPr>
+        </p:nvSpPr>
+        <p:spPr/>
+        <p:txBody>
+          <a:bodyPr/>
+          <a:lstStyle/>
+          <a:p>
             <a:fld id="{20F37917-FD3A-4669-9018-DA04BCDD3D75}" type="slidenum">
               <a:rPr lang="en-US" smtClean="0"/>
-              <a:t>21</a:t>
+              <a:t>20</a:t>
             </a:fld>
             <a:endParaRPr lang="en-US"/>
           </a:p>
@@ -13758,6 +12773,162 @@
 </p:sld>
 </file>
 
+<file path=ppt/slides/slide21.xml><?xml version="1.0" encoding="utf-8"?>
+<p:sld xmlns:a="http://schemas.openxmlformats.org/drawingml/2006/main" xmlns:r="http://schemas.openxmlformats.org/officeDocument/2006/relationships" xmlns:p="http://schemas.openxmlformats.org/presentationml/2006/main">
+  <p:cSld>
+    <p:spTree>
+      <p:nvGrpSpPr>
+        <p:cNvPr id="1" name=""/>
+        <p:cNvGrpSpPr/>
+        <p:nvPr/>
+      </p:nvGrpSpPr>
+      <p:grpSpPr>
+        <a:xfrm>
+          <a:off x="0" y="0"/>
+          <a:ext cx="0" cy="0"/>
+          <a:chOff x="0" y="0"/>
+          <a:chExt cx="0" cy="0"/>
+        </a:xfrm>
+      </p:grpSpPr>
+      <p:sp>
+        <p:nvSpPr>
+          <p:cNvPr id="2" name="Title 1">
+            <a:extLst>
+              <a:ext uri="{FF2B5EF4-FFF2-40B4-BE49-F238E27FC236}">
+                <a16:creationId xmlns:a16="http://schemas.microsoft.com/office/drawing/2014/main" id="{B5DF9C8A-B2F4-4F3D-8D6E-8EACF6198828}"/>
+              </a:ext>
+            </a:extLst>
+          </p:cNvPr>
+          <p:cNvSpPr>
+            <a:spLocks noGrp="1"/>
+          </p:cNvSpPr>
+          <p:nvPr>
+            <p:ph type="title"/>
+          </p:nvPr>
+        </p:nvSpPr>
+        <p:spPr/>
+        <p:txBody>
+          <a:bodyPr>
+            <a:normAutofit fontScale="90000"/>
+          </a:bodyPr>
+          <a:lstStyle/>
+          <a:p>
+            <a:r>
+              <a:rPr lang="en-US" dirty="0"/>
+              <a:t>Principle 5:</a:t>
+            </a:r>
+            <a:br>
+              <a:rPr lang="en-US" dirty="0"/>
+            </a:br>
+            <a:r>
+              <a:rPr lang="en-US" dirty="0"/>
+              <a:t>Don't Hardcode Things That Are Likely To Change</a:t>
+            </a:r>
+          </a:p>
+        </p:txBody>
+      </p:sp>
+      <p:sp>
+        <p:nvSpPr>
+          <p:cNvPr id="3" name="Content Placeholder 2">
+            <a:extLst>
+              <a:ext uri="{FF2B5EF4-FFF2-40B4-BE49-F238E27FC236}">
+                <a16:creationId xmlns:a16="http://schemas.microsoft.com/office/drawing/2014/main" id="{752C0810-2FED-46EB-82B7-B2730F69E5BB}"/>
+              </a:ext>
+            </a:extLst>
+          </p:cNvPr>
+          <p:cNvSpPr>
+            <a:spLocks noGrp="1"/>
+          </p:cNvSpPr>
+          <p:nvPr>
+            <p:ph idx="1"/>
+          </p:nvPr>
+        </p:nvSpPr>
+        <p:spPr/>
+        <p:txBody>
+          <a:bodyPr/>
+          <a:lstStyle/>
+          <a:p>
+            <a:r>
+              <a:rPr lang="en-US" dirty="0"/>
+              <a:t>"No magic numbers" and "Don't Repeat Yourself" are already examples of this.</a:t>
+            </a:r>
+          </a:p>
+          <a:p>
+            <a:r>
+              <a:rPr lang="en-US" dirty="0"/>
+              <a:t>General strategy: If there something that might change, give it a name</a:t>
+            </a:r>
+          </a:p>
+          <a:p>
+            <a:pPr lvl="1"/>
+            <a:r>
+              <a:rPr lang="en-US" dirty="0"/>
+              <a:t>if it's not already a "thing", refactor to make it a "thing"</a:t>
+            </a:r>
+          </a:p>
+          <a:p>
+            <a:pPr lvl="1"/>
+            <a:r>
+              <a:rPr lang="en-US" dirty="0"/>
+              <a:t>many strategies for this; let's look at one of them</a:t>
+            </a:r>
+          </a:p>
+          <a:p>
+            <a:pPr marL="457200" lvl="1" indent="0">
+              <a:buNone/>
+            </a:pPr>
+            <a:endParaRPr lang="en-US" dirty="0"/>
+          </a:p>
+          <a:p>
+            <a:endParaRPr lang="en-US" dirty="0"/>
+          </a:p>
+          <a:p>
+            <a:endParaRPr lang="en-US" dirty="0"/>
+          </a:p>
+        </p:txBody>
+      </p:sp>
+      <p:sp>
+        <p:nvSpPr>
+          <p:cNvPr id="4" name="Slide Number Placeholder 3">
+            <a:extLst>
+              <a:ext uri="{FF2B5EF4-FFF2-40B4-BE49-F238E27FC236}">
+                <a16:creationId xmlns:a16="http://schemas.microsoft.com/office/drawing/2014/main" id="{0CA7294A-D866-4728-8B14-5BBB218ACFE4}"/>
+              </a:ext>
+            </a:extLst>
+          </p:cNvPr>
+          <p:cNvSpPr>
+            <a:spLocks noGrp="1"/>
+          </p:cNvSpPr>
+          <p:nvPr>
+            <p:ph type="sldNum" sz="quarter" idx="12"/>
+          </p:nvPr>
+        </p:nvSpPr>
+        <p:spPr/>
+        <p:txBody>
+          <a:bodyPr/>
+          <a:lstStyle/>
+          <a:p>
+            <a:fld id="{20F37917-FD3A-4669-9018-DA04BCDD3D75}" type="slidenum">
+              <a:rPr lang="en-US" smtClean="0"/>
+              <a:t>21</a:t>
+            </a:fld>
+            <a:endParaRPr lang="en-US"/>
+          </a:p>
+        </p:txBody>
+      </p:sp>
+    </p:spTree>
+    <p:extLst>
+      <p:ext uri="{BB962C8B-B14F-4D97-AF65-F5344CB8AC3E}">
+        <p14:creationId xmlns:p14="http://schemas.microsoft.com/office/powerpoint/2010/main" val="1017021096"/>
+      </p:ext>
+    </p:extLst>
+  </p:cSld>
+  <p:clrMapOvr>
+    <a:masterClrMapping/>
+  </p:clrMapOvr>
+</p:sld>
+</file>
+
 <file path=ppt/slides/slide22.xml><?xml version="1.0" encoding="utf-8"?>
 <p:sld xmlns:a="http://schemas.openxmlformats.org/drawingml/2006/main" xmlns:r="http://schemas.openxmlformats.org/officeDocument/2006/relationships" xmlns:p="http://schemas.openxmlformats.org/presentationml/2006/main">
   <p:cSld>
@@ -13780,7 +12951,7 @@
           <p:cNvPr id="2" name="Title 1">
             <a:extLst>
               <a:ext uri="{FF2B5EF4-FFF2-40B4-BE49-F238E27FC236}">
-                <a16:creationId xmlns:a16="http://schemas.microsoft.com/office/drawing/2014/main" id="{B5DF9C8A-B2F4-4F3D-8D6E-8EACF6198828}"/>
+                <a16:creationId xmlns:a16="http://schemas.microsoft.com/office/drawing/2014/main" id="{609A3DDD-ACB8-4C62-948A-EC71CD959927}"/>
               </a:ext>
             </a:extLst>
           </p:cNvPr>
@@ -13793,21 +12964,12 @@
         </p:nvSpPr>
         <p:spPr/>
         <p:txBody>
-          <a:bodyPr>
-            <a:normAutofit fontScale="90000"/>
-          </a:bodyPr>
+          <a:bodyPr/>
           <a:lstStyle/>
           <a:p>
             <a:r>
               <a:rPr lang="en-US" dirty="0"/>
-              <a:t>Principle 5:</a:t>
-            </a:r>
-            <a:br>
-              <a:rPr lang="en-US" dirty="0"/>
-            </a:br>
-            <a:r>
-              <a:rPr lang="en-US" dirty="0"/>
-              <a:t>Don't Hardcode Things That Are Likely To Change</a:t>
+              <a:t>Example</a:t>
             </a:r>
           </a:p>
         </p:txBody>
@@ -13817,7 +12979,7 @@
           <p:cNvPr id="3" name="Content Placeholder 2">
             <a:extLst>
               <a:ext uri="{FF2B5EF4-FFF2-40B4-BE49-F238E27FC236}">
-                <a16:creationId xmlns:a16="http://schemas.microsoft.com/office/drawing/2014/main" id="{752C0810-2FED-46EB-82B7-B2730F69E5BB}"/>
+                <a16:creationId xmlns:a16="http://schemas.microsoft.com/office/drawing/2014/main" id="{90A1FD64-651F-40C8-BEBE-EE2F0C39A31E}"/>
               </a:ext>
             </a:extLst>
           </p:cNvPr>
@@ -13835,41 +12997,46 @@
           <a:p>
             <a:r>
               <a:rPr lang="en-US" dirty="0"/>
-              <a:t>"No magic numbers" and "Don't Repeat Yourself" are already examples of this.</a:t>
-            </a:r>
-          </a:p>
-          <a:p>
+              <a:t>Imagine we are computing income tax in a state where there are four rates:</a:t>
+            </a:r>
+          </a:p>
+          <a:p>
+            <a:pPr lvl="1"/>
             <a:r>
               <a:rPr lang="en-US" dirty="0"/>
-              <a:t>General strategy: If there something that might change, give it a name</a:t>
+              <a:t>One on incomes less than $10,000</a:t>
             </a:r>
           </a:p>
           <a:p>
             <a:pPr lvl="1"/>
             <a:r>
               <a:rPr lang="en-US" dirty="0"/>
-              <a:t>if it's not already a "thing", refactor to make it a "thing"</a:t>
+              <a:t>One on incomes between $10,000 and $20,000</a:t>
             </a:r>
           </a:p>
           <a:p>
             <a:pPr lvl="1"/>
             <a:r>
               <a:rPr lang="en-US" dirty="0"/>
-              <a:t>many strategies for this; let's look at one of them</a:t>
-            </a:r>
-          </a:p>
-          <a:p>
-            <a:pPr marL="457200" lvl="1" indent="0">
-              <a:buNone/>
-            </a:pPr>
+              <a:t>One on incomes between $20,000 and $50,000</a:t>
+            </a:r>
+          </a:p>
+          <a:p>
+            <a:pPr lvl="1"/>
+            <a:r>
+              <a:rPr lang="en-US" dirty="0"/>
+              <a:t>One on incomes greater than $50,000</a:t>
+            </a:r>
+          </a:p>
+          <a:p>
+            <a:r>
+              <a:rPr lang="en-US" dirty="0"/>
+              <a:t>You might write something like</a:t>
+            </a:r>
+          </a:p>
+          <a:p>
             <a:endParaRPr lang="en-US" dirty="0"/>
           </a:p>
-          <a:p>
-            <a:endParaRPr lang="en-US" dirty="0"/>
-          </a:p>
-          <a:p>
-            <a:endParaRPr lang="en-US" dirty="0"/>
-          </a:p>
         </p:txBody>
       </p:sp>
       <p:sp>
@@ -13877,7 +13044,7 @@
           <p:cNvPr id="4" name="Slide Number Placeholder 3">
             <a:extLst>
               <a:ext uri="{FF2B5EF4-FFF2-40B4-BE49-F238E27FC236}">
-                <a16:creationId xmlns:a16="http://schemas.microsoft.com/office/drawing/2014/main" id="{0CA7294A-D866-4728-8B14-5BBB218ACFE4}"/>
+                <a16:creationId xmlns:a16="http://schemas.microsoft.com/office/drawing/2014/main" id="{DB37E0B7-7BEF-4780-A7AA-643299AF19DE}"/>
               </a:ext>
             </a:extLst>
           </p:cNvPr>
@@ -13904,7 +13071,7 @@
     </p:spTree>
     <p:extLst>
       <p:ext uri="{BB962C8B-B14F-4D97-AF65-F5344CB8AC3E}">
-        <p14:creationId xmlns:p14="http://schemas.microsoft.com/office/powerpoint/2010/main" val="1017021096"/>
+        <p14:creationId xmlns:p14="http://schemas.microsoft.com/office/powerpoint/2010/main" val="747324757"/>
       </p:ext>
     </p:extLst>
   </p:cSld>
@@ -13936,7 +13103,7 @@
           <p:cNvPr id="2" name="Title 1">
             <a:extLst>
               <a:ext uri="{FF2B5EF4-FFF2-40B4-BE49-F238E27FC236}">
-                <a16:creationId xmlns:a16="http://schemas.microsoft.com/office/drawing/2014/main" id="{609A3DDD-ACB8-4C62-948A-EC71CD959927}"/>
+                <a16:creationId xmlns:a16="http://schemas.microsoft.com/office/drawing/2014/main" id="{CFCEBA52-56CC-4EC5-B318-2D7C3D3E4324}"/>
               </a:ext>
             </a:extLst>
           </p:cNvPr>
@@ -13954,7 +13121,7 @@
           <a:p>
             <a:r>
               <a:rPr lang="en-US" dirty="0"/>
-              <a:t>Example</a:t>
+              <a:t>You might write something like</a:t>
             </a:r>
           </a:p>
         </p:txBody>
@@ -13964,7 +13131,7 @@
           <p:cNvPr id="3" name="Content Placeholder 2">
             <a:extLst>
               <a:ext uri="{FF2B5EF4-FFF2-40B4-BE49-F238E27FC236}">
-                <a16:creationId xmlns:a16="http://schemas.microsoft.com/office/drawing/2014/main" id="{90A1FD64-651F-40C8-BEBE-EE2F0C39A31E}"/>
+                <a16:creationId xmlns:a16="http://schemas.microsoft.com/office/drawing/2014/main" id="{C03B5AF0-A7B6-4DB9-ABCF-5401A8F66F21}"/>
               </a:ext>
             </a:extLst>
           </p:cNvPr>
@@ -13980,47 +13147,39 @@
           <a:bodyPr/>
           <a:lstStyle/>
           <a:p>
+            <a:endParaRPr lang="en-US" dirty="0"/>
+          </a:p>
+          <a:p>
+            <a:endParaRPr lang="en-US" dirty="0"/>
+          </a:p>
+          <a:p>
+            <a:endParaRPr lang="en-US" dirty="0"/>
+          </a:p>
+          <a:p>
+            <a:endParaRPr lang="en-US" dirty="0"/>
+          </a:p>
+          <a:p>
+            <a:endParaRPr lang="en-US" dirty="0"/>
+          </a:p>
+          <a:p>
             <a:r>
               <a:rPr lang="en-US" dirty="0"/>
-              <a:t>Imagine we are computing income tax in a state where there are four rates:</a:t>
+              <a:t>What might change?</a:t>
             </a:r>
           </a:p>
           <a:p>
             <a:pPr lvl="1"/>
             <a:r>
               <a:rPr lang="en-US" dirty="0"/>
-              <a:t>One on incomes less than $10,000</a:t>
+              <a:t>The boundaries of the tax brackets might change</a:t>
             </a:r>
           </a:p>
           <a:p>
             <a:pPr lvl="1"/>
             <a:r>
               <a:rPr lang="en-US" dirty="0"/>
-              <a:t>One on incomes between $10,000 and $20,000</a:t>
-            </a:r>
-          </a:p>
-          <a:p>
-            <a:pPr lvl="1"/>
-            <a:r>
-              <a:rPr lang="en-US" dirty="0"/>
-              <a:t>One on incomes between $20,000 and $50,000</a:t>
-            </a:r>
-          </a:p>
-          <a:p>
-            <a:pPr lvl="1"/>
-            <a:r>
-              <a:rPr lang="en-US" dirty="0"/>
-              <a:t>One on incomes greater than $50,000</a:t>
-            </a:r>
-          </a:p>
-          <a:p>
-            <a:r>
-              <a:rPr lang="en-US" dirty="0"/>
-              <a:t>You might write something like</a:t>
-            </a:r>
-          </a:p>
-          <a:p>
-            <a:endParaRPr lang="en-US" dirty="0"/>
+              <a:t>The number of brackets might change</a:t>
+            </a:r>
           </a:p>
         </p:txBody>
       </p:sp>
@@ -14029,7 +13188,7 @@
           <p:cNvPr id="4" name="Slide Number Placeholder 3">
             <a:extLst>
               <a:ext uri="{FF2B5EF4-FFF2-40B4-BE49-F238E27FC236}">
-                <a16:creationId xmlns:a16="http://schemas.microsoft.com/office/drawing/2014/main" id="{DB37E0B7-7BEF-4780-A7AA-643299AF19DE}"/>
+                <a16:creationId xmlns:a16="http://schemas.microsoft.com/office/drawing/2014/main" id="{AC5984C3-71D9-4C3C-8C0F-15940E95E6B7}"/>
               </a:ext>
             </a:extLst>
           </p:cNvPr>
@@ -14048,150 +13207,6 @@
             <a:fld id="{20F37917-FD3A-4669-9018-DA04BCDD3D75}" type="slidenum">
               <a:rPr lang="en-US" smtClean="0"/>
               <a:t>23</a:t>
-            </a:fld>
-            <a:endParaRPr lang="en-US"/>
-          </a:p>
-        </p:txBody>
-      </p:sp>
-    </p:spTree>
-    <p:extLst>
-      <p:ext uri="{BB962C8B-B14F-4D97-AF65-F5344CB8AC3E}">
-        <p14:creationId xmlns:p14="http://schemas.microsoft.com/office/powerpoint/2010/main" val="747324757"/>
-      </p:ext>
-    </p:extLst>
-  </p:cSld>
-  <p:clrMapOvr>
-    <a:masterClrMapping/>
-  </p:clrMapOvr>
-</p:sld>
-</file>
-
-<file path=ppt/slides/slide24.xml><?xml version="1.0" encoding="utf-8"?>
-<p:sld xmlns:a="http://schemas.openxmlformats.org/drawingml/2006/main" xmlns:r="http://schemas.openxmlformats.org/officeDocument/2006/relationships" xmlns:p="http://schemas.openxmlformats.org/presentationml/2006/main">
-  <p:cSld>
-    <p:spTree>
-      <p:nvGrpSpPr>
-        <p:cNvPr id="1" name=""/>
-        <p:cNvGrpSpPr/>
-        <p:nvPr/>
-      </p:nvGrpSpPr>
-      <p:grpSpPr>
-        <a:xfrm>
-          <a:off x="0" y="0"/>
-          <a:ext cx="0" cy="0"/>
-          <a:chOff x="0" y="0"/>
-          <a:chExt cx="0" cy="0"/>
-        </a:xfrm>
-      </p:grpSpPr>
-      <p:sp>
-        <p:nvSpPr>
-          <p:cNvPr id="2" name="Title 1">
-            <a:extLst>
-              <a:ext uri="{FF2B5EF4-FFF2-40B4-BE49-F238E27FC236}">
-                <a16:creationId xmlns:a16="http://schemas.microsoft.com/office/drawing/2014/main" id="{CFCEBA52-56CC-4EC5-B318-2D7C3D3E4324}"/>
-              </a:ext>
-            </a:extLst>
-          </p:cNvPr>
-          <p:cNvSpPr>
-            <a:spLocks noGrp="1"/>
-          </p:cNvSpPr>
-          <p:nvPr>
-            <p:ph type="title"/>
-          </p:nvPr>
-        </p:nvSpPr>
-        <p:spPr/>
-        <p:txBody>
-          <a:bodyPr/>
-          <a:lstStyle/>
-          <a:p>
-            <a:r>
-              <a:rPr lang="en-US" dirty="0"/>
-              <a:t>You might write something like</a:t>
-            </a:r>
-          </a:p>
-        </p:txBody>
-      </p:sp>
-      <p:sp>
-        <p:nvSpPr>
-          <p:cNvPr id="3" name="Content Placeholder 2">
-            <a:extLst>
-              <a:ext uri="{FF2B5EF4-FFF2-40B4-BE49-F238E27FC236}">
-                <a16:creationId xmlns:a16="http://schemas.microsoft.com/office/drawing/2014/main" id="{C03B5AF0-A7B6-4DB9-ABCF-5401A8F66F21}"/>
-              </a:ext>
-            </a:extLst>
-          </p:cNvPr>
-          <p:cNvSpPr>
-            <a:spLocks noGrp="1"/>
-          </p:cNvSpPr>
-          <p:nvPr>
-            <p:ph idx="1"/>
-          </p:nvPr>
-        </p:nvSpPr>
-        <p:spPr/>
-        <p:txBody>
-          <a:bodyPr/>
-          <a:lstStyle/>
-          <a:p>
-            <a:endParaRPr lang="en-US" dirty="0"/>
-          </a:p>
-          <a:p>
-            <a:endParaRPr lang="en-US" dirty="0"/>
-          </a:p>
-          <a:p>
-            <a:endParaRPr lang="en-US" dirty="0"/>
-          </a:p>
-          <a:p>
-            <a:endParaRPr lang="en-US" dirty="0"/>
-          </a:p>
-          <a:p>
-            <a:endParaRPr lang="en-US" dirty="0"/>
-          </a:p>
-          <a:p>
-            <a:r>
-              <a:rPr lang="en-US" dirty="0"/>
-              <a:t>What might change?</a:t>
-            </a:r>
-          </a:p>
-          <a:p>
-            <a:pPr lvl="1"/>
-            <a:r>
-              <a:rPr lang="en-US" dirty="0"/>
-              <a:t>The boundaries of the tax brackets might change</a:t>
-            </a:r>
-          </a:p>
-          <a:p>
-            <a:pPr lvl="1"/>
-            <a:r>
-              <a:rPr lang="en-US" dirty="0"/>
-              <a:t>The number of brackets might change</a:t>
-            </a:r>
-          </a:p>
-        </p:txBody>
-      </p:sp>
-      <p:sp>
-        <p:nvSpPr>
-          <p:cNvPr id="4" name="Slide Number Placeholder 3">
-            <a:extLst>
-              <a:ext uri="{FF2B5EF4-FFF2-40B4-BE49-F238E27FC236}">
-                <a16:creationId xmlns:a16="http://schemas.microsoft.com/office/drawing/2014/main" id="{AC5984C3-71D9-4C3C-8C0F-15940E95E6B7}"/>
-              </a:ext>
-            </a:extLst>
-          </p:cNvPr>
-          <p:cNvSpPr>
-            <a:spLocks noGrp="1"/>
-          </p:cNvSpPr>
-          <p:nvPr>
-            <p:ph type="sldNum" sz="quarter" idx="12"/>
-          </p:nvPr>
-        </p:nvSpPr>
-        <p:spPr/>
-        <p:txBody>
-          <a:bodyPr/>
-          <a:lstStyle/>
-          <a:p>
-            <a:fld id="{20F37917-FD3A-4669-9018-DA04BCDD3D75}" type="slidenum">
-              <a:rPr lang="en-US" smtClean="0"/>
-              <a:t>24</a:t>
             </a:fld>
             <a:endParaRPr lang="en-US"/>
           </a:p>
@@ -15503,7 +14518,7 @@
 </p:sld>
 </file>
 
-<file path=ppt/slides/slide25.xml><?xml version="1.0" encoding="utf-8"?>
+<file path=ppt/slides/slide24.xml><?xml version="1.0" encoding="utf-8"?>
 <p:sld xmlns:a="http://schemas.openxmlformats.org/drawingml/2006/main" xmlns:r="http://schemas.openxmlformats.org/officeDocument/2006/relationships" xmlns:p="http://schemas.openxmlformats.org/presentationml/2006/main">
   <p:cSld>
     <p:spTree>
@@ -15596,7 +14611,7 @@
           <a:p>
             <a:fld id="{20F37917-FD3A-4669-9018-DA04BCDD3D75}" type="slidenum">
               <a:rPr lang="en-US" smtClean="0"/>
-              <a:t>25</a:t>
+              <a:t>24</a:t>
             </a:fld>
             <a:endParaRPr lang="en-US"/>
           </a:p>
@@ -16432,7 +15447,7 @@
 </p:sld>
 </file>
 
-<file path=ppt/slides/slide26.xml><?xml version="1.0" encoding="utf-8"?>
+<file path=ppt/slides/slide25.xml><?xml version="1.0" encoding="utf-8"?>
 <p:sld xmlns:a="http://schemas.openxmlformats.org/drawingml/2006/main" xmlns:r="http://schemas.openxmlformats.org/officeDocument/2006/relationships" xmlns:p="http://schemas.openxmlformats.org/presentationml/2006/main">
   <p:cSld>
     <p:spTree>
@@ -16525,7 +15540,7 @@
           <a:p>
             <a:fld id="{20F37917-FD3A-4669-9018-DA04BCDD3D75}" type="slidenum">
               <a:rPr lang="en-US" smtClean="0"/>
-              <a:t>26</a:t>
+              <a:t>25</a:t>
             </a:fld>
             <a:endParaRPr lang="en-US"/>
           </a:p>
@@ -17419,6 +16434,146 @@
 </p:sld>
 </file>
 
+<file path=ppt/slides/slide26.xml><?xml version="1.0" encoding="utf-8"?>
+<p:sld xmlns:a="http://schemas.openxmlformats.org/drawingml/2006/main" xmlns:r="http://schemas.openxmlformats.org/officeDocument/2006/relationships" xmlns:p="http://schemas.openxmlformats.org/presentationml/2006/main">
+  <p:cSld>
+    <p:spTree>
+      <p:nvGrpSpPr>
+        <p:cNvPr id="1" name=""/>
+        <p:cNvGrpSpPr/>
+        <p:nvPr/>
+      </p:nvGrpSpPr>
+      <p:grpSpPr>
+        <a:xfrm>
+          <a:off x="0" y="0"/>
+          <a:ext cx="0" cy="0"/>
+          <a:chOff x="0" y="0"/>
+          <a:chExt cx="0" cy="0"/>
+        </a:xfrm>
+      </p:grpSpPr>
+      <p:sp>
+        <p:nvSpPr>
+          <p:cNvPr id="2" name="Title 1">
+            <a:extLst>
+              <a:ext uri="{FF2B5EF4-FFF2-40B4-BE49-F238E27FC236}">
+                <a16:creationId xmlns:a16="http://schemas.microsoft.com/office/drawing/2014/main" id="{B6D33575-0593-49FD-831F-131BB6CC7E6C}"/>
+              </a:ext>
+            </a:extLst>
+          </p:cNvPr>
+          <p:cNvSpPr>
+            <a:spLocks noGrp="1"/>
+          </p:cNvSpPr>
+          <p:nvPr>
+            <p:ph type="title"/>
+          </p:nvPr>
+        </p:nvSpPr>
+        <p:spPr/>
+        <p:txBody>
+          <a:bodyPr/>
+          <a:lstStyle/>
+          <a:p>
+            <a:r>
+              <a:rPr lang="en-US" dirty="0"/>
+              <a:t>Review: Learning Objectives for this Lesson</a:t>
+            </a:r>
+          </a:p>
+        </p:txBody>
+      </p:sp>
+      <p:sp>
+        <p:nvSpPr>
+          <p:cNvPr id="3" name="Text Placeholder 2">
+            <a:extLst>
+              <a:ext uri="{FF2B5EF4-FFF2-40B4-BE49-F238E27FC236}">
+                <a16:creationId xmlns:a16="http://schemas.microsoft.com/office/drawing/2014/main" id="{5B21ECCD-9823-405F-AA9A-D0CC235AD583}"/>
+              </a:ext>
+            </a:extLst>
+          </p:cNvPr>
+          <p:cNvSpPr>
+            <a:spLocks noGrp="1"/>
+          </p:cNvSpPr>
+          <p:nvPr>
+            <p:ph idx="1"/>
+          </p:nvPr>
+        </p:nvSpPr>
+        <p:spPr/>
+        <p:txBody>
+          <a:bodyPr/>
+          <a:lstStyle/>
+          <a:p>
+            <a:r>
+              <a:rPr lang="en-US" dirty="0"/>
+              <a:t>You should now be able to:</a:t>
+            </a:r>
+          </a:p>
+          <a:p>
+            <a:pPr lvl="1" fontAlgn="base"/>
+            <a:r>
+              <a:rPr lang="en-US" dirty="0"/>
+              <a:t>Describe the purpose of our design principles </a:t>
+            </a:r>
+          </a:p>
+          <a:p>
+            <a:pPr lvl="1" fontAlgn="base"/>
+            <a:r>
+              <a:rPr lang="en-US" dirty="0"/>
+              <a:t>List 5 general design principles and illustrate their expression in code</a:t>
+            </a:r>
+          </a:p>
+          <a:p>
+            <a:pPr lvl="1" fontAlgn="base"/>
+            <a:r>
+              <a:rPr lang="en-US" dirty="0"/>
+              <a:t>Identify some violations of the principles and suggest ways to mitigate them</a:t>
+            </a:r>
+          </a:p>
+          <a:p>
+            <a:endParaRPr lang="en-US" dirty="0"/>
+          </a:p>
+        </p:txBody>
+      </p:sp>
+      <p:sp>
+        <p:nvSpPr>
+          <p:cNvPr id="5" name="Slide Number Placeholder 4">
+            <a:extLst>
+              <a:ext uri="{FF2B5EF4-FFF2-40B4-BE49-F238E27FC236}">
+                <a16:creationId xmlns:a16="http://schemas.microsoft.com/office/drawing/2014/main" id="{D3CB1048-3EB8-4281-8361-E7EB70F6FBBC}"/>
+              </a:ext>
+            </a:extLst>
+          </p:cNvPr>
+          <p:cNvSpPr>
+            <a:spLocks noGrp="1"/>
+          </p:cNvSpPr>
+          <p:nvPr>
+            <p:ph type="sldNum" sz="quarter" idx="12"/>
+          </p:nvPr>
+        </p:nvSpPr>
+        <p:spPr/>
+        <p:txBody>
+          <a:bodyPr/>
+          <a:lstStyle/>
+          <a:p>
+            <a:fld id="{86CB4B4D-7CA3-9044-876B-883B54F8677D}" type="slidenum">
+              <a:rPr lang="en-US" smtClean="0"/>
+              <a:pPr/>
+              <a:t>26</a:t>
+            </a:fld>
+            <a:endParaRPr lang="en-US"/>
+          </a:p>
+        </p:txBody>
+      </p:sp>
+    </p:spTree>
+    <p:extLst>
+      <p:ext uri="{BB962C8B-B14F-4D97-AF65-F5344CB8AC3E}">
+        <p14:creationId xmlns:p14="http://schemas.microsoft.com/office/powerpoint/2010/main" val="2643922941"/>
+      </p:ext>
+    </p:extLst>
+  </p:cSld>
+  <p:clrMapOvr>
+    <a:masterClrMapping/>
+  </p:clrMapOvr>
+</p:sld>
+</file>
+
 <file path=ppt/slides/slide27.xml><?xml version="1.0" encoding="utf-8"?>
 <p:sld xmlns:a="http://schemas.openxmlformats.org/drawingml/2006/main" xmlns:r="http://schemas.openxmlformats.org/officeDocument/2006/relationships" xmlns:p="http://schemas.openxmlformats.org/presentationml/2006/main">
   <p:cSld>
@@ -17441,146 +16596,6 @@
           <p:cNvPr id="2" name="Title 1">
             <a:extLst>
               <a:ext uri="{FF2B5EF4-FFF2-40B4-BE49-F238E27FC236}">
-                <a16:creationId xmlns:a16="http://schemas.microsoft.com/office/drawing/2014/main" id="{B6D33575-0593-49FD-831F-131BB6CC7E6C}"/>
-              </a:ext>
-            </a:extLst>
-          </p:cNvPr>
-          <p:cNvSpPr>
-            <a:spLocks noGrp="1"/>
-          </p:cNvSpPr>
-          <p:nvPr>
-            <p:ph type="title"/>
-          </p:nvPr>
-        </p:nvSpPr>
-        <p:spPr/>
-        <p:txBody>
-          <a:bodyPr/>
-          <a:lstStyle/>
-          <a:p>
-            <a:r>
-              <a:rPr lang="en-US" dirty="0"/>
-              <a:t>Review: Learning Objectives for this Lesson</a:t>
-            </a:r>
-          </a:p>
-        </p:txBody>
-      </p:sp>
-      <p:sp>
-        <p:nvSpPr>
-          <p:cNvPr id="3" name="Text Placeholder 2">
-            <a:extLst>
-              <a:ext uri="{FF2B5EF4-FFF2-40B4-BE49-F238E27FC236}">
-                <a16:creationId xmlns:a16="http://schemas.microsoft.com/office/drawing/2014/main" id="{5B21ECCD-9823-405F-AA9A-D0CC235AD583}"/>
-              </a:ext>
-            </a:extLst>
-          </p:cNvPr>
-          <p:cNvSpPr>
-            <a:spLocks noGrp="1"/>
-          </p:cNvSpPr>
-          <p:nvPr>
-            <p:ph idx="1"/>
-          </p:nvPr>
-        </p:nvSpPr>
-        <p:spPr/>
-        <p:txBody>
-          <a:bodyPr/>
-          <a:lstStyle/>
-          <a:p>
-            <a:r>
-              <a:rPr lang="en-US" dirty="0"/>
-              <a:t>You should now be able to:</a:t>
-            </a:r>
-          </a:p>
-          <a:p>
-            <a:pPr lvl="1" fontAlgn="base"/>
-            <a:r>
-              <a:rPr lang="en-US" dirty="0"/>
-              <a:t>Describe the purpose of our design principles </a:t>
-            </a:r>
-          </a:p>
-          <a:p>
-            <a:pPr lvl="1" fontAlgn="base"/>
-            <a:r>
-              <a:rPr lang="en-US" dirty="0"/>
-              <a:t>List 5 general design principles and illustrate their expression in code</a:t>
-            </a:r>
-          </a:p>
-          <a:p>
-            <a:pPr lvl="1" fontAlgn="base"/>
-            <a:r>
-              <a:rPr lang="en-US" dirty="0"/>
-              <a:t>Identify some violations of the principles and suggest ways to mitigate them</a:t>
-            </a:r>
-          </a:p>
-          <a:p>
-            <a:endParaRPr lang="en-US" dirty="0"/>
-          </a:p>
-        </p:txBody>
-      </p:sp>
-      <p:sp>
-        <p:nvSpPr>
-          <p:cNvPr id="5" name="Slide Number Placeholder 4">
-            <a:extLst>
-              <a:ext uri="{FF2B5EF4-FFF2-40B4-BE49-F238E27FC236}">
-                <a16:creationId xmlns:a16="http://schemas.microsoft.com/office/drawing/2014/main" id="{D3CB1048-3EB8-4281-8361-E7EB70F6FBBC}"/>
-              </a:ext>
-            </a:extLst>
-          </p:cNvPr>
-          <p:cNvSpPr>
-            <a:spLocks noGrp="1"/>
-          </p:cNvSpPr>
-          <p:nvPr>
-            <p:ph type="sldNum" sz="quarter" idx="12"/>
-          </p:nvPr>
-        </p:nvSpPr>
-        <p:spPr/>
-        <p:txBody>
-          <a:bodyPr/>
-          <a:lstStyle/>
-          <a:p>
-            <a:fld id="{86CB4B4D-7CA3-9044-876B-883B54F8677D}" type="slidenum">
-              <a:rPr lang="en-US" smtClean="0"/>
-              <a:pPr/>
-              <a:t>27</a:t>
-            </a:fld>
-            <a:endParaRPr lang="en-US"/>
-          </a:p>
-        </p:txBody>
-      </p:sp>
-    </p:spTree>
-    <p:extLst>
-      <p:ext uri="{BB962C8B-B14F-4D97-AF65-F5344CB8AC3E}">
-        <p14:creationId xmlns:p14="http://schemas.microsoft.com/office/powerpoint/2010/main" val="2643922941"/>
-      </p:ext>
-    </p:extLst>
-  </p:cSld>
-  <p:clrMapOvr>
-    <a:masterClrMapping/>
-  </p:clrMapOvr>
-</p:sld>
-</file>
-
-<file path=ppt/slides/slide28.xml><?xml version="1.0" encoding="utf-8"?>
-<p:sld xmlns:a="http://schemas.openxmlformats.org/drawingml/2006/main" xmlns:r="http://schemas.openxmlformats.org/officeDocument/2006/relationships" xmlns:p="http://schemas.openxmlformats.org/presentationml/2006/main">
-  <p:cSld>
-    <p:spTree>
-      <p:nvGrpSpPr>
-        <p:cNvPr id="1" name=""/>
-        <p:cNvGrpSpPr/>
-        <p:nvPr/>
-      </p:nvGrpSpPr>
-      <p:grpSpPr>
-        <a:xfrm>
-          <a:off x="0" y="0"/>
-          <a:ext cx="0" cy="0"/>
-          <a:chOff x="0" y="0"/>
-          <a:chExt cx="0" cy="0"/>
-        </a:xfrm>
-      </p:grpSpPr>
-      <p:sp>
-        <p:nvSpPr>
-          <p:cNvPr id="2" name="Title 1">
-            <a:extLst>
-              <a:ext uri="{FF2B5EF4-FFF2-40B4-BE49-F238E27FC236}">
                 <a16:creationId xmlns:a16="http://schemas.microsoft.com/office/drawing/2014/main" id="{7EB782C9-1CF8-40AE-A725-0968E5F17117}"/>
               </a:ext>
             </a:extLst>
@@ -17670,7 +16685,7 @@
               <a:pPr defTabSz="547695">
                 <a:defRPr/>
               </a:pPr>
-              <a:t>28</a:t>
+              <a:t>27</a:t>
             </a:fld>
             <a:endParaRPr lang="en-US"/>
           </a:p>
@@ -18612,10 +17627,40 @@
       </p:grpSpPr>
       <p:sp>
         <p:nvSpPr>
+          <p:cNvPr id="12" name="Content Placeholder 2">
+            <a:extLst>
+              <a:ext uri="{FF2B5EF4-FFF2-40B4-BE49-F238E27FC236}">
+                <a16:creationId xmlns:a16="http://schemas.microsoft.com/office/drawing/2014/main" id="{DD4082E8-6316-417D-BBFA-AB16CB7A80EA}"/>
+              </a:ext>
+            </a:extLst>
+          </p:cNvPr>
+          <p:cNvSpPr>
+            <a:spLocks noGrp="1"/>
+          </p:cNvSpPr>
+          <p:nvPr>
+            <p:ph idx="1"/>
+          </p:nvPr>
+        </p:nvSpPr>
+        <p:spPr>
+          <a:xfrm>
+            <a:off x="838200" y="1500160"/>
+            <a:ext cx="7887346" cy="4351338"/>
+          </a:xfrm>
+        </p:spPr>
+        <p:txBody>
+          <a:bodyPr/>
+          <a:lstStyle/>
+          <a:p>
+            <a:endParaRPr lang="en-US" dirty="0"/>
+          </a:p>
+        </p:txBody>
+      </p:sp>
+      <p:sp>
+        <p:nvSpPr>
           <p:cNvPr id="2" name="Title 1">
             <a:extLst>
               <a:ext uri="{FF2B5EF4-FFF2-40B4-BE49-F238E27FC236}">
-                <a16:creationId xmlns:a16="http://schemas.microsoft.com/office/drawing/2014/main" id="{FC9E2E41-477E-4918-A562-D6BC1D2820CC}"/>
+                <a16:creationId xmlns:a16="http://schemas.microsoft.com/office/drawing/2014/main" id="{72DE2BE0-6BF7-46DE-A2FA-2BE59A698CA7}"/>
               </a:ext>
             </a:extLst>
           </p:cNvPr>
@@ -18633,47 +17678,7 @@
           <a:p>
             <a:r>
               <a:rPr lang="en-US" dirty="0"/>
-              <a:t>Identifying likely extensions</a:t>
-            </a:r>
-          </a:p>
-        </p:txBody>
-      </p:sp>
-      <p:sp>
-        <p:nvSpPr>
-          <p:cNvPr id="3" name="Content Placeholder 2">
-            <a:extLst>
-              <a:ext uri="{FF2B5EF4-FFF2-40B4-BE49-F238E27FC236}">
-                <a16:creationId xmlns:a16="http://schemas.microsoft.com/office/drawing/2014/main" id="{81831980-990E-4929-909C-15E323565558}"/>
-              </a:ext>
-            </a:extLst>
-          </p:cNvPr>
-          <p:cNvSpPr>
-            <a:spLocks noGrp="1"/>
-          </p:cNvSpPr>
-          <p:nvPr>
-            <p:ph idx="1"/>
-          </p:nvPr>
-        </p:nvSpPr>
-        <p:spPr/>
-        <p:txBody>
-          <a:bodyPr/>
-          <a:lstStyle/>
-          <a:p>
-            <a:r>
-              <a:rPr lang="en-US" dirty="0"/>
-              <a:t>Important to know what things are likely to change in the future.</a:t>
-            </a:r>
-          </a:p>
-          <a:p>
-            <a:r>
-              <a:rPr lang="en-US" dirty="0"/>
-              <a:t>Avoid hard-coding those features!</a:t>
-            </a:r>
-          </a:p>
-          <a:p>
-            <a:r>
-              <a:rPr lang="en-US" dirty="0"/>
-              <a:t>Turn them into extension points</a:t>
+              <a:t>Five general-purpose principles</a:t>
             </a:r>
           </a:p>
         </p:txBody>
@@ -18683,7 +17688,7 @@
           <p:cNvPr id="4" name="Slide Number Placeholder 3">
             <a:extLst>
               <a:ext uri="{FF2B5EF4-FFF2-40B4-BE49-F238E27FC236}">
-                <a16:creationId xmlns:a16="http://schemas.microsoft.com/office/drawing/2014/main" id="{24B80D9C-2FAF-4D30-ABCC-AEC7D538201B}"/>
+                <a16:creationId xmlns:a16="http://schemas.microsoft.com/office/drawing/2014/main" id="{5337758A-1EB1-4A1C-8B7D-75DCD4944EA1}"/>
               </a:ext>
             </a:extLst>
           </p:cNvPr>
@@ -18702,123 +17707,6 @@
             <a:fld id="{20F37917-FD3A-4669-9018-DA04BCDD3D75}" type="slidenum">
               <a:rPr lang="en-US" smtClean="0"/>
               <a:t>7</a:t>
-            </a:fld>
-            <a:endParaRPr lang="en-US"/>
-          </a:p>
-        </p:txBody>
-      </p:sp>
-    </p:spTree>
-    <p:extLst>
-      <p:ext uri="{BB962C8B-B14F-4D97-AF65-F5344CB8AC3E}">
-        <p14:creationId xmlns:p14="http://schemas.microsoft.com/office/powerpoint/2010/main" val="515323980"/>
-      </p:ext>
-    </p:extLst>
-  </p:cSld>
-  <p:clrMapOvr>
-    <a:masterClrMapping/>
-  </p:clrMapOvr>
-</p:sld>
-</file>
-
-<file path=ppt/slides/slide8.xml><?xml version="1.0" encoding="utf-8"?>
-<p:sld xmlns:a="http://schemas.openxmlformats.org/drawingml/2006/main" xmlns:r="http://schemas.openxmlformats.org/officeDocument/2006/relationships" xmlns:p="http://schemas.openxmlformats.org/presentationml/2006/main">
-  <p:cSld>
-    <p:spTree>
-      <p:nvGrpSpPr>
-        <p:cNvPr id="1" name=""/>
-        <p:cNvGrpSpPr/>
-        <p:nvPr/>
-      </p:nvGrpSpPr>
-      <p:grpSpPr>
-        <a:xfrm>
-          <a:off x="0" y="0"/>
-          <a:ext cx="0" cy="0"/>
-          <a:chOff x="0" y="0"/>
-          <a:chExt cx="0" cy="0"/>
-        </a:xfrm>
-      </p:grpSpPr>
-      <p:sp>
-        <p:nvSpPr>
-          <p:cNvPr id="12" name="Content Placeholder 2">
-            <a:extLst>
-              <a:ext uri="{FF2B5EF4-FFF2-40B4-BE49-F238E27FC236}">
-                <a16:creationId xmlns:a16="http://schemas.microsoft.com/office/drawing/2014/main" id="{DD4082E8-6316-417D-BBFA-AB16CB7A80EA}"/>
-              </a:ext>
-            </a:extLst>
-          </p:cNvPr>
-          <p:cNvSpPr>
-            <a:spLocks noGrp="1"/>
-          </p:cNvSpPr>
-          <p:nvPr>
-            <p:ph idx="1"/>
-          </p:nvPr>
-        </p:nvSpPr>
-        <p:spPr>
-          <a:xfrm>
-            <a:off x="838200" y="1500160"/>
-            <a:ext cx="7887346" cy="4351338"/>
-          </a:xfrm>
-        </p:spPr>
-        <p:txBody>
-          <a:bodyPr/>
-          <a:lstStyle/>
-          <a:p>
-            <a:endParaRPr lang="en-US" dirty="0"/>
-          </a:p>
-        </p:txBody>
-      </p:sp>
-      <p:sp>
-        <p:nvSpPr>
-          <p:cNvPr id="2" name="Title 1">
-            <a:extLst>
-              <a:ext uri="{FF2B5EF4-FFF2-40B4-BE49-F238E27FC236}">
-                <a16:creationId xmlns:a16="http://schemas.microsoft.com/office/drawing/2014/main" id="{72DE2BE0-6BF7-46DE-A2FA-2BE59A698CA7}"/>
-              </a:ext>
-            </a:extLst>
-          </p:cNvPr>
-          <p:cNvSpPr>
-            <a:spLocks noGrp="1"/>
-          </p:cNvSpPr>
-          <p:nvPr>
-            <p:ph type="title"/>
-          </p:nvPr>
-        </p:nvSpPr>
-        <p:spPr/>
-        <p:txBody>
-          <a:bodyPr/>
-          <a:lstStyle/>
-          <a:p>
-            <a:r>
-              <a:rPr lang="en-US" dirty="0"/>
-              <a:t>Five general-purpose principles</a:t>
-            </a:r>
-          </a:p>
-        </p:txBody>
-      </p:sp>
-      <p:sp>
-        <p:nvSpPr>
-          <p:cNvPr id="4" name="Slide Number Placeholder 3">
-            <a:extLst>
-              <a:ext uri="{FF2B5EF4-FFF2-40B4-BE49-F238E27FC236}">
-                <a16:creationId xmlns:a16="http://schemas.microsoft.com/office/drawing/2014/main" id="{5337758A-1EB1-4A1C-8B7D-75DCD4944EA1}"/>
-              </a:ext>
-            </a:extLst>
-          </p:cNvPr>
-          <p:cNvSpPr>
-            <a:spLocks noGrp="1"/>
-          </p:cNvSpPr>
-          <p:nvPr>
-            <p:ph type="sldNum" sz="quarter" idx="12"/>
-          </p:nvPr>
-        </p:nvSpPr>
-        <p:spPr/>
-        <p:txBody>
-          <a:bodyPr/>
-          <a:lstStyle/>
-          <a:p>
-            <a:fld id="{20F37917-FD3A-4669-9018-DA04BCDD3D75}" type="slidenum">
-              <a:rPr lang="en-US" smtClean="0"/>
-              <a:t>8</a:t>
             </a:fld>
             <a:endParaRPr lang="en-US"/>
           </a:p>
@@ -19244,6 +18132,178 @@
 </p:sld>
 </file>
 
+<file path=ppt/slides/slide8.xml><?xml version="1.0" encoding="utf-8"?>
+<p:sld xmlns:a="http://schemas.openxmlformats.org/drawingml/2006/main" xmlns:r="http://schemas.openxmlformats.org/officeDocument/2006/relationships" xmlns:p="http://schemas.openxmlformats.org/presentationml/2006/main">
+  <p:cSld>
+    <p:spTree>
+      <p:nvGrpSpPr>
+        <p:cNvPr id="1" name=""/>
+        <p:cNvGrpSpPr/>
+        <p:nvPr/>
+      </p:nvGrpSpPr>
+      <p:grpSpPr>
+        <a:xfrm>
+          <a:off x="0" y="0"/>
+          <a:ext cx="0" cy="0"/>
+          <a:chOff x="0" y="0"/>
+          <a:chExt cx="0" cy="0"/>
+        </a:xfrm>
+      </p:grpSpPr>
+      <p:sp>
+        <p:nvSpPr>
+          <p:cNvPr id="2" name="Title 1">
+            <a:extLst>
+              <a:ext uri="{FF2B5EF4-FFF2-40B4-BE49-F238E27FC236}">
+                <a16:creationId xmlns:a16="http://schemas.microsoft.com/office/drawing/2014/main" id="{DC9F4794-369D-44FB-B164-F6964CA1AD15}"/>
+              </a:ext>
+            </a:extLst>
+          </p:cNvPr>
+          <p:cNvSpPr>
+            <a:spLocks noGrp="1"/>
+          </p:cNvSpPr>
+          <p:nvPr>
+            <p:ph type="title"/>
+          </p:nvPr>
+        </p:nvSpPr>
+        <p:spPr/>
+        <p:txBody>
+          <a:bodyPr/>
+          <a:lstStyle/>
+          <a:p>
+            <a:r>
+              <a:rPr lang="en-US" dirty="0"/>
+              <a:t>Principle 1. Use Good Names</a:t>
+            </a:r>
+          </a:p>
+        </p:txBody>
+      </p:sp>
+      <p:sp>
+        <p:nvSpPr>
+          <p:cNvPr id="3" name="Content Placeholder 2">
+            <a:extLst>
+              <a:ext uri="{FF2B5EF4-FFF2-40B4-BE49-F238E27FC236}">
+                <a16:creationId xmlns:a16="http://schemas.microsoft.com/office/drawing/2014/main" id="{3B66CA47-05F2-4D5A-9A18-00D41417B356}"/>
+              </a:ext>
+            </a:extLst>
+          </p:cNvPr>
+          <p:cNvSpPr>
+            <a:spLocks noGrp="1"/>
+          </p:cNvSpPr>
+          <p:nvPr>
+            <p:ph idx="1"/>
+          </p:nvPr>
+        </p:nvSpPr>
+        <p:spPr/>
+        <p:txBody>
+          <a:bodyPr/>
+          <a:lstStyle/>
+          <a:p>
+            <a:r>
+              <a:rPr lang="en-US" dirty="0"/>
+              <a:t>The name of a thing is a first clue to the reader about the thing means.</a:t>
+            </a:r>
+          </a:p>
+          <a:p>
+            <a:pPr lvl="1"/>
+            <a:r>
+              <a:rPr lang="en-US" dirty="0"/>
+              <a:t>often, it's the only clue </a:t>
+            </a:r>
+            <a:r>
+              <a:rPr lang="en-US" dirty="0">
+                <a:sym typeface="Wingdings" panose="05000000000000000000" pitchFamily="2" charset="2"/>
+              </a:rPr>
+              <a:t></a:t>
+            </a:r>
+          </a:p>
+          <a:p>
+            <a:r>
+              <a:rPr lang="en-US" dirty="0">
+                <a:sym typeface="Wingdings" panose="05000000000000000000" pitchFamily="2" charset="2"/>
+              </a:rPr>
+              <a:t>Use good names for </a:t>
+            </a:r>
+          </a:p>
+          <a:p>
+            <a:pPr lvl="1"/>
+            <a:r>
+              <a:rPr lang="en-US" dirty="0">
+                <a:sym typeface="Wingdings" panose="05000000000000000000" pitchFamily="2" charset="2"/>
+              </a:rPr>
+              <a:t>variables</a:t>
+            </a:r>
+          </a:p>
+          <a:p>
+            <a:pPr lvl="1"/>
+            <a:r>
+              <a:rPr lang="en-US" dirty="0">
+                <a:sym typeface="Wingdings" panose="05000000000000000000" pitchFamily="2" charset="2"/>
+              </a:rPr>
+              <a:t>functions</a:t>
+            </a:r>
+          </a:p>
+          <a:p>
+            <a:pPr lvl="1"/>
+            <a:r>
+              <a:rPr lang="en-US" dirty="0">
+                <a:sym typeface="Wingdings" panose="05000000000000000000" pitchFamily="2" charset="2"/>
+              </a:rPr>
+              <a:t>data types</a:t>
+            </a:r>
+          </a:p>
+          <a:p>
+            <a:pPr lvl="1"/>
+            <a:endParaRPr lang="en-US" dirty="0">
+              <a:sym typeface="Wingdings" panose="05000000000000000000" pitchFamily="2" charset="2"/>
+            </a:endParaRPr>
+          </a:p>
+          <a:p>
+            <a:endParaRPr lang="en-US" dirty="0"/>
+          </a:p>
+        </p:txBody>
+      </p:sp>
+      <p:sp>
+        <p:nvSpPr>
+          <p:cNvPr id="4" name="Slide Number Placeholder 3">
+            <a:extLst>
+              <a:ext uri="{FF2B5EF4-FFF2-40B4-BE49-F238E27FC236}">
+                <a16:creationId xmlns:a16="http://schemas.microsoft.com/office/drawing/2014/main" id="{2A0888DD-BA5C-448A-B165-5822928C8223}"/>
+              </a:ext>
+            </a:extLst>
+          </p:cNvPr>
+          <p:cNvSpPr>
+            <a:spLocks noGrp="1"/>
+          </p:cNvSpPr>
+          <p:nvPr>
+            <p:ph type="sldNum" sz="quarter" idx="12"/>
+          </p:nvPr>
+        </p:nvSpPr>
+        <p:spPr/>
+        <p:txBody>
+          <a:bodyPr/>
+          <a:lstStyle/>
+          <a:p>
+            <a:fld id="{20F37917-FD3A-4669-9018-DA04BCDD3D75}" type="slidenum">
+              <a:rPr lang="en-US" smtClean="0"/>
+              <a:t>8</a:t>
+            </a:fld>
+            <a:endParaRPr lang="en-US"/>
+          </a:p>
+        </p:txBody>
+      </p:sp>
+    </p:spTree>
+    <p:extLst>
+      <p:ext uri="{BB962C8B-B14F-4D97-AF65-F5344CB8AC3E}">
+        <p14:creationId xmlns:p14="http://schemas.microsoft.com/office/powerpoint/2010/main" val="864930455"/>
+      </p:ext>
+    </p:extLst>
+  </p:cSld>
+  <p:clrMapOvr>
+    <a:masterClrMapping/>
+  </p:clrMapOvr>
+</p:sld>
+</file>
+
 <file path=ppt/slides/slide9.xml><?xml version="1.0" encoding="utf-8"?>
 <p:sld xmlns:a="http://schemas.openxmlformats.org/drawingml/2006/main" xmlns:r="http://schemas.openxmlformats.org/officeDocument/2006/relationships" xmlns:p="http://schemas.openxmlformats.org/presentationml/2006/main">
   <p:cSld>
@@ -19263,10 +18323,38 @@
       </p:grpSpPr>
       <p:sp>
         <p:nvSpPr>
+          <p:cNvPr id="3" name="Content Placeholder 2">
+            <a:extLst>
+              <a:ext uri="{FF2B5EF4-FFF2-40B4-BE49-F238E27FC236}">
+                <a16:creationId xmlns:a16="http://schemas.microsoft.com/office/drawing/2014/main" id="{AF7FF626-6C20-46F7-99BB-CDAB1FDC4E55}"/>
+              </a:ext>
+            </a:extLst>
+          </p:cNvPr>
+          <p:cNvSpPr>
+            <a:spLocks noGrp="1"/>
+          </p:cNvSpPr>
+          <p:nvPr>
+            <p:ph idx="1"/>
+          </p:nvPr>
+        </p:nvSpPr>
+        <p:spPr/>
+        <p:txBody>
+          <a:bodyPr/>
+          <a:lstStyle/>
+          <a:p>
+            <a:r>
+              <a:rPr lang="en-US" dirty="0"/>
+              <a:t>Replace magic numbers with good names</a:t>
+            </a:r>
+          </a:p>
+        </p:txBody>
+      </p:sp>
+      <p:sp>
+        <p:nvSpPr>
           <p:cNvPr id="2" name="Title 1">
             <a:extLst>
               <a:ext uri="{FF2B5EF4-FFF2-40B4-BE49-F238E27FC236}">
-                <a16:creationId xmlns:a16="http://schemas.microsoft.com/office/drawing/2014/main" id="{DC9F4794-369D-44FB-B164-F6964CA1AD15}"/>
+                <a16:creationId xmlns:a16="http://schemas.microsoft.com/office/drawing/2014/main" id="{24B2B58F-79E6-4966-8892-01C19AEE2D55}"/>
               </a:ext>
             </a:extLst>
           </p:cNvPr>
@@ -19284,93 +18372,8 @@
           <a:p>
             <a:r>
               <a:rPr lang="en-US" dirty="0"/>
-              <a:t>Principle 1. Use Good Names</a:t>
-            </a:r>
-          </a:p>
-        </p:txBody>
-      </p:sp>
-      <p:sp>
-        <p:nvSpPr>
-          <p:cNvPr id="3" name="Content Placeholder 2">
-            <a:extLst>
-              <a:ext uri="{FF2B5EF4-FFF2-40B4-BE49-F238E27FC236}">
-                <a16:creationId xmlns:a16="http://schemas.microsoft.com/office/drawing/2014/main" id="{3B66CA47-05F2-4D5A-9A18-00D41417B356}"/>
-              </a:ext>
-            </a:extLst>
-          </p:cNvPr>
-          <p:cNvSpPr>
-            <a:spLocks noGrp="1"/>
-          </p:cNvSpPr>
-          <p:nvPr>
-            <p:ph idx="1"/>
-          </p:nvPr>
-        </p:nvSpPr>
-        <p:spPr/>
-        <p:txBody>
-          <a:bodyPr/>
-          <a:lstStyle/>
-          <a:p>
-            <a:r>
-              <a:rPr lang="en-US" dirty="0"/>
-              <a:t>The name of a thing is a first clue to the reader about the thing means.</a:t>
-            </a:r>
-          </a:p>
-          <a:p>
-            <a:pPr lvl="1"/>
-            <a:r>
-              <a:rPr lang="en-US" dirty="0"/>
-              <a:t>often, it's the only clue </a:t>
-            </a:r>
-            <a:r>
-              <a:rPr lang="en-US" dirty="0">
-                <a:sym typeface="Wingdings" panose="05000000000000000000" pitchFamily="2" charset="2"/>
-              </a:rPr>
-              <a:t></a:t>
-            </a:r>
-          </a:p>
-          <a:p>
-            <a:r>
-              <a:rPr lang="en-US" dirty="0">
-                <a:sym typeface="Wingdings" panose="05000000000000000000" pitchFamily="2" charset="2"/>
-              </a:rPr>
-              <a:t>Use good names for </a:t>
-            </a:r>
-          </a:p>
-          <a:p>
-            <a:pPr lvl="1"/>
-            <a:r>
-              <a:rPr lang="en-US" dirty="0">
-                <a:sym typeface="Wingdings" panose="05000000000000000000" pitchFamily="2" charset="2"/>
-              </a:rPr>
-              <a:t>variables</a:t>
-            </a:r>
-          </a:p>
-          <a:p>
-            <a:pPr lvl="1"/>
-            <a:r>
-              <a:rPr lang="en-US" dirty="0">
-                <a:sym typeface="Wingdings" panose="05000000000000000000" pitchFamily="2" charset="2"/>
-              </a:rPr>
-              <a:t>functions</a:t>
-            </a:r>
-          </a:p>
-          <a:p>
-            <a:pPr lvl="1"/>
-            <a:r>
-              <a:rPr lang="en-US" dirty="0">
-                <a:sym typeface="Wingdings" panose="05000000000000000000" pitchFamily="2" charset="2"/>
-              </a:rPr>
-              <a:t>data types</a:t>
-            </a:r>
-          </a:p>
-          <a:p>
-            <a:pPr lvl="1"/>
-            <a:endParaRPr lang="en-US" dirty="0">
-              <a:sym typeface="Wingdings" panose="05000000000000000000" pitchFamily="2" charset="2"/>
-            </a:endParaRPr>
-          </a:p>
-          <a:p>
-            <a:endParaRPr lang="en-US" dirty="0"/>
+              <a:t>Good Names for Constants</a:t>
+            </a:r>
           </a:p>
         </p:txBody>
       </p:sp>
@@ -19379,7 +18382,7 @@
           <p:cNvPr id="4" name="Slide Number Placeholder 3">
             <a:extLst>
               <a:ext uri="{FF2B5EF4-FFF2-40B4-BE49-F238E27FC236}">
-                <a16:creationId xmlns:a16="http://schemas.microsoft.com/office/drawing/2014/main" id="{2A0888DD-BA5C-448A-B165-5822928C8223}"/>
+                <a16:creationId xmlns:a16="http://schemas.microsoft.com/office/drawing/2014/main" id="{C148B8F1-7E78-4C30-93AF-017843AEEBF0}"/>
               </a:ext>
             </a:extLst>
           </p:cNvPr>
@@ -19403,16 +18406,885 @@
           </a:p>
         </p:txBody>
       </p:sp>
+      <p:sp>
+        <p:nvSpPr>
+          <p:cNvPr id="6" name="Rectangle 5">
+            <a:extLst>
+              <a:ext uri="{FF2B5EF4-FFF2-40B4-BE49-F238E27FC236}">
+                <a16:creationId xmlns:a16="http://schemas.microsoft.com/office/drawing/2014/main" id="{BD40DC19-940C-4417-B7DE-E77FCDC9039E}"/>
+              </a:ext>
+            </a:extLst>
+          </p:cNvPr>
+          <p:cNvSpPr/>
+          <p:nvPr/>
+        </p:nvSpPr>
+        <p:spPr>
+          <a:xfrm>
+            <a:off x="1106659" y="4303431"/>
+            <a:ext cx="6989298" cy="830997"/>
+          </a:xfrm>
+          <a:prstGeom prst="rect">
+            <a:avLst/>
+          </a:prstGeom>
+        </p:spPr>
+        <p:txBody>
+          <a:bodyPr wrap="square">
+            <a:spAutoFit/>
+          </a:bodyPr>
+          <a:lstStyle/>
+          <a:p>
+            <a:r>
+              <a:rPr lang="en-US" sz="2400" dirty="0">
+                <a:solidFill>
+                  <a:srgbClr val="0000FF"/>
+                </a:solidFill>
+                <a:latin typeface="Consolas" panose="020B0609020204030204" pitchFamily="49" charset="0"/>
+              </a:rPr>
+              <a:t>const</a:t>
+            </a:r>
+            <a:r>
+              <a:rPr lang="en-US" sz="2400" dirty="0">
+                <a:solidFill>
+                  <a:srgbClr val="000000"/>
+                </a:solidFill>
+                <a:latin typeface="Consolas" panose="020B0609020204030204" pitchFamily="49" charset="0"/>
+              </a:rPr>
+              <a:t> </a:t>
+            </a:r>
+            <a:r>
+              <a:rPr lang="en-US" sz="2400" dirty="0" err="1">
+                <a:solidFill>
+                  <a:srgbClr val="000000"/>
+                </a:solidFill>
+                <a:latin typeface="Consolas" panose="020B0609020204030204" pitchFamily="49" charset="0"/>
+              </a:rPr>
+              <a:t>salesTaxRate</a:t>
+            </a:r>
+            <a:r>
+              <a:rPr lang="en-US" sz="2400" dirty="0">
+                <a:solidFill>
+                  <a:srgbClr val="000000"/>
+                </a:solidFill>
+                <a:latin typeface="Consolas" panose="020B0609020204030204" pitchFamily="49" charset="0"/>
+              </a:rPr>
+              <a:t> = </a:t>
+            </a:r>
+            <a:r>
+              <a:rPr lang="en-US" sz="2400" dirty="0">
+                <a:solidFill>
+                  <a:srgbClr val="098658"/>
+                </a:solidFill>
+                <a:latin typeface="Consolas" panose="020B0609020204030204" pitchFamily="49" charset="0"/>
+              </a:rPr>
+              <a:t>1.06</a:t>
+            </a:r>
+            <a:endParaRPr lang="en-US" sz="2400" dirty="0">
+              <a:solidFill>
+                <a:srgbClr val="000000"/>
+              </a:solidFill>
+              <a:latin typeface="Consolas" panose="020B0609020204030204" pitchFamily="49" charset="0"/>
+            </a:endParaRPr>
+          </a:p>
+          <a:p>
+            <a:r>
+              <a:rPr lang="en-US" sz="2400" dirty="0">
+                <a:solidFill>
+                  <a:srgbClr val="0000FF"/>
+                </a:solidFill>
+                <a:latin typeface="Consolas" panose="020B0609020204030204" pitchFamily="49" charset="0"/>
+              </a:rPr>
+              <a:t>let</a:t>
+            </a:r>
+            <a:r>
+              <a:rPr lang="en-US" sz="2400" dirty="0">
+                <a:solidFill>
+                  <a:srgbClr val="000000"/>
+                </a:solidFill>
+                <a:latin typeface="Consolas" panose="020B0609020204030204" pitchFamily="49" charset="0"/>
+              </a:rPr>
+              <a:t> </a:t>
+            </a:r>
+            <a:r>
+              <a:rPr lang="en-US" sz="2400" dirty="0" err="1">
+                <a:solidFill>
+                  <a:srgbClr val="000000"/>
+                </a:solidFill>
+                <a:latin typeface="Consolas" panose="020B0609020204030204" pitchFamily="49" charset="0"/>
+              </a:rPr>
+              <a:t>salesPrice</a:t>
+            </a:r>
+            <a:r>
+              <a:rPr lang="en-US" sz="2400" dirty="0">
+                <a:solidFill>
+                  <a:srgbClr val="000000"/>
+                </a:solidFill>
+                <a:latin typeface="Consolas" panose="020B0609020204030204" pitchFamily="49" charset="0"/>
+              </a:rPr>
+              <a:t> = </a:t>
+            </a:r>
+            <a:r>
+              <a:rPr lang="en-US" sz="2400" dirty="0" err="1">
+                <a:solidFill>
+                  <a:srgbClr val="000000"/>
+                </a:solidFill>
+                <a:latin typeface="Consolas" panose="020B0609020204030204" pitchFamily="49" charset="0"/>
+              </a:rPr>
+              <a:t>netPrice</a:t>
+            </a:r>
+            <a:r>
+              <a:rPr lang="en-US" sz="2400" dirty="0">
+                <a:solidFill>
+                  <a:srgbClr val="000000"/>
+                </a:solidFill>
+                <a:latin typeface="Consolas" panose="020B0609020204030204" pitchFamily="49" charset="0"/>
+              </a:rPr>
+              <a:t> * </a:t>
+            </a:r>
+            <a:r>
+              <a:rPr lang="en-US" sz="2400" dirty="0" err="1">
+                <a:solidFill>
+                  <a:srgbClr val="000000"/>
+                </a:solidFill>
+                <a:latin typeface="Consolas" panose="020B0609020204030204" pitchFamily="49" charset="0"/>
+              </a:rPr>
+              <a:t>salesTaxRate</a:t>
+            </a:r>
+            <a:endParaRPr lang="en-US" sz="2400" b="0" dirty="0">
+              <a:solidFill>
+                <a:srgbClr val="000000"/>
+              </a:solidFill>
+              <a:effectLst/>
+              <a:latin typeface="Consolas" panose="020B0609020204030204" pitchFamily="49" charset="0"/>
+            </a:endParaRPr>
+          </a:p>
+        </p:txBody>
+      </p:sp>
+      <p:sp>
+        <p:nvSpPr>
+          <p:cNvPr id="7" name="AutoShape 4">
+            <a:extLst>
+              <a:ext uri="{FF2B5EF4-FFF2-40B4-BE49-F238E27FC236}">
+                <a16:creationId xmlns:a16="http://schemas.microsoft.com/office/drawing/2014/main" id="{FD331EB5-169C-42E5-B9CC-13F6AE91D8EF}"/>
+              </a:ext>
+            </a:extLst>
+          </p:cNvPr>
+          <p:cNvSpPr>
+            <a:spLocks/>
+          </p:cNvSpPr>
+          <p:nvPr/>
+        </p:nvSpPr>
+        <p:spPr bwMode="auto">
+          <a:xfrm rot="10800000" flipH="1">
+            <a:off x="3511721" y="3190466"/>
+            <a:ext cx="642938" cy="649572"/>
+          </a:xfrm>
+          <a:custGeom>
+            <a:avLst/>
+            <a:gdLst>
+              <a:gd name="T0" fmla="*/ 10800 w 21600"/>
+              <a:gd name="T1" fmla="*/ 10800 h 21600"/>
+              <a:gd name="T2" fmla="*/ 10800 w 21600"/>
+              <a:gd name="T3" fmla="*/ 10800 h 21600"/>
+              <a:gd name="T4" fmla="*/ 10800 w 21600"/>
+              <a:gd name="T5" fmla="*/ 10800 h 21600"/>
+              <a:gd name="T6" fmla="*/ 10800 w 21600"/>
+              <a:gd name="T7" fmla="*/ 10800 h 21600"/>
+            </a:gdLst>
+            <a:ahLst/>
+            <a:cxnLst>
+              <a:cxn ang="0">
+                <a:pos x="T0" y="T1"/>
+              </a:cxn>
+              <a:cxn ang="0">
+                <a:pos x="T2" y="T3"/>
+              </a:cxn>
+              <a:cxn ang="0">
+                <a:pos x="T4" y="T5"/>
+              </a:cxn>
+              <a:cxn ang="0">
+                <a:pos x="T6" y="T7"/>
+              </a:cxn>
+            </a:cxnLst>
+            <a:rect l="0" t="0" r="r" b="b"/>
+            <a:pathLst>
+              <a:path w="21600" h="21600">
+                <a:moveTo>
+                  <a:pt x="0" y="21600"/>
+                </a:moveTo>
+                <a:lnTo>
+                  <a:pt x="21600" y="21600"/>
+                </a:lnTo>
+                <a:lnTo>
+                  <a:pt x="10800" y="0"/>
+                </a:lnTo>
+                <a:close/>
+              </a:path>
+            </a:pathLst>
+          </a:custGeom>
+          <a:blipFill dpi="0" rotWithShape="0">
+            <a:blip r:embed="rId2"/>
+            <a:srcRect/>
+            <a:tile tx="0" ty="0" sx="100000" sy="100000" flip="none" algn="tl"/>
+          </a:blipFill>
+          <a:ln w="25400" cap="flat" cmpd="sng">
+            <a:solidFill>
+              <a:srgbClr val="000000"/>
+            </a:solidFill>
+            <a:prstDash val="solid"/>
+            <a:miter lim="400000"/>
+            <a:headEnd type="none" w="med" len="med"/>
+            <a:tailEnd type="none" w="med" len="med"/>
+          </a:ln>
+          <a:effectLst/>
+          <a:extLst>
+            <a:ext uri="{AF507438-7753-43E0-B8FC-AC1667EBCBE1}">
+              <a14:hiddenEffects xmlns:a14="http://schemas.microsoft.com/office/drawing/2010/main">
+                <a:effectLst>
+                  <a:outerShdw dist="35921" dir="2700000" algn="ctr" rotWithShape="0">
+                    <a:srgbClr val="808080"/>
+                  </a:outerShdw>
+                </a:effectLst>
+              </a14:hiddenEffects>
+            </a:ext>
+          </a:extLst>
+        </p:spPr>
+        <p:txBody>
+          <a:bodyPr lIns="35719" tIns="35719" rIns="35719" bIns="35719" anchor="ctr"/>
+          <a:lstStyle/>
+          <a:p>
+            <a:endParaRPr lang="en-US" altLang="en-US" sz="2812">
+              <a:solidFill>
+                <a:srgbClr val="FFFFFF"/>
+              </a:solidFill>
+              <a:effectLst>
+                <a:outerShdw blurRad="38100" dist="38100" dir="2700000" algn="tl">
+                  <a:srgbClr val="C0C0C0"/>
+                </a:outerShdw>
+              </a:effectLst>
+              <a:latin typeface="Gill Sans" charset="0"/>
+              <a:ea typeface="Gill Sans" charset="0"/>
+              <a:cs typeface="Gill Sans" charset="0"/>
+              <a:sym typeface="Gill Sans" charset="0"/>
+            </a:endParaRPr>
+          </a:p>
+        </p:txBody>
+      </p:sp>
+      <p:sp>
+        <p:nvSpPr>
+          <p:cNvPr id="8" name="TextBox 7">
+            <a:extLst>
+              <a:ext uri="{FF2B5EF4-FFF2-40B4-BE49-F238E27FC236}">
+                <a16:creationId xmlns:a16="http://schemas.microsoft.com/office/drawing/2014/main" id="{A5566C5A-2723-4BE1-800E-C3B7684AFE6C}"/>
+              </a:ext>
+            </a:extLst>
+          </p:cNvPr>
+          <p:cNvSpPr txBox="1"/>
+          <p:nvPr/>
+        </p:nvSpPr>
+        <p:spPr>
+          <a:xfrm>
+            <a:off x="7556804" y="1689867"/>
+            <a:ext cx="4106486" cy="1325563"/>
+          </a:xfrm>
+          <a:prstGeom prst="rect">
+            <a:avLst/>
+          </a:prstGeom>
+          <a:solidFill>
+            <a:schemeClr val="accent2">
+              <a:lumMod val="20000"/>
+              <a:lumOff val="80000"/>
+            </a:schemeClr>
+          </a:solidFill>
+          <a:ln>
+            <a:solidFill>
+              <a:srgbClr val="0070C0"/>
+            </a:solidFill>
+          </a:ln>
+        </p:spPr>
+        <p:style>
+          <a:lnRef idx="2">
+            <a:schemeClr val="accent1">
+              <a:shade val="50000"/>
+            </a:schemeClr>
+          </a:lnRef>
+          <a:fillRef idx="1">
+            <a:schemeClr val="accent1"/>
+          </a:fillRef>
+          <a:effectRef idx="0">
+            <a:schemeClr val="accent1"/>
+          </a:effectRef>
+          <a:fontRef idx="minor">
+            <a:schemeClr val="lt1"/>
+          </a:fontRef>
+        </p:style>
+        <p:txBody>
+          <a:bodyPr rot="0" spcFirstLastPara="0" vertOverflow="overflow" horzOverflow="overflow" vert="horz" wrap="square" lIns="91440" tIns="45720" rIns="91440" bIns="45720" numCol="1" spcCol="0" rtlCol="0" fromWordArt="0" anchor="ctr" anchorCtr="0" forceAA="0" compatLnSpc="1">
+            <a:prstTxWarp prst="textNoShape">
+              <a:avLst/>
+            </a:prstTxWarp>
+            <a:noAutofit/>
+          </a:bodyPr>
+          <a:lstStyle>
+            <a:defPPr>
+              <a:defRPr lang="en-US"/>
+            </a:defPPr>
+            <a:lvl1pPr>
+              <a:defRPr sz="2400" b="1">
+                <a:latin typeface="Ink Free" panose="03080402000500000000" pitchFamily="66" charset="0"/>
+              </a:defRPr>
+            </a:lvl1pPr>
+            <a:lvl2pPr>
+              <a:defRPr>
+                <a:solidFill>
+                  <a:schemeClr val="lt1"/>
+                </a:solidFill>
+              </a:defRPr>
+            </a:lvl2pPr>
+            <a:lvl3pPr>
+              <a:defRPr>
+                <a:solidFill>
+                  <a:schemeClr val="lt1"/>
+                </a:solidFill>
+              </a:defRPr>
+            </a:lvl3pPr>
+            <a:lvl4pPr>
+              <a:defRPr>
+                <a:solidFill>
+                  <a:schemeClr val="lt1"/>
+                </a:solidFill>
+              </a:defRPr>
+            </a:lvl4pPr>
+            <a:lvl5pPr>
+              <a:defRPr>
+                <a:solidFill>
+                  <a:schemeClr val="lt1"/>
+                </a:solidFill>
+              </a:defRPr>
+            </a:lvl5pPr>
+            <a:lvl6pPr>
+              <a:defRPr>
+                <a:solidFill>
+                  <a:schemeClr val="lt1"/>
+                </a:solidFill>
+              </a:defRPr>
+            </a:lvl6pPr>
+            <a:lvl7pPr>
+              <a:defRPr>
+                <a:solidFill>
+                  <a:schemeClr val="lt1"/>
+                </a:solidFill>
+              </a:defRPr>
+            </a:lvl7pPr>
+            <a:lvl8pPr>
+              <a:defRPr>
+                <a:solidFill>
+                  <a:schemeClr val="lt1"/>
+                </a:solidFill>
+              </a:defRPr>
+            </a:lvl8pPr>
+            <a:lvl9pPr>
+              <a:defRPr>
+                <a:solidFill>
+                  <a:schemeClr val="lt1"/>
+                </a:solidFill>
+              </a:defRPr>
+            </a:lvl9pPr>
+          </a:lstStyle>
+          <a:p>
+            <a:r>
+              <a:rPr lang="en-US" dirty="0">
+                <a:solidFill>
+                  <a:schemeClr val="tx1"/>
+                </a:solidFill>
+              </a:rPr>
+              <a:t>Where did that 1.06 come from?</a:t>
+            </a:r>
+          </a:p>
+        </p:txBody>
+      </p:sp>
+      <p:sp>
+        <p:nvSpPr>
+          <p:cNvPr id="9" name="TextBox 8">
+            <a:extLst>
+              <a:ext uri="{FF2B5EF4-FFF2-40B4-BE49-F238E27FC236}">
+                <a16:creationId xmlns:a16="http://schemas.microsoft.com/office/drawing/2014/main" id="{3B942932-185F-4F3B-B0CC-A71E9E5DF034}"/>
+              </a:ext>
+            </a:extLst>
+          </p:cNvPr>
+          <p:cNvSpPr txBox="1"/>
+          <p:nvPr/>
+        </p:nvSpPr>
+        <p:spPr>
+          <a:xfrm>
+            <a:off x="8053755" y="3305885"/>
+            <a:ext cx="4106486" cy="2735320"/>
+          </a:xfrm>
+          <a:prstGeom prst="rect">
+            <a:avLst/>
+          </a:prstGeom>
+          <a:solidFill>
+            <a:schemeClr val="accent2">
+              <a:lumMod val="20000"/>
+              <a:lumOff val="80000"/>
+            </a:schemeClr>
+          </a:solidFill>
+          <a:ln>
+            <a:solidFill>
+              <a:srgbClr val="0070C0"/>
+            </a:solidFill>
+          </a:ln>
+        </p:spPr>
+        <p:style>
+          <a:lnRef idx="2">
+            <a:schemeClr val="accent1">
+              <a:shade val="50000"/>
+            </a:schemeClr>
+          </a:lnRef>
+          <a:fillRef idx="1">
+            <a:schemeClr val="accent1"/>
+          </a:fillRef>
+          <a:effectRef idx="0">
+            <a:schemeClr val="accent1"/>
+          </a:effectRef>
+          <a:fontRef idx="minor">
+            <a:schemeClr val="lt1"/>
+          </a:fontRef>
+        </p:style>
+        <p:txBody>
+          <a:bodyPr rot="0" spcFirstLastPara="0" vertOverflow="overflow" horzOverflow="overflow" vert="horz" wrap="square" lIns="91440" tIns="45720" rIns="91440" bIns="45720" numCol="1" spcCol="0" rtlCol="0" fromWordArt="0" anchor="ctr" anchorCtr="0" forceAA="0" compatLnSpc="1">
+            <a:prstTxWarp prst="textNoShape">
+              <a:avLst/>
+            </a:prstTxWarp>
+            <a:noAutofit/>
+          </a:bodyPr>
+          <a:lstStyle>
+            <a:defPPr>
+              <a:defRPr lang="en-US"/>
+            </a:defPPr>
+            <a:lvl1pPr>
+              <a:defRPr sz="2400" b="1">
+                <a:latin typeface="Ink Free" panose="03080402000500000000" pitchFamily="66" charset="0"/>
+              </a:defRPr>
+            </a:lvl1pPr>
+            <a:lvl2pPr>
+              <a:defRPr>
+                <a:solidFill>
+                  <a:schemeClr val="lt1"/>
+                </a:solidFill>
+              </a:defRPr>
+            </a:lvl2pPr>
+            <a:lvl3pPr>
+              <a:defRPr>
+                <a:solidFill>
+                  <a:schemeClr val="lt1"/>
+                </a:solidFill>
+              </a:defRPr>
+            </a:lvl3pPr>
+            <a:lvl4pPr>
+              <a:defRPr>
+                <a:solidFill>
+                  <a:schemeClr val="lt1"/>
+                </a:solidFill>
+              </a:defRPr>
+            </a:lvl4pPr>
+            <a:lvl5pPr>
+              <a:defRPr>
+                <a:solidFill>
+                  <a:schemeClr val="lt1"/>
+                </a:solidFill>
+              </a:defRPr>
+            </a:lvl5pPr>
+            <a:lvl6pPr>
+              <a:defRPr>
+                <a:solidFill>
+                  <a:schemeClr val="lt1"/>
+                </a:solidFill>
+              </a:defRPr>
+            </a:lvl6pPr>
+            <a:lvl7pPr>
+              <a:defRPr>
+                <a:solidFill>
+                  <a:schemeClr val="lt1"/>
+                </a:solidFill>
+              </a:defRPr>
+            </a:lvl7pPr>
+            <a:lvl8pPr>
+              <a:defRPr>
+                <a:solidFill>
+                  <a:schemeClr val="lt1"/>
+                </a:solidFill>
+              </a:defRPr>
+            </a:lvl8pPr>
+            <a:lvl9pPr>
+              <a:defRPr>
+                <a:solidFill>
+                  <a:schemeClr val="lt1"/>
+                </a:solidFill>
+              </a:defRPr>
+            </a:lvl9pPr>
+          </a:lstStyle>
+          <a:p>
+            <a:r>
+              <a:rPr lang="en-US" dirty="0">
+                <a:solidFill>
+                  <a:schemeClr val="tx1"/>
+                </a:solidFill>
+              </a:rPr>
+              <a:t>Oh, it's the sales tax?  Are there many occurrences of that 1.06 in your code? (Probably!) Will the sales tax rate ever change? (Probably!)</a:t>
+            </a:r>
+          </a:p>
+          <a:p>
+            <a:endParaRPr lang="en-US" dirty="0">
+              <a:solidFill>
+                <a:schemeClr val="tx1"/>
+              </a:solidFill>
+            </a:endParaRPr>
+          </a:p>
+          <a:p>
+            <a:r>
+              <a:rPr lang="en-US" dirty="0">
+                <a:solidFill>
+                  <a:schemeClr val="tx1"/>
+                </a:solidFill>
+              </a:rPr>
+              <a:t>Let's fix it!</a:t>
+            </a:r>
+          </a:p>
+        </p:txBody>
+      </p:sp>
+      <p:sp>
+        <p:nvSpPr>
+          <p:cNvPr id="10" name="Rectangle 9">
+            <a:extLst>
+              <a:ext uri="{FF2B5EF4-FFF2-40B4-BE49-F238E27FC236}">
+                <a16:creationId xmlns:a16="http://schemas.microsoft.com/office/drawing/2014/main" id="{6050C85E-D369-42A5-BF5F-D710CEBA79BF}"/>
+              </a:ext>
+            </a:extLst>
+          </p:cNvPr>
+          <p:cNvSpPr/>
+          <p:nvPr/>
+        </p:nvSpPr>
+        <p:spPr>
+          <a:xfrm>
+            <a:off x="1106659" y="2192248"/>
+            <a:ext cx="4237057" cy="369332"/>
+          </a:xfrm>
+          <a:prstGeom prst="rect">
+            <a:avLst/>
+          </a:prstGeom>
+        </p:spPr>
+        <p:txBody>
+          <a:bodyPr wrap="none">
+            <a:spAutoFit/>
+          </a:bodyPr>
+          <a:lstStyle/>
+          <a:p>
+            <a:r>
+              <a:rPr lang="en-US" dirty="0">
+                <a:solidFill>
+                  <a:srgbClr val="0000FF"/>
+                </a:solidFill>
+                <a:latin typeface="Consolas" panose="020B0609020204030204" pitchFamily="49" charset="0"/>
+              </a:rPr>
+              <a:t>let</a:t>
+            </a:r>
+            <a:r>
+              <a:rPr lang="en-US" dirty="0">
+                <a:solidFill>
+                  <a:srgbClr val="000000"/>
+                </a:solidFill>
+                <a:latin typeface="Consolas" panose="020B0609020204030204" pitchFamily="49" charset="0"/>
+              </a:rPr>
+              <a:t> </a:t>
+            </a:r>
+            <a:r>
+              <a:rPr lang="en-US" dirty="0" err="1">
+                <a:solidFill>
+                  <a:srgbClr val="000000"/>
+                </a:solidFill>
+                <a:latin typeface="Consolas" panose="020B0609020204030204" pitchFamily="49" charset="0"/>
+              </a:rPr>
+              <a:t>salesprice</a:t>
+            </a:r>
+            <a:r>
+              <a:rPr lang="en-US" dirty="0">
+                <a:solidFill>
+                  <a:srgbClr val="000000"/>
+                </a:solidFill>
+                <a:latin typeface="Consolas" panose="020B0609020204030204" pitchFamily="49" charset="0"/>
+              </a:rPr>
+              <a:t> = </a:t>
+            </a:r>
+            <a:r>
+              <a:rPr lang="en-US" dirty="0" err="1">
+                <a:solidFill>
+                  <a:srgbClr val="000000"/>
+                </a:solidFill>
+                <a:latin typeface="Consolas" panose="020B0609020204030204" pitchFamily="49" charset="0"/>
+              </a:rPr>
+              <a:t>netPrice</a:t>
+            </a:r>
+            <a:r>
+              <a:rPr lang="en-US" dirty="0">
+                <a:solidFill>
+                  <a:srgbClr val="000000"/>
+                </a:solidFill>
+                <a:latin typeface="Consolas" panose="020B0609020204030204" pitchFamily="49" charset="0"/>
+              </a:rPr>
+              <a:t> * </a:t>
+            </a:r>
+            <a:r>
+              <a:rPr lang="en-US" dirty="0">
+                <a:solidFill>
+                  <a:srgbClr val="098658"/>
+                </a:solidFill>
+                <a:latin typeface="Consolas" panose="020B0609020204030204" pitchFamily="49" charset="0"/>
+              </a:rPr>
+              <a:t>1.06</a:t>
+            </a:r>
+            <a:endParaRPr lang="en-US" b="0" dirty="0">
+              <a:solidFill>
+                <a:srgbClr val="000000"/>
+              </a:solidFill>
+              <a:effectLst/>
+              <a:latin typeface="Consolas" panose="020B0609020204030204" pitchFamily="49" charset="0"/>
+            </a:endParaRPr>
+          </a:p>
+        </p:txBody>
+      </p:sp>
     </p:spTree>
     <p:extLst>
       <p:ext uri="{BB962C8B-B14F-4D97-AF65-F5344CB8AC3E}">
-        <p14:creationId xmlns:p14="http://schemas.microsoft.com/office/powerpoint/2010/main" val="864930455"/>
+        <p14:creationId xmlns:p14="http://schemas.microsoft.com/office/powerpoint/2010/main" val="4128917540"/>
       </p:ext>
     </p:extLst>
   </p:cSld>
   <p:clrMapOvr>
     <a:masterClrMapping/>
   </p:clrMapOvr>
+  <p:timing>
+    <p:tnLst>
+      <p:par>
+        <p:cTn id="1" dur="indefinite" restart="never" nodeType="tmRoot">
+          <p:childTnLst>
+            <p:seq concurrent="1" nextAc="seek">
+              <p:cTn id="2" dur="indefinite" nodeType="mainSeq">
+                <p:childTnLst>
+                  <p:par>
+                    <p:cTn id="3" fill="hold">
+                      <p:stCondLst>
+                        <p:cond delay="indefinite"/>
+                      </p:stCondLst>
+                      <p:childTnLst>
+                        <p:par>
+                          <p:cTn id="4" fill="hold">
+                            <p:stCondLst>
+                              <p:cond delay="0"/>
+                            </p:stCondLst>
+                            <p:childTnLst>
+                              <p:par>
+                                <p:cTn id="5" presetID="1" presetClass="entr" presetSubtype="0" fill="hold" grpId="0" nodeType="clickEffect">
+                                  <p:stCondLst>
+                                    <p:cond delay="0"/>
+                                  </p:stCondLst>
+                                  <p:childTnLst>
+                                    <p:set>
+                                      <p:cBhvr>
+                                        <p:cTn id="6" dur="1" fill="hold">
+                                          <p:stCondLst>
+                                            <p:cond delay="0"/>
+                                          </p:stCondLst>
+                                        </p:cTn>
+                                        <p:tgtEl>
+                                          <p:spTgt spid="8"/>
+                                        </p:tgtEl>
+                                        <p:attrNameLst>
+                                          <p:attrName>style.visibility</p:attrName>
+                                        </p:attrNameLst>
+                                      </p:cBhvr>
+                                      <p:to>
+                                        <p:strVal val="visible"/>
+                                      </p:to>
+                                    </p:set>
+                                  </p:childTnLst>
+                                </p:cTn>
+                              </p:par>
+                            </p:childTnLst>
+                          </p:cTn>
+                        </p:par>
+                      </p:childTnLst>
+                    </p:cTn>
+                  </p:par>
+                  <p:par>
+                    <p:cTn id="7" fill="hold">
+                      <p:stCondLst>
+                        <p:cond delay="indefinite"/>
+                      </p:stCondLst>
+                      <p:childTnLst>
+                        <p:par>
+                          <p:cTn id="8" fill="hold">
+                            <p:stCondLst>
+                              <p:cond delay="0"/>
+                            </p:stCondLst>
+                            <p:childTnLst>
+                              <p:par>
+                                <p:cTn id="9" presetID="1" presetClass="entr" presetSubtype="0" fill="hold" grpId="0" nodeType="clickEffect">
+                                  <p:stCondLst>
+                                    <p:cond delay="0"/>
+                                  </p:stCondLst>
+                                  <p:childTnLst>
+                                    <p:set>
+                                      <p:cBhvr>
+                                        <p:cTn id="10" dur="1" fill="hold">
+                                          <p:stCondLst>
+                                            <p:cond delay="0"/>
+                                          </p:stCondLst>
+                                        </p:cTn>
+                                        <p:tgtEl>
+                                          <p:spTgt spid="9"/>
+                                        </p:tgtEl>
+                                        <p:attrNameLst>
+                                          <p:attrName>style.visibility</p:attrName>
+                                        </p:attrNameLst>
+                                      </p:cBhvr>
+                                      <p:to>
+                                        <p:strVal val="visible"/>
+                                      </p:to>
+                                    </p:set>
+                                  </p:childTnLst>
+                                </p:cTn>
+                              </p:par>
+                            </p:childTnLst>
+                          </p:cTn>
+                        </p:par>
+                      </p:childTnLst>
+                    </p:cTn>
+                  </p:par>
+                  <p:par>
+                    <p:cTn id="11" fill="hold">
+                      <p:stCondLst>
+                        <p:cond delay="indefinite"/>
+                      </p:stCondLst>
+                      <p:childTnLst>
+                        <p:par>
+                          <p:cTn id="12" fill="hold">
+                            <p:stCondLst>
+                              <p:cond delay="0"/>
+                            </p:stCondLst>
+                            <p:childTnLst>
+                              <p:par>
+                                <p:cTn id="13" presetID="22" presetClass="entr" presetSubtype="1" fill="hold" grpId="0" nodeType="clickEffect">
+                                  <p:stCondLst>
+                                    <p:cond delay="0"/>
+                                  </p:stCondLst>
+                                  <p:childTnLst>
+                                    <p:set>
+                                      <p:cBhvr>
+                                        <p:cTn id="14" dur="1" fill="hold">
+                                          <p:stCondLst>
+                                            <p:cond delay="0"/>
+                                          </p:stCondLst>
+                                        </p:cTn>
+                                        <p:tgtEl>
+                                          <p:spTgt spid="7"/>
+                                        </p:tgtEl>
+                                        <p:attrNameLst>
+                                          <p:attrName>style.visibility</p:attrName>
+                                        </p:attrNameLst>
+                                      </p:cBhvr>
+                                      <p:to>
+                                        <p:strVal val="visible"/>
+                                      </p:to>
+                                    </p:set>
+                                    <p:animEffect transition="in" filter="wipe(up)">
+                                      <p:cBhvr>
+                                        <p:cTn id="15" dur="500"/>
+                                        <p:tgtEl>
+                                          <p:spTgt spid="7"/>
+                                        </p:tgtEl>
+                                      </p:cBhvr>
+                                    </p:animEffect>
+                                  </p:childTnLst>
+                                </p:cTn>
+                              </p:par>
+                            </p:childTnLst>
+                          </p:cTn>
+                        </p:par>
+                        <p:par>
+                          <p:cTn id="16" fill="hold">
+                            <p:stCondLst>
+                              <p:cond delay="500"/>
+                            </p:stCondLst>
+                            <p:childTnLst>
+                              <p:par>
+                                <p:cTn id="17" presetID="10" presetClass="entr" presetSubtype="0" fill="hold" grpId="0" nodeType="afterEffect">
+                                  <p:stCondLst>
+                                    <p:cond delay="0"/>
+                                  </p:stCondLst>
+                                  <p:childTnLst>
+                                    <p:set>
+                                      <p:cBhvr>
+                                        <p:cTn id="18" dur="1" fill="hold">
+                                          <p:stCondLst>
+                                            <p:cond delay="0"/>
+                                          </p:stCondLst>
+                                        </p:cTn>
+                                        <p:tgtEl>
+                                          <p:spTgt spid="6"/>
+                                        </p:tgtEl>
+                                        <p:attrNameLst>
+                                          <p:attrName>style.visibility</p:attrName>
+                                        </p:attrNameLst>
+                                      </p:cBhvr>
+                                      <p:to>
+                                        <p:strVal val="visible"/>
+                                      </p:to>
+                                    </p:set>
+                                    <p:animEffect transition="in" filter="fade">
+                                      <p:cBhvr>
+                                        <p:cTn id="19" dur="500"/>
+                                        <p:tgtEl>
+                                          <p:spTgt spid="6"/>
+                                        </p:tgtEl>
+                                      </p:cBhvr>
+                                    </p:animEffect>
+                                  </p:childTnLst>
+                                </p:cTn>
+                              </p:par>
+                            </p:childTnLst>
+                          </p:cTn>
+                        </p:par>
+                      </p:childTnLst>
+                    </p:cTn>
+                  </p:par>
+                </p:childTnLst>
+              </p:cTn>
+              <p:prevCondLst>
+                <p:cond evt="onPrev" delay="0">
+                  <p:tgtEl>
+                    <p:sldTgt/>
+                  </p:tgtEl>
+                </p:cond>
+              </p:prevCondLst>
+              <p:nextCondLst>
+                <p:cond evt="onNext" delay="0">
+                  <p:tgtEl>
+                    <p:sldTgt/>
+                  </p:tgtEl>
+                </p:cond>
+              </p:nextCondLst>
+            </p:seq>
+          </p:childTnLst>
+        </p:cTn>
+      </p:par>
+    </p:tnLst>
+    <p:bldLst>
+      <p:bldP spid="6" grpId="0"/>
+      <p:bldP spid="7" grpId="0" animBg="1" autoUpdateAnimBg="0"/>
+      <p:bldP spid="8" grpId="0" animBg="1"/>
+      <p:bldP spid="9" grpId="0" animBg="1"/>
+    </p:bldLst>
+  </p:timing>
 </p:sld>
 </file>
 

</xml_diff>

<commit_message>
fixed code on Slide 25
</commit_message>
<xml_diff>
--- a/Slides/Lesson 1.2 General Program Design Principles.pptx
+++ b/Slides/Lesson 1.2 General Program Design Principles.pptx
@@ -9,8 +9,8 @@
   </p:notesMasterIdLst>
   <p:sldIdLst>
     <p:sldId id="256" r:id="rId2"/>
-    <p:sldId id="302" r:id="rId3"/>
-    <p:sldId id="355" r:id="rId4"/>
+    <p:sldId id="355" r:id="rId3"/>
+    <p:sldId id="302" r:id="rId4"/>
     <p:sldId id="351" r:id="rId5"/>
     <p:sldId id="352" r:id="rId6"/>
     <p:sldId id="353" r:id="rId7"/>
@@ -223,7 +223,7 @@
           <a:p>
             <a:fld id="{7C7E5181-6CF5-45F7-A87A-E0E0B1FD7549}" type="datetimeFigureOut">
               <a:rPr lang="en-US" smtClean="0"/>
-              <a:t>1/11/2021</a:t>
+              <a:t>1/14/2021</a:t>
             </a:fld>
             <a:endParaRPr lang="en-US"/>
           </a:p>
@@ -637,6 +637,93 @@
 </p:notes>
 </file>
 
+<file path=ppt/notesSlides/notesSlide3.xml><?xml version="1.0" encoding="utf-8"?>
+<p:notes xmlns:a="http://schemas.openxmlformats.org/drawingml/2006/main" xmlns:r="http://schemas.openxmlformats.org/officeDocument/2006/relationships" xmlns:p="http://schemas.openxmlformats.org/presentationml/2006/main">
+  <p:cSld>
+    <p:spTree>
+      <p:nvGrpSpPr>
+        <p:cNvPr id="1" name=""/>
+        <p:cNvGrpSpPr/>
+        <p:nvPr/>
+      </p:nvGrpSpPr>
+      <p:grpSpPr>
+        <a:xfrm>
+          <a:off x="0" y="0"/>
+          <a:ext cx="0" cy="0"/>
+          <a:chOff x="0" y="0"/>
+          <a:chExt cx="0" cy="0"/>
+        </a:xfrm>
+      </p:grpSpPr>
+      <p:sp>
+        <p:nvSpPr>
+          <p:cNvPr id="2" name="Slide Image Placeholder 1"/>
+          <p:cNvSpPr>
+            <a:spLocks noGrp="1" noRot="1" noChangeAspect="1"/>
+          </p:cNvSpPr>
+          <p:nvPr>
+            <p:ph type="sldImg"/>
+          </p:nvPr>
+        </p:nvSpPr>
+        <p:spPr/>
+      </p:sp>
+      <p:sp>
+        <p:nvSpPr>
+          <p:cNvPr id="3" name="Notes Placeholder 2"/>
+          <p:cNvSpPr>
+            <a:spLocks noGrp="1"/>
+          </p:cNvSpPr>
+          <p:nvPr>
+            <p:ph type="body" idx="1"/>
+          </p:nvPr>
+        </p:nvSpPr>
+        <p:spPr/>
+        <p:txBody>
+          <a:bodyPr/>
+          <a:lstStyle/>
+          <a:p>
+            <a:r>
+              <a:rPr lang="en-US" dirty="0"/>
+              <a:t>True story: My first draft of this code was quite different and had several bugs.  I eventually located the bugs by rewriting the code with one function/one job.   When I did that, it was easy to see which part was broken.</a:t>
+            </a:r>
+          </a:p>
+        </p:txBody>
+      </p:sp>
+      <p:sp>
+        <p:nvSpPr>
+          <p:cNvPr id="4" name="Slide Number Placeholder 3"/>
+          <p:cNvSpPr>
+            <a:spLocks noGrp="1"/>
+          </p:cNvSpPr>
+          <p:nvPr>
+            <p:ph type="sldNum" sz="quarter" idx="5"/>
+          </p:nvPr>
+        </p:nvSpPr>
+        <p:spPr/>
+        <p:txBody>
+          <a:bodyPr/>
+          <a:lstStyle/>
+          <a:p>
+            <a:fld id="{07937F07-1250-4CCE-B198-1B2887014F41}" type="slidenum">
+              <a:rPr lang="en-US" smtClean="0"/>
+              <a:t>25</a:t>
+            </a:fld>
+            <a:endParaRPr lang="en-US"/>
+          </a:p>
+        </p:txBody>
+      </p:sp>
+    </p:spTree>
+    <p:extLst>
+      <p:ext uri="{BB962C8B-B14F-4D97-AF65-F5344CB8AC3E}">
+        <p14:creationId xmlns:p14="http://schemas.microsoft.com/office/powerpoint/2010/main" val="2253570917"/>
+      </p:ext>
+    </p:extLst>
+  </p:cSld>
+  <p:clrMapOvr>
+    <a:masterClrMapping/>
+  </p:clrMapOvr>
+</p:notes>
+</file>
+
 <file path=ppt/slideLayouts/slideLayout1.xml><?xml version="1.0" encoding="utf-8"?>
 <p:sldLayout xmlns:a="http://schemas.openxmlformats.org/drawingml/2006/main" xmlns:r="http://schemas.openxmlformats.org/officeDocument/2006/relationships" xmlns:p="http://schemas.openxmlformats.org/presentationml/2006/main" type="title" preserve="1">
   <p:cSld name="Title Slide">
@@ -791,7 +878,7 @@
           <a:p>
             <a:fld id="{5D2A64DE-480B-420F-9649-4F8E696E08E0}" type="datetime1">
               <a:rPr lang="en-US" smtClean="0"/>
-              <a:t>1/11/2021</a:t>
+              <a:t>1/14/2021</a:t>
             </a:fld>
             <a:endParaRPr lang="en-US"/>
           </a:p>
@@ -1025,7 +1112,7 @@
           <a:p>
             <a:fld id="{0D3616D0-8311-4107-9726-6B805E7D05BA}" type="datetime1">
               <a:rPr lang="en-US" smtClean="0"/>
-              <a:t>1/11/2021</a:t>
+              <a:t>1/14/2021</a:t>
             </a:fld>
             <a:endParaRPr lang="en-US"/>
           </a:p>
@@ -1233,7 +1320,7 @@
           <a:p>
             <a:fld id="{3BC2557A-5C88-417A-A763-5AC779462A5F}" type="datetime1">
               <a:rPr lang="en-US" smtClean="0"/>
-              <a:t>1/11/2021</a:t>
+              <a:t>1/14/2021</a:t>
             </a:fld>
             <a:endParaRPr lang="en-US"/>
           </a:p>
@@ -1757,7 +1844,7 @@
           <a:p>
             <a:fld id="{07C7BFD4-467E-4EDE-93EA-052F5B39A4E5}" type="datetime1">
               <a:rPr lang="en-US" smtClean="0"/>
-              <a:t>1/11/2021</a:t>
+              <a:t>1/14/2021</a:t>
             </a:fld>
             <a:endParaRPr lang="en-US"/>
           </a:p>
@@ -2070,7 +2157,7 @@
           <a:p>
             <a:fld id="{A533CBE2-D5BE-47AC-ADC2-9CDFC1D0CF90}" type="datetime1">
               <a:rPr lang="en-US" smtClean="0"/>
-              <a:t>1/11/2021</a:t>
+              <a:t>1/14/2021</a:t>
             </a:fld>
             <a:endParaRPr lang="en-US"/>
           </a:p>
@@ -2371,7 +2458,7 @@
           <a:p>
             <a:fld id="{39B7EDB1-CE74-4951-85A2-0B01C2128E28}" type="datetime1">
               <a:rPr lang="en-US" smtClean="0"/>
-              <a:t>1/11/2021</a:t>
+              <a:t>1/14/2021</a:t>
             </a:fld>
             <a:endParaRPr lang="en-US"/>
           </a:p>
@@ -2819,7 +2906,7 @@
           <a:p>
             <a:fld id="{2BC7EB92-A5C2-4807-A9DC-9EDE6CBFB241}" type="datetime1">
               <a:rPr lang="en-US" smtClean="0"/>
-              <a:t>1/11/2021</a:t>
+              <a:t>1/14/2021</a:t>
             </a:fld>
             <a:endParaRPr lang="en-US"/>
           </a:p>
@@ -2965,7 +3052,7 @@
           <a:p>
             <a:fld id="{109E55A0-C911-4F03-82FC-7E5926047D46}" type="datetime1">
               <a:rPr lang="en-US" smtClean="0"/>
-              <a:t>1/11/2021</a:t>
+              <a:t>1/14/2021</a:t>
             </a:fld>
             <a:endParaRPr lang="en-US"/>
           </a:p>
@@ -3114,7 +3201,7 @@
           <a:p>
             <a:fld id="{2B7B7EE0-7771-4CD5-9B2B-3550753A54A1}" type="datetime1">
               <a:rPr lang="en-US" smtClean="0"/>
-              <a:t>1/11/2021</a:t>
+              <a:t>1/14/2021</a:t>
             </a:fld>
             <a:endParaRPr lang="en-US"/>
           </a:p>
@@ -3425,7 +3512,7 @@
           <a:p>
             <a:fld id="{F8B318B3-0E87-4416-A9B8-D891968C2727}" type="datetime1">
               <a:rPr lang="en-US" smtClean="0"/>
-              <a:t>1/11/2021</a:t>
+              <a:t>1/14/2021</a:t>
             </a:fld>
             <a:endParaRPr lang="en-US"/>
           </a:p>
@@ -3713,7 +3800,7 @@
           <a:p>
             <a:fld id="{EA476A42-A091-4468-A075-64A31BE59948}" type="datetime1">
               <a:rPr lang="en-US" smtClean="0"/>
-              <a:t>1/11/2021</a:t>
+              <a:t>1/14/2021</a:t>
             </a:fld>
             <a:endParaRPr lang="en-US"/>
           </a:p>
@@ -3954,7 +4041,7 @@
           <a:p>
             <a:fld id="{54D997E8-DDEE-43F1-8D9B-F8A1E11DE488}" type="datetime1">
               <a:rPr lang="en-US" smtClean="0"/>
-              <a:t>1/11/2021</a:t>
+              <a:t>1/14/2021</a:t>
             </a:fld>
             <a:endParaRPr lang="en-US"/>
           </a:p>
@@ -4428,7 +4515,7 @@
               <a:rPr lang="en-US" altLang="en-US" sz="3200" dirty="0">
                 <a:sym typeface="Helvetica Neue" charset="0"/>
               </a:rPr>
-              <a:t>Lesson 1.2 Program Design Principles (Part 1)</a:t>
+              <a:t>Lesson 1.2 General Program Design Principles</a:t>
             </a:r>
             <a:endParaRPr lang="en-US" sz="3200" dirty="0"/>
           </a:p>
@@ -8099,8 +8186,8 @@
         </p:nvSpPr>
         <p:spPr>
           <a:xfrm>
-            <a:off x="1193018" y="1845153"/>
-            <a:ext cx="4363720" cy="369332"/>
+            <a:off x="1193017" y="1845153"/>
+            <a:ext cx="5708743" cy="461665"/>
           </a:xfrm>
           <a:prstGeom prst="rect">
             <a:avLst/>
@@ -8114,7 +8201,7 @@
           <a:p>
             <a:pPr algn="l"/>
             <a:r>
-              <a:rPr lang="en-US" dirty="0">
+              <a:rPr lang="en-US" sz="2400" dirty="0">
                 <a:solidFill>
                   <a:srgbClr val="0000FF"/>
                 </a:solidFill>
@@ -8123,30 +8210,30 @@
               <a:t>function</a:t>
             </a:r>
             <a:r>
-              <a:rPr lang="en-US" dirty="0">
+              <a:rPr lang="en-US" sz="2400" dirty="0">
                 <a:latin typeface="Consolas" panose="020B0609020204030204" pitchFamily="49" charset="0"/>
               </a:rPr>
               <a:t> </a:t>
             </a:r>
             <a:r>
-              <a:rPr lang="en-US" dirty="0" err="1">
+              <a:rPr lang="en-US" sz="2400" dirty="0" err="1">
                 <a:latin typeface="Consolas" panose="020B0609020204030204" pitchFamily="49" charset="0"/>
               </a:rPr>
               <a:t>checkLine</a:t>
             </a:r>
             <a:r>
-              <a:rPr lang="en-US" dirty="0">
+              <a:rPr lang="en-US" sz="2400" dirty="0">
                 <a:latin typeface="Consolas" panose="020B0609020204030204" pitchFamily="49" charset="0"/>
               </a:rPr>
               <a:t> () : </a:t>
             </a:r>
             <a:r>
-              <a:rPr lang="en-US" dirty="0" err="1">
+              <a:rPr lang="en-US" sz="2400" dirty="0" err="1">
                 <a:latin typeface="Consolas" panose="020B0609020204030204" pitchFamily="49" charset="0"/>
               </a:rPr>
               <a:t>boolean</a:t>
             </a:r>
-            <a:endParaRPr lang="en-US" dirty="0">
+            <a:endParaRPr lang="en-US" sz="2400" dirty="0">
               <a:latin typeface="Consolas" panose="020B0609020204030204" pitchFamily="49" charset="0"/>
             </a:endParaRPr>
           </a:p>
@@ -8167,7 +8254,7 @@
         <p:spPr>
           <a:xfrm>
             <a:off x="1205424" y="3632981"/>
-            <a:ext cx="4683648" cy="369332"/>
+            <a:ext cx="6118322" cy="461665"/>
           </a:xfrm>
           <a:prstGeom prst="rect">
             <a:avLst/>
@@ -8181,7 +8268,7 @@
           <a:p>
             <a:pPr algn="l"/>
             <a:r>
-              <a:rPr lang="en-US" dirty="0">
+              <a:rPr lang="en-US" sz="2400" dirty="0">
                 <a:solidFill>
                   <a:srgbClr val="0000FF"/>
                 </a:solidFill>
@@ -8190,30 +8277,30 @@
               <a:t>function</a:t>
             </a:r>
             <a:r>
-              <a:rPr lang="en-US" dirty="0">
+              <a:rPr lang="en-US" sz="2400" dirty="0">
                 <a:latin typeface="Consolas" panose="020B0609020204030204" pitchFamily="49" charset="0"/>
               </a:rPr>
               <a:t> </a:t>
             </a:r>
             <a:r>
-              <a:rPr lang="en-US" dirty="0" err="1">
+              <a:rPr lang="en-US" sz="2400" dirty="0" err="1">
                 <a:latin typeface="Consolas" panose="020B0609020204030204" pitchFamily="49" charset="0"/>
               </a:rPr>
               <a:t>isLineTooLong</a:t>
             </a:r>
             <a:r>
-              <a:rPr lang="en-US" dirty="0">
+              <a:rPr lang="en-US" sz="2400" dirty="0">
                 <a:latin typeface="Consolas" panose="020B0609020204030204" pitchFamily="49" charset="0"/>
               </a:rPr>
               <a:t> () : </a:t>
             </a:r>
             <a:r>
-              <a:rPr lang="en-US" dirty="0" err="1">
+              <a:rPr lang="en-US" sz="2400" dirty="0" err="1">
                 <a:latin typeface="Consolas" panose="020B0609020204030204" pitchFamily="49" charset="0"/>
               </a:rPr>
               <a:t>boolean</a:t>
             </a:r>
-            <a:endParaRPr lang="en-US" dirty="0">
+            <a:endParaRPr lang="en-US" sz="2400" dirty="0">
               <a:latin typeface="Consolas" panose="020B0609020204030204" pitchFamily="49" charset="0"/>
             </a:endParaRPr>
           </a:p>
@@ -8235,7 +8322,7 @@
         </p:nvSpPr>
         <p:spPr bwMode="auto">
           <a:xfrm rot="10800000" flipH="1">
-            <a:off x="2746912" y="2496994"/>
+            <a:off x="3547248" y="2496994"/>
             <a:ext cx="861451" cy="728025"/>
           </a:xfrm>
           <a:custGeom>
@@ -8343,7 +8430,7 @@
         </p:nvSpPr>
         <p:spPr>
           <a:xfrm>
-            <a:off x="6508654" y="1606068"/>
+            <a:off x="6901760" y="1609448"/>
             <a:ext cx="3894404" cy="1216834"/>
           </a:xfrm>
           <a:prstGeom prst="rect">
@@ -8476,7 +8563,7 @@
         </p:nvSpPr>
         <p:spPr>
           <a:xfrm>
-            <a:off x="6508654" y="3486493"/>
+            <a:off x="7869594" y="3532659"/>
             <a:ext cx="3894404" cy="662307"/>
           </a:xfrm>
           <a:prstGeom prst="rect">
@@ -8960,7 +9047,7 @@
         <p:spPr>
           <a:xfrm>
             <a:off x="2365717" y="2596720"/>
-            <a:ext cx="6096000" cy="646331"/>
+            <a:ext cx="6096000" cy="830997"/>
           </a:xfrm>
           <a:prstGeom prst="rect">
             <a:avLst/>
@@ -8973,7 +9060,7 @@
           <a:lstStyle/>
           <a:p>
             <a:r>
-              <a:rPr lang="en-US" dirty="0">
+              <a:rPr lang="en-US" sz="2400" dirty="0">
                 <a:solidFill>
                   <a:srgbClr val="0000FF"/>
                 </a:solidFill>
@@ -8982,7 +9069,7 @@
               <a:t>let</a:t>
             </a:r>
             <a:r>
-              <a:rPr lang="en-US" dirty="0">
+              <a:rPr lang="en-US" sz="2400" dirty="0">
                 <a:solidFill>
                   <a:srgbClr val="000000"/>
                 </a:solidFill>
@@ -8991,7 +9078,7 @@
               <a:t> c = </a:t>
             </a:r>
             <a:r>
-              <a:rPr lang="en-US" dirty="0">
+              <a:rPr lang="en-US" sz="2400" dirty="0">
                 <a:solidFill>
                   <a:srgbClr val="0000FF"/>
                 </a:solidFill>
@@ -9000,7 +9087,7 @@
               <a:t>new</a:t>
             </a:r>
             <a:r>
-              <a:rPr lang="en-US" dirty="0">
+              <a:rPr lang="en-US" sz="2400" dirty="0">
                 <a:solidFill>
                   <a:srgbClr val="000000"/>
                 </a:solidFill>
@@ -9009,7 +9096,7 @@
               <a:t> Circle(</a:t>
             </a:r>
             <a:r>
-              <a:rPr lang="en-US" dirty="0" err="1">
+              <a:rPr lang="en-US" sz="2400" dirty="0" err="1">
                 <a:solidFill>
                   <a:srgbClr val="000000"/>
                 </a:solidFill>
@@ -9018,7 +9105,7 @@
               <a:t>initRadius</a:t>
             </a:r>
             <a:r>
-              <a:rPr lang="en-US" dirty="0">
+              <a:rPr lang="en-US" sz="2400" dirty="0">
                 <a:solidFill>
                   <a:srgbClr val="000000"/>
                 </a:solidFill>
@@ -9029,7 +9116,7 @@
           </a:p>
           <a:p>
             <a:r>
-              <a:rPr lang="en-US" dirty="0">
+              <a:rPr lang="en-US" sz="2400" dirty="0">
                 <a:solidFill>
                   <a:srgbClr val="0000FF"/>
                 </a:solidFill>
@@ -9038,7 +9125,7 @@
               <a:t>let</a:t>
             </a:r>
             <a:r>
-              <a:rPr lang="en-US" dirty="0">
+              <a:rPr lang="en-US" sz="2400" dirty="0">
                 <a:solidFill>
                   <a:srgbClr val="000000"/>
                 </a:solidFill>
@@ -9047,7 +9134,7 @@
               <a:t> a = </a:t>
             </a:r>
             <a:r>
-              <a:rPr lang="en-US" dirty="0" err="1">
+              <a:rPr lang="en-US" sz="2400" dirty="0" err="1">
                 <a:solidFill>
                   <a:srgbClr val="000000"/>
                 </a:solidFill>
@@ -9056,7 +9143,7 @@
               <a:t>c.diameter</a:t>
             </a:r>
             <a:r>
-              <a:rPr lang="en-US" dirty="0">
+              <a:rPr lang="en-US" sz="2400" dirty="0">
                 <a:solidFill>
                   <a:srgbClr val="000000"/>
                 </a:solidFill>
@@ -9064,7 +9151,7 @@
               </a:rPr>
               <a:t>()</a:t>
             </a:r>
-            <a:endParaRPr lang="en-US" b="0" dirty="0">
+            <a:endParaRPr lang="en-US" sz="2400" b="0" dirty="0">
               <a:solidFill>
                 <a:srgbClr val="000000"/>
               </a:solidFill>
@@ -9088,8 +9175,8 @@
         </p:nvSpPr>
         <p:spPr>
           <a:xfrm>
-            <a:off x="2365717" y="4014378"/>
-            <a:ext cx="3819378" cy="369332"/>
+            <a:off x="2365717" y="3821166"/>
+            <a:ext cx="5077670" cy="461665"/>
           </a:xfrm>
           <a:prstGeom prst="rect">
             <a:avLst/>
@@ -9102,7 +9189,7 @@
           <a:lstStyle/>
           <a:p>
             <a:r>
-              <a:rPr lang="en-US" dirty="0">
+              <a:rPr lang="en-US" sz="2400" dirty="0">
                 <a:solidFill>
                   <a:srgbClr val="0000FF"/>
                 </a:solidFill>
@@ -9111,7 +9198,7 @@
               <a:t>let</a:t>
             </a:r>
             <a:r>
-              <a:rPr lang="en-US" dirty="0">
+              <a:rPr lang="en-US" sz="2400" dirty="0">
                 <a:solidFill>
                   <a:srgbClr val="000000"/>
                 </a:solidFill>
@@ -9120,7 +9207,7 @@
               <a:t> a = </a:t>
             </a:r>
             <a:r>
-              <a:rPr lang="en-US" dirty="0" err="1">
+              <a:rPr lang="en-US" sz="2400" dirty="0" err="1">
                 <a:solidFill>
                   <a:srgbClr val="000000"/>
                 </a:solidFill>
@@ -9128,7 +9215,16 @@
               </a:rPr>
               <a:t>c.calculateDiameter</a:t>
             </a:r>
-            <a:endParaRPr lang="en-US" b="0" dirty="0">
+            <a:r>
+              <a:rPr lang="en-US" sz="2400" dirty="0">
+                <a:solidFill>
+                  <a:srgbClr val="000000"/>
+                </a:solidFill>
+                <a:latin typeface="Consolas" panose="020B0609020204030204" pitchFamily="49" charset="0"/>
+              </a:rPr>
+              <a:t>()</a:t>
+            </a:r>
+            <a:endParaRPr lang="en-US" sz="2400" b="0" dirty="0">
               <a:solidFill>
                 <a:srgbClr val="000000"/>
               </a:solidFill>
@@ -9152,7 +9248,7 @@
         </p:nvSpPr>
         <p:spPr>
           <a:xfrm>
-            <a:off x="7598901" y="2299480"/>
+            <a:off x="8034998" y="2273843"/>
             <a:ext cx="3894404" cy="1899564"/>
           </a:xfrm>
           <a:prstGeom prst="rect">
@@ -9266,7 +9362,7 @@
                   <a:schemeClr val="tx1"/>
                 </a:solidFill>
               </a:rPr>
-              <a:t>Your workplace should have coding standards for things like this.  This particular item is part of Prof. Wand's personal coding standard</a:t>
+              <a:t>Your workplace should have coding standards for things like this.  This particular item is part of Prof. Wand's personal coding practice</a:t>
             </a:r>
           </a:p>
         </p:txBody>
@@ -9286,7 +9382,7 @@
         <p:spPr>
           <a:xfrm>
             <a:off x="2365717" y="5599610"/>
-            <a:ext cx="4110421" cy="369332"/>
+            <a:ext cx="5452134" cy="461665"/>
           </a:xfrm>
           <a:prstGeom prst="rect">
             <a:avLst/>
@@ -9299,7 +9395,7 @@
           <a:lstStyle/>
           <a:p>
             <a:r>
-              <a:rPr lang="en-US" dirty="0">
+              <a:rPr lang="en-US" sz="2400" dirty="0">
                 <a:solidFill>
                   <a:srgbClr val="000000"/>
                 </a:solidFill>
@@ -9307,7 +9403,7 @@
               </a:rPr>
               <a:t>table1.addItem(student1,grade1)</a:t>
             </a:r>
-            <a:endParaRPr lang="en-US" b="0" dirty="0">
+            <a:endParaRPr lang="en-US" sz="2400" b="0" dirty="0">
               <a:solidFill>
                 <a:srgbClr val="000000"/>
               </a:solidFill>
@@ -9393,7 +9489,9 @@
         </p:nvSpPr>
         <p:spPr/>
         <p:txBody>
-          <a:bodyPr/>
+          <a:bodyPr>
+            <a:normAutofit/>
+          </a:bodyPr>
           <a:lstStyle/>
           <a:p>
             <a:r>
@@ -9407,11 +9505,11 @@
               <a:buAutoNum type="arabicPeriod"/>
             </a:pPr>
             <a:r>
-              <a:rPr lang="en-US" dirty="0"/>
+              <a:rPr lang="en-US" sz="2800" dirty="0"/>
               <a:t>Decide </a:t>
             </a:r>
             <a:r>
-              <a:rPr lang="en-US" dirty="0">
+              <a:rPr lang="en-US" sz="2800" dirty="0">
                 <a:solidFill>
                   <a:srgbClr val="FF0000"/>
                 </a:solidFill>
@@ -9419,7 +9517,7 @@
               <a:t>what part </a:t>
             </a:r>
             <a:r>
-              <a:rPr lang="en-US" dirty="0"/>
+              <a:rPr lang="en-US" sz="2800" dirty="0"/>
               <a:t>of the information in the "real world" needs to be represented as data</a:t>
             </a:r>
           </a:p>
@@ -9429,11 +9527,11 @@
               <a:buAutoNum type="arabicPeriod"/>
             </a:pPr>
             <a:r>
-              <a:rPr lang="en-US" dirty="0"/>
+              <a:rPr lang="en-US" sz="2800" dirty="0"/>
               <a:t>Decide </a:t>
             </a:r>
             <a:r>
-              <a:rPr lang="en-US" dirty="0">
+              <a:rPr lang="en-US" sz="2800" dirty="0">
                 <a:solidFill>
                   <a:srgbClr val="FF0000"/>
                 </a:solidFill>
@@ -9441,7 +9539,7 @@
               <a:t>how</a:t>
             </a:r>
             <a:r>
-              <a:rPr lang="en-US" dirty="0"/>
+              <a:rPr lang="en-US" sz="2800" dirty="0"/>
               <a:t> that information needs to be represented as data</a:t>
             </a:r>
           </a:p>
@@ -9451,11 +9549,11 @@
               <a:buAutoNum type="arabicPeriod"/>
             </a:pPr>
             <a:r>
-              <a:rPr lang="en-US" dirty="0"/>
+              <a:rPr lang="en-US" sz="2800" dirty="0"/>
               <a:t>Document how to </a:t>
             </a:r>
             <a:r>
-              <a:rPr lang="en-US" dirty="0">
+              <a:rPr lang="en-US" sz="2800" dirty="0">
                 <a:solidFill>
                   <a:srgbClr val="FF0000"/>
                 </a:solidFill>
@@ -9463,7 +9561,7 @@
               <a:t>interpret</a:t>
             </a:r>
             <a:r>
-              <a:rPr lang="en-US" dirty="0"/>
+              <a:rPr lang="en-US" sz="2800" dirty="0"/>
               <a:t> the data in your computer as information about the real world</a:t>
             </a:r>
           </a:p>
@@ -9631,12 +9729,6 @@
             </a:r>
           </a:p>
           <a:p>
-            <a:r>
-              <a:rPr lang="en-US" dirty="0"/>
-              <a:t>I need to represent the fact that red is the color of my shirt.</a:t>
-            </a:r>
-          </a:p>
-          <a:p>
             <a:pPr lvl="1"/>
             <a:endParaRPr lang="en-US" dirty="0"/>
           </a:p>
@@ -9752,7 +9844,7 @@
           <a:p>
             <a:r>
               <a:rPr lang="en-US" dirty="0"/>
-              <a:t>Of course, we first need to represent my shirt</a:t>
+              <a:t>And of course we also need to represent my shirt.</a:t>
             </a:r>
           </a:p>
           <a:p>
@@ -10291,7 +10383,10 @@
             <a:endParaRPr lang="en-US" dirty="0"/>
           </a:p>
           <a:p>
-            <a:endParaRPr lang="en-US" dirty="0"/>
+            <a:r>
+              <a:rPr lang="en-US" dirty="0"/>
+              <a:t> </a:t>
+            </a:r>
           </a:p>
           <a:p>
             <a:endParaRPr lang="en-US" dirty="0"/>
@@ -11063,23 +11158,7 @@
                   <a:schemeClr val="tx1"/>
                 </a:solidFill>
               </a:rPr>
-              <a:t>The fancy name for this is "The Single </a:t>
-            </a:r>
-            <a:r>
-              <a:rPr lang="en-US" dirty="0" err="1">
-                <a:solidFill>
-                  <a:schemeClr val="tx1"/>
-                </a:solidFill>
-              </a:rPr>
-              <a:t>Resonsibility</a:t>
-            </a:r>
-            <a:r>
-              <a:rPr lang="en-US" dirty="0">
-                <a:solidFill>
-                  <a:schemeClr val="tx1"/>
-                </a:solidFill>
-              </a:rPr>
-              <a:t> Principle".  You can use this if you want to impress your coop interviewer.</a:t>
+              <a:t>The fancy name for this is "The Single Responsibility Principle".  You can use this if you want to impress your coop interviewer.</a:t>
             </a:r>
           </a:p>
         </p:txBody>
@@ -11243,7 +11322,7 @@
         </p:nvSpPr>
         <p:spPr>
           <a:xfrm>
-            <a:off x="8725546" y="4479917"/>
+            <a:off x="8513735" y="1636992"/>
             <a:ext cx="2936929" cy="1755846"/>
           </a:xfrm>
           <a:prstGeom prst="rect">
@@ -11376,7 +11455,7 @@
         </p:nvSpPr>
         <p:spPr>
           <a:xfrm>
-            <a:off x="8725545" y="2297081"/>
+            <a:off x="8513735" y="3788416"/>
             <a:ext cx="2936929" cy="945522"/>
           </a:xfrm>
           <a:prstGeom prst="rect">
@@ -11530,7 +11609,7 @@
           <p:cNvPr id="2" name="Title 1">
             <a:extLst>
               <a:ext uri="{FF2B5EF4-FFF2-40B4-BE49-F238E27FC236}">
-                <a16:creationId xmlns:a16="http://schemas.microsoft.com/office/drawing/2014/main" id="{B6D33575-0593-49FD-831F-131BB6CC7E6C}"/>
+                <a16:creationId xmlns:a16="http://schemas.microsoft.com/office/drawing/2014/main" id="{4F8F7B5D-FB6C-436E-B15E-6071C1AF4E43}"/>
               </a:ext>
             </a:extLst>
           </p:cNvPr>
@@ -11548,17 +11627,17 @@
           <a:p>
             <a:r>
               <a:rPr lang="en-US" dirty="0"/>
-              <a:t>Learning Objectives for this Lesson</a:t>
-            </a:r>
-          </a:p>
-        </p:txBody>
-      </p:sp>
-      <p:sp>
-        <p:nvSpPr>
-          <p:cNvPr id="3" name="Text Placeholder 2">
-            <a:extLst>
-              <a:ext uri="{FF2B5EF4-FFF2-40B4-BE49-F238E27FC236}">
-                <a16:creationId xmlns:a16="http://schemas.microsoft.com/office/drawing/2014/main" id="{5B21ECCD-9823-405F-AA9A-D0CC235AD583}"/>
+              <a:t>Outline of this lesson</a:t>
+            </a:r>
+          </a:p>
+        </p:txBody>
+      </p:sp>
+      <p:sp>
+        <p:nvSpPr>
+          <p:cNvPr id="3" name="Content Placeholder 2">
+            <a:extLst>
+              <a:ext uri="{FF2B5EF4-FFF2-40B4-BE49-F238E27FC236}">
+                <a16:creationId xmlns:a16="http://schemas.microsoft.com/office/drawing/2014/main" id="{A35947AF-DDC1-4EDB-B11F-00E505483FD1}"/>
               </a:ext>
             </a:extLst>
           </p:cNvPr>
@@ -11574,43 +11653,63 @@
           <a:bodyPr/>
           <a:lstStyle/>
           <a:p>
+            <a:pPr marL="514350" indent="-514350">
+              <a:buFont typeface="+mj-lt"/>
+              <a:buAutoNum type="arabicPeriod"/>
+            </a:pPr>
             <a:r>
               <a:rPr lang="en-US" dirty="0"/>
-              <a:t>By the end of this lesson you should be able to:</a:t>
-            </a:r>
-          </a:p>
-          <a:p>
-            <a:pPr lvl="1" fontAlgn="base"/>
+              <a:t>The purposes of the principles</a:t>
+            </a:r>
+          </a:p>
+          <a:p>
+            <a:pPr marL="514350" indent="-514350">
+              <a:buFont typeface="+mj-lt"/>
+              <a:buAutoNum type="arabicPeriod"/>
+            </a:pPr>
             <a:r>
               <a:rPr lang="en-US" dirty="0"/>
-              <a:t>Describe the purpose of our design principles </a:t>
-            </a:r>
-          </a:p>
-          <a:p>
-            <a:pPr lvl="1" fontAlgn="base"/>
+              <a:t>Difficulties the principles should help with</a:t>
+            </a:r>
+          </a:p>
+          <a:p>
+            <a:pPr marL="514350" indent="-514350">
+              <a:buFont typeface="+mj-lt"/>
+              <a:buAutoNum type="arabicPeriod"/>
+            </a:pPr>
             <a:r>
               <a:rPr lang="en-US" dirty="0"/>
-              <a:t>List 5 general design principles and illustrate their expression in code</a:t>
-            </a:r>
-          </a:p>
-          <a:p>
-            <a:pPr lvl="1" fontAlgn="base"/>
+              <a:t>Five general-purpose principles</a:t>
+            </a:r>
+          </a:p>
+          <a:p>
+            <a:pPr lvl="1"/>
             <a:r>
               <a:rPr lang="en-US" dirty="0"/>
-              <a:t>Identify some violations of the principles and suggest ways to mitigate them</a:t>
-            </a:r>
-          </a:p>
-          <a:p>
+              <a:t>usable for all programming, not just object-oriented</a:t>
+            </a:r>
+          </a:p>
+          <a:p>
+            <a:pPr lvl="1"/>
             <a:endParaRPr lang="en-US" dirty="0"/>
           </a:p>
-        </p:txBody>
-      </p:sp>
-      <p:sp>
-        <p:nvSpPr>
-          <p:cNvPr id="5" name="Slide Number Placeholder 4">
-            <a:extLst>
-              <a:ext uri="{FF2B5EF4-FFF2-40B4-BE49-F238E27FC236}">
-                <a16:creationId xmlns:a16="http://schemas.microsoft.com/office/drawing/2014/main" id="{D3CB1048-3EB8-4281-8361-E7EB70F6FBBC}"/>
+          <a:p>
+            <a:pPr marL="0" indent="0">
+              <a:buNone/>
+            </a:pPr>
+            <a:r>
+              <a:rPr lang="en-US" dirty="0"/>
+              <a:t>In the next lesson, we'll present five more principles that are specific to object-oriented programming</a:t>
+            </a:r>
+          </a:p>
+        </p:txBody>
+      </p:sp>
+      <p:sp>
+        <p:nvSpPr>
+          <p:cNvPr id="4" name="Slide Number Placeholder 3">
+            <a:extLst>
+              <a:ext uri="{FF2B5EF4-FFF2-40B4-BE49-F238E27FC236}">
+                <a16:creationId xmlns:a16="http://schemas.microsoft.com/office/drawing/2014/main" id="{80BD1BF0-3FF8-4C70-9176-0B4EFBC93609}"/>
               </a:ext>
             </a:extLst>
           </p:cNvPr>
@@ -11626,9 +11725,8 @@
           <a:bodyPr/>
           <a:lstStyle/>
           <a:p>
-            <a:fld id="{86CB4B4D-7CA3-9044-876B-883B54F8677D}" type="slidenum">
+            <a:fld id="{20F37917-FD3A-4669-9018-DA04BCDD3D75}" type="slidenum">
               <a:rPr lang="en-US" smtClean="0"/>
-              <a:pPr/>
               <a:t>2</a:t>
             </a:fld>
             <a:endParaRPr lang="en-US"/>
@@ -11638,7 +11736,7 @@
     </p:spTree>
     <p:extLst>
       <p:ext uri="{BB962C8B-B14F-4D97-AF65-F5344CB8AC3E}">
-        <p14:creationId xmlns:p14="http://schemas.microsoft.com/office/powerpoint/2010/main" val="3915051007"/>
+        <p14:creationId xmlns:p14="http://schemas.microsoft.com/office/powerpoint/2010/main" val="986787541"/>
       </p:ext>
     </p:extLst>
   </p:cSld>
@@ -13637,30 +13735,48 @@
               <a:t> </a:t>
             </a:r>
             <a:r>
-              <a:rPr lang="en-US" dirty="0" err="1">
-                <a:solidFill>
-                  <a:srgbClr val="000000"/>
-                </a:solidFill>
-                <a:latin typeface="Consolas" panose="020B0609020204030204" pitchFamily="49" charset="0"/>
-              </a:rPr>
-              <a:t>grossTax</a:t>
-            </a:r>
-            <a:r>
-              <a:rPr lang="en-US" dirty="0">
-                <a:solidFill>
-                  <a:srgbClr val="000000"/>
-                </a:solidFill>
-                <a:latin typeface="Consolas" panose="020B0609020204030204" pitchFamily="49" charset="0"/>
-              </a:rPr>
-              <a:t>(</a:t>
-            </a:r>
-            <a:r>
               <a:rPr lang="en-US" dirty="0">
                 <a:solidFill>
                   <a:srgbClr val="098658"/>
                 </a:solidFill>
                 <a:latin typeface="Consolas" panose="020B0609020204030204" pitchFamily="49" charset="0"/>
               </a:rPr>
+              <a:t>1000</a:t>
+            </a:r>
+            <a:r>
+              <a:rPr lang="en-US" dirty="0">
+                <a:solidFill>
+                  <a:srgbClr val="000000"/>
+                </a:solidFill>
+                <a:latin typeface="Consolas" panose="020B0609020204030204" pitchFamily="49" charset="0"/>
+              </a:rPr>
+              <a:t> + </a:t>
+            </a:r>
+            <a:r>
+              <a:rPr lang="en-US" dirty="0">
+                <a:solidFill>
+                  <a:srgbClr val="098658"/>
+                </a:solidFill>
+                <a:latin typeface="Consolas" panose="020B0609020204030204" pitchFamily="49" charset="0"/>
+              </a:rPr>
+              <a:t>0.20</a:t>
+            </a:r>
+            <a:r>
+              <a:rPr lang="en-US" dirty="0">
+                <a:solidFill>
+                  <a:srgbClr val="000000"/>
+                </a:solidFill>
+                <a:latin typeface="Consolas" panose="020B0609020204030204" pitchFamily="49" charset="0"/>
+              </a:rPr>
+              <a:t> * (income - </a:t>
+            </a:r>
+            <a:r>
+              <a:rPr lang="en-US" dirty="0">
+                <a:solidFill>
+                  <a:srgbClr val="098658"/>
+                </a:solidFill>
+                <a:latin typeface="Consolas" panose="020B0609020204030204" pitchFamily="49" charset="0"/>
+              </a:rPr>
               <a:t>20000</a:t>
             </a:r>
             <a:r>
@@ -13670,7 +13786,54 @@
                 </a:solidFill>
                 <a:latin typeface="Consolas" panose="020B0609020204030204" pitchFamily="49" charset="0"/>
               </a:rPr>
-              <a:t>) + </a:t>
+              <a:t>) }</a:t>
+            </a:r>
+          </a:p>
+          <a:p>
+            <a:r>
+              <a:rPr lang="en-US" dirty="0">
+                <a:solidFill>
+                  <a:srgbClr val="000000"/>
+                </a:solidFill>
+                <a:latin typeface="Consolas" panose="020B0609020204030204" pitchFamily="49" charset="0"/>
+              </a:rPr>
+              <a:t>    </a:t>
+            </a:r>
+            <a:r>
+              <a:rPr lang="en-US" dirty="0">
+                <a:solidFill>
+                  <a:srgbClr val="0000FF"/>
+                </a:solidFill>
+                <a:latin typeface="Consolas" panose="020B0609020204030204" pitchFamily="49" charset="0"/>
+              </a:rPr>
+              <a:t>else</a:t>
+            </a:r>
+            <a:r>
+              <a:rPr lang="en-US" dirty="0">
+                <a:solidFill>
+                  <a:srgbClr val="000000"/>
+                </a:solidFill>
+                <a:latin typeface="Consolas" panose="020B0609020204030204" pitchFamily="49" charset="0"/>
+              </a:rPr>
+              <a:t> { </a:t>
+            </a:r>
+            <a:r>
+              <a:rPr lang="en-US" dirty="0">
+                <a:solidFill>
+                  <a:srgbClr val="0000FF"/>
+                </a:solidFill>
+                <a:latin typeface="Consolas" panose="020B0609020204030204" pitchFamily="49" charset="0"/>
+              </a:rPr>
+              <a:t>return</a:t>
+            </a:r>
+            <a:r>
+              <a:rPr lang="en-US" dirty="0">
+                <a:solidFill>
+                  <a:srgbClr val="000000"/>
+                </a:solidFill>
+                <a:latin typeface="Consolas" panose="020B0609020204030204" pitchFamily="49" charset="0"/>
+              </a:rPr>
+              <a:t> 7</a:t>
             </a:r>
             <a:r>
               <a:rPr lang="en-US" dirty="0">
@@ -13679,117 +13842,16 @@
                 </a:solidFill>
                 <a:latin typeface="Consolas" panose="020B0609020204030204" pitchFamily="49" charset="0"/>
               </a:rPr>
-              <a:t>0.20</a:t>
-            </a:r>
-            <a:r>
-              <a:rPr lang="en-US" dirty="0">
-                <a:solidFill>
-                  <a:srgbClr val="000000"/>
-                </a:solidFill>
-                <a:latin typeface="Consolas" panose="020B0609020204030204" pitchFamily="49" charset="0"/>
-              </a:rPr>
-              <a:t> * (income - </a:t>
-            </a:r>
-            <a:r>
-              <a:rPr lang="en-US" dirty="0">
-                <a:solidFill>
-                  <a:srgbClr val="098658"/>
-                </a:solidFill>
-                <a:latin typeface="Consolas" panose="020B0609020204030204" pitchFamily="49" charset="0"/>
-              </a:rPr>
-              <a:t>20000</a:t>
-            </a:r>
-            <a:r>
-              <a:rPr lang="en-US" dirty="0">
-                <a:solidFill>
-                  <a:srgbClr val="000000"/>
-                </a:solidFill>
-                <a:latin typeface="Consolas" panose="020B0609020204030204" pitchFamily="49" charset="0"/>
-              </a:rPr>
-              <a:t>) }</a:t>
-            </a:r>
-          </a:p>
-          <a:p>
-            <a:r>
-              <a:rPr lang="en-US" dirty="0">
-                <a:solidFill>
-                  <a:srgbClr val="000000"/>
-                </a:solidFill>
-                <a:latin typeface="Consolas" panose="020B0609020204030204" pitchFamily="49" charset="0"/>
-              </a:rPr>
-              <a:t>    </a:t>
-            </a:r>
-            <a:r>
-              <a:rPr lang="en-US" dirty="0">
-                <a:solidFill>
-                  <a:srgbClr val="0000FF"/>
-                </a:solidFill>
-                <a:latin typeface="Consolas" panose="020B0609020204030204" pitchFamily="49" charset="0"/>
-              </a:rPr>
-              <a:t>else</a:t>
-            </a:r>
-            <a:r>
-              <a:rPr lang="en-US" dirty="0">
-                <a:solidFill>
-                  <a:srgbClr val="000000"/>
-                </a:solidFill>
-                <a:latin typeface="Consolas" panose="020B0609020204030204" pitchFamily="49" charset="0"/>
-              </a:rPr>
-              <a:t> { </a:t>
-            </a:r>
-            <a:r>
-              <a:rPr lang="en-US" dirty="0">
-                <a:solidFill>
-                  <a:srgbClr val="0000FF"/>
-                </a:solidFill>
-                <a:latin typeface="Consolas" panose="020B0609020204030204" pitchFamily="49" charset="0"/>
-              </a:rPr>
-              <a:t>return</a:t>
-            </a:r>
-            <a:r>
-              <a:rPr lang="en-US" dirty="0">
-                <a:solidFill>
-                  <a:srgbClr val="000000"/>
-                </a:solidFill>
-                <a:latin typeface="Consolas" panose="020B0609020204030204" pitchFamily="49" charset="0"/>
-              </a:rPr>
-              <a:t> </a:t>
-            </a:r>
-            <a:r>
-              <a:rPr lang="en-US" dirty="0" err="1">
-                <a:solidFill>
-                  <a:srgbClr val="000000"/>
-                </a:solidFill>
-                <a:latin typeface="Consolas" panose="020B0609020204030204" pitchFamily="49" charset="0"/>
-              </a:rPr>
-              <a:t>grossTax</a:t>
-            </a:r>
-            <a:r>
-              <a:rPr lang="en-US" dirty="0">
-                <a:solidFill>
-                  <a:srgbClr val="000000"/>
-                </a:solidFill>
-                <a:latin typeface="Consolas" panose="020B0609020204030204" pitchFamily="49" charset="0"/>
-              </a:rPr>
-              <a:t>(</a:t>
-            </a:r>
-            <a:r>
-              <a:rPr lang="en-US" dirty="0">
-                <a:solidFill>
-                  <a:srgbClr val="098658"/>
-                </a:solidFill>
-                <a:latin typeface="Consolas" panose="020B0609020204030204" pitchFamily="49" charset="0"/>
-              </a:rPr>
-              <a:t>50000</a:t>
-            </a:r>
-            <a:r>
-              <a:rPr lang="en-US" dirty="0">
-                <a:solidFill>
-                  <a:srgbClr val="000000"/>
-                </a:solidFill>
-                <a:latin typeface="Consolas" panose="020B0609020204030204" pitchFamily="49" charset="0"/>
-              </a:rPr>
-              <a:t>) + </a:t>
+              <a:t>000</a:t>
+            </a:r>
+            <a:r>
+              <a:rPr lang="en-US" dirty="0">
+                <a:solidFill>
+                  <a:srgbClr val="000000"/>
+                </a:solidFill>
+                <a:latin typeface="Consolas" panose="020B0609020204030204" pitchFamily="49" charset="0"/>
+              </a:rPr>
+              <a:t> + </a:t>
             </a:r>
             <a:r>
               <a:rPr lang="en-US" dirty="0">
@@ -16726,7 +16788,7 @@
           <p:cNvPr id="2" name="Title 1">
             <a:extLst>
               <a:ext uri="{FF2B5EF4-FFF2-40B4-BE49-F238E27FC236}">
-                <a16:creationId xmlns:a16="http://schemas.microsoft.com/office/drawing/2014/main" id="{4F8F7B5D-FB6C-436E-B15E-6071C1AF4E43}"/>
+                <a16:creationId xmlns:a16="http://schemas.microsoft.com/office/drawing/2014/main" id="{B6D33575-0593-49FD-831F-131BB6CC7E6C}"/>
               </a:ext>
             </a:extLst>
           </p:cNvPr>
@@ -16744,17 +16806,17 @@
           <a:p>
             <a:r>
               <a:rPr lang="en-US" dirty="0"/>
-              <a:t>Outline of this lesson</a:t>
-            </a:r>
-          </a:p>
-        </p:txBody>
-      </p:sp>
-      <p:sp>
-        <p:nvSpPr>
-          <p:cNvPr id="3" name="Content Placeholder 2">
-            <a:extLst>
-              <a:ext uri="{FF2B5EF4-FFF2-40B4-BE49-F238E27FC236}">
-                <a16:creationId xmlns:a16="http://schemas.microsoft.com/office/drawing/2014/main" id="{A35947AF-DDC1-4EDB-B11F-00E505483FD1}"/>
+              <a:t>Learning Objectives for this Lesson</a:t>
+            </a:r>
+          </a:p>
+        </p:txBody>
+      </p:sp>
+      <p:sp>
+        <p:nvSpPr>
+          <p:cNvPr id="3" name="Text Placeholder 2">
+            <a:extLst>
+              <a:ext uri="{FF2B5EF4-FFF2-40B4-BE49-F238E27FC236}">
+                <a16:creationId xmlns:a16="http://schemas.microsoft.com/office/drawing/2014/main" id="{5B21ECCD-9823-405F-AA9A-D0CC235AD583}"/>
               </a:ext>
             </a:extLst>
           </p:cNvPr>
@@ -16770,63 +16832,43 @@
           <a:bodyPr/>
           <a:lstStyle/>
           <a:p>
-            <a:pPr marL="514350" indent="-514350">
-              <a:buFont typeface="+mj-lt"/>
-              <a:buAutoNum type="arabicPeriod"/>
-            </a:pPr>
             <a:r>
               <a:rPr lang="en-US" dirty="0"/>
-              <a:t>The purposes of the principles</a:t>
-            </a:r>
-          </a:p>
-          <a:p>
-            <a:pPr marL="514350" indent="-514350">
-              <a:buFont typeface="+mj-lt"/>
-              <a:buAutoNum type="arabicPeriod"/>
-            </a:pPr>
+              <a:t>By the end of this lesson you should be able to:</a:t>
+            </a:r>
+          </a:p>
+          <a:p>
+            <a:pPr lvl="1" fontAlgn="base"/>
             <a:r>
               <a:rPr lang="en-US" dirty="0"/>
-              <a:t>Difficulties the principles should help with</a:t>
-            </a:r>
-          </a:p>
-          <a:p>
-            <a:pPr marL="514350" indent="-514350">
-              <a:buFont typeface="+mj-lt"/>
-              <a:buAutoNum type="arabicPeriod"/>
-            </a:pPr>
+              <a:t>Describe the purpose of our design principles </a:t>
+            </a:r>
+          </a:p>
+          <a:p>
+            <a:pPr lvl="1" fontAlgn="base"/>
             <a:r>
               <a:rPr lang="en-US" dirty="0"/>
-              <a:t>Five general-purpose principles</a:t>
-            </a:r>
-          </a:p>
-          <a:p>
-            <a:pPr lvl="1"/>
+              <a:t>List 5 general design principles and illustrate their expression in code</a:t>
+            </a:r>
+          </a:p>
+          <a:p>
+            <a:pPr lvl="1" fontAlgn="base"/>
             <a:r>
               <a:rPr lang="en-US" dirty="0"/>
-              <a:t>usable for all programming, not just object-oriented</a:t>
-            </a:r>
-          </a:p>
-          <a:p>
-            <a:pPr lvl="1"/>
+              <a:t>Identify some violations of the principles and suggest ways to mitigate them</a:t>
+            </a:r>
+          </a:p>
+          <a:p>
             <a:endParaRPr lang="en-US" dirty="0"/>
           </a:p>
-          <a:p>
-            <a:pPr marL="0" indent="0">
-              <a:buNone/>
-            </a:pPr>
-            <a:r>
-              <a:rPr lang="en-US" dirty="0"/>
-              <a:t>In the next lesson, we'll present five more principles that are specific to object-oriented programming</a:t>
-            </a:r>
-          </a:p>
-        </p:txBody>
-      </p:sp>
-      <p:sp>
-        <p:nvSpPr>
-          <p:cNvPr id="4" name="Slide Number Placeholder 3">
-            <a:extLst>
-              <a:ext uri="{FF2B5EF4-FFF2-40B4-BE49-F238E27FC236}">
-                <a16:creationId xmlns:a16="http://schemas.microsoft.com/office/drawing/2014/main" id="{80BD1BF0-3FF8-4C70-9176-0B4EFBC93609}"/>
+        </p:txBody>
+      </p:sp>
+      <p:sp>
+        <p:nvSpPr>
+          <p:cNvPr id="5" name="Slide Number Placeholder 4">
+            <a:extLst>
+              <a:ext uri="{FF2B5EF4-FFF2-40B4-BE49-F238E27FC236}">
+                <a16:creationId xmlns:a16="http://schemas.microsoft.com/office/drawing/2014/main" id="{D3CB1048-3EB8-4281-8361-E7EB70F6FBBC}"/>
               </a:ext>
             </a:extLst>
           </p:cNvPr>
@@ -16842,8 +16884,9 @@
           <a:bodyPr/>
           <a:lstStyle/>
           <a:p>
-            <a:fld id="{20F37917-FD3A-4669-9018-DA04BCDD3D75}" type="slidenum">
+            <a:fld id="{86CB4B4D-7CA3-9044-876B-883B54F8677D}" type="slidenum">
               <a:rPr lang="en-US" smtClean="0"/>
+              <a:pPr/>
               <a:t>3</a:t>
             </a:fld>
             <a:endParaRPr lang="en-US"/>
@@ -16853,7 +16896,7 @@
     </p:spTree>
     <p:extLst>
       <p:ext uri="{BB962C8B-B14F-4D97-AF65-F5344CB8AC3E}">
-        <p14:creationId xmlns:p14="http://schemas.microsoft.com/office/powerpoint/2010/main" val="986787541"/>
+        <p14:creationId xmlns:p14="http://schemas.microsoft.com/office/powerpoint/2010/main" val="3915051007"/>
       </p:ext>
     </p:extLst>
   </p:cSld>
@@ -17326,7 +17369,7 @@
           <a:p>
             <a:r>
               <a:rPr lang="en-US" dirty="0"/>
-              <a:t>Decreasing coupling</a:t>
+              <a:t>The biggest obstacle: coupling</a:t>
             </a:r>
           </a:p>
         </p:txBody>
@@ -18200,7 +18243,7 @@
           <a:p>
             <a:r>
               <a:rPr lang="en-US" dirty="0"/>
-              <a:t>The name of a thing is a first clue to the reader about the thing means.</a:t>
+              <a:t>The name of a thing is a first clue to the reader about what the thing means.</a:t>
             </a:r>
           </a:p>
           <a:p>
@@ -18230,6 +18273,15 @@
               <a:rPr lang="en-US" dirty="0">
                 <a:sym typeface="Wingdings" panose="05000000000000000000" pitchFamily="2" charset="2"/>
               </a:rPr>
+              <a:t>constants</a:t>
+            </a:r>
+          </a:p>
+          <a:p>
+            <a:pPr lvl="1"/>
+            <a:r>
+              <a:rPr lang="en-US" dirty="0">
+                <a:sym typeface="Wingdings" panose="05000000000000000000" pitchFamily="2" charset="2"/>
+              </a:rPr>
               <a:t>variables</a:t>
             </a:r>
           </a:p>
@@ -18239,7 +18291,7 @@
               <a:rPr lang="en-US" dirty="0">
                 <a:sym typeface="Wingdings" panose="05000000000000000000" pitchFamily="2" charset="2"/>
               </a:rPr>
-              <a:t>functions</a:t>
+              <a:t>functions/methods</a:t>
             </a:r>
           </a:p>
           <a:p>
@@ -18967,7 +19019,7 @@
         <p:spPr>
           <a:xfrm>
             <a:off x="1106659" y="2192248"/>
-            <a:ext cx="4237057" cy="369332"/>
+            <a:ext cx="5622052" cy="461665"/>
           </a:xfrm>
           <a:prstGeom prst="rect">
             <a:avLst/>
@@ -18980,7 +19032,7 @@
           <a:lstStyle/>
           <a:p>
             <a:r>
-              <a:rPr lang="en-US" dirty="0">
+              <a:rPr lang="en-US" sz="2400" dirty="0">
                 <a:solidFill>
                   <a:srgbClr val="0000FF"/>
                 </a:solidFill>
@@ -18989,7 +19041,7 @@
               <a:t>let</a:t>
             </a:r>
             <a:r>
-              <a:rPr lang="en-US" dirty="0">
+              <a:rPr lang="en-US" sz="2400" dirty="0">
                 <a:solidFill>
                   <a:srgbClr val="000000"/>
                 </a:solidFill>
@@ -18998,7 +19050,7 @@
               <a:t> </a:t>
             </a:r>
             <a:r>
-              <a:rPr lang="en-US" dirty="0" err="1">
+              <a:rPr lang="en-US" sz="2400" dirty="0" err="1">
                 <a:solidFill>
                   <a:srgbClr val="000000"/>
                 </a:solidFill>
@@ -19007,7 +19059,7 @@
               <a:t>salesprice</a:t>
             </a:r>
             <a:r>
-              <a:rPr lang="en-US" dirty="0">
+              <a:rPr lang="en-US" sz="2400" dirty="0">
                 <a:solidFill>
                   <a:srgbClr val="000000"/>
                 </a:solidFill>
@@ -19016,7 +19068,7 @@
               <a:t> = </a:t>
             </a:r>
             <a:r>
-              <a:rPr lang="en-US" dirty="0" err="1">
+              <a:rPr lang="en-US" sz="2400" dirty="0" err="1">
                 <a:solidFill>
                   <a:srgbClr val="000000"/>
                 </a:solidFill>
@@ -19025,7 +19077,7 @@
               <a:t>netPrice</a:t>
             </a:r>
             <a:r>
-              <a:rPr lang="en-US" dirty="0">
+              <a:rPr lang="en-US" sz="2400" dirty="0">
                 <a:solidFill>
                   <a:srgbClr val="000000"/>
                 </a:solidFill>
@@ -19034,7 +19086,7 @@
               <a:t> * </a:t>
             </a:r>
             <a:r>
-              <a:rPr lang="en-US" dirty="0">
+              <a:rPr lang="en-US" sz="2400" dirty="0">
                 <a:solidFill>
                   <a:srgbClr val="098658"/>
                 </a:solidFill>
@@ -19042,7 +19094,7 @@
               </a:rPr>
               <a:t>1.06</a:t>
             </a:r>
-            <a:endParaRPr lang="en-US" b="0" dirty="0">
+            <a:endParaRPr lang="en-US" sz="2400" b="0" dirty="0">
               <a:solidFill>
                 <a:srgbClr val="000000"/>
               </a:solidFill>

</xml_diff>